<commit_message>
updated presentation & figures, fixed formattings
</commit_message>
<xml_diff>
--- a/STAR_WARS/Presentation.pptx
+++ b/STAR_WARS/Presentation.pptx
@@ -7,20 +7,18 @@
   <p:sldIdLst>
     <p:sldId id="256" r:id="rId2"/>
     <p:sldId id="257" r:id="rId3"/>
-    <p:sldId id="258" r:id="rId4"/>
-    <p:sldId id="271" r:id="rId5"/>
-    <p:sldId id="264" r:id="rId6"/>
-    <p:sldId id="267" r:id="rId7"/>
-    <p:sldId id="259" r:id="rId8"/>
-    <p:sldId id="260" r:id="rId9"/>
-    <p:sldId id="266" r:id="rId10"/>
-    <p:sldId id="268" r:id="rId11"/>
-    <p:sldId id="269" r:id="rId12"/>
-    <p:sldId id="270" r:id="rId13"/>
-    <p:sldId id="272" r:id="rId14"/>
-    <p:sldId id="261" r:id="rId15"/>
-    <p:sldId id="262" r:id="rId16"/>
-    <p:sldId id="263" r:id="rId17"/>
+    <p:sldId id="271" r:id="rId4"/>
+    <p:sldId id="273" r:id="rId5"/>
+    <p:sldId id="274" r:id="rId6"/>
+    <p:sldId id="264" r:id="rId7"/>
+    <p:sldId id="267" r:id="rId8"/>
+    <p:sldId id="268" r:id="rId9"/>
+    <p:sldId id="269" r:id="rId10"/>
+    <p:sldId id="270" r:id="rId11"/>
+    <p:sldId id="272" r:id="rId12"/>
+    <p:sldId id="261" r:id="rId13"/>
+    <p:sldId id="262" r:id="rId14"/>
+    <p:sldId id="263" r:id="rId15"/>
   </p:sldIdLst>
   <p:sldSz cx="9144000" cy="6858000" type="screen4x3"/>
   <p:notesSz cx="6858000" cy="9144000"/>
@@ -266,7 +264,7 @@
           <a:p>
             <a:fld id="{777498FA-E504-402C-98AB-D8CA85E40E63}" type="datetimeFigureOut">
               <a:rPr lang="en-US" smtClean="0"/>
-              <a:t>3/18/2021</a:t>
+              <a:t>3/19/2021</a:t>
             </a:fld>
             <a:endParaRPr lang="en-US"/>
           </a:p>
@@ -436,7 +434,7 @@
           <a:p>
             <a:fld id="{777498FA-E504-402C-98AB-D8CA85E40E63}" type="datetimeFigureOut">
               <a:rPr lang="en-US" smtClean="0"/>
-              <a:t>3/18/2021</a:t>
+              <a:t>3/19/2021</a:t>
             </a:fld>
             <a:endParaRPr lang="en-US"/>
           </a:p>
@@ -616,7 +614,7 @@
           <a:p>
             <a:fld id="{777498FA-E504-402C-98AB-D8CA85E40E63}" type="datetimeFigureOut">
               <a:rPr lang="en-US" smtClean="0"/>
-              <a:t>3/18/2021</a:t>
+              <a:t>3/19/2021</a:t>
             </a:fld>
             <a:endParaRPr lang="en-US"/>
           </a:p>
@@ -786,7 +784,7 @@
           <a:p>
             <a:fld id="{777498FA-E504-402C-98AB-D8CA85E40E63}" type="datetimeFigureOut">
               <a:rPr lang="en-US" smtClean="0"/>
-              <a:t>3/18/2021</a:t>
+              <a:t>3/19/2021</a:t>
             </a:fld>
             <a:endParaRPr lang="en-US"/>
           </a:p>
@@ -1030,7 +1028,7 @@
           <a:p>
             <a:fld id="{777498FA-E504-402C-98AB-D8CA85E40E63}" type="datetimeFigureOut">
               <a:rPr lang="en-US" smtClean="0"/>
-              <a:t>3/18/2021</a:t>
+              <a:t>3/19/2021</a:t>
             </a:fld>
             <a:endParaRPr lang="en-US"/>
           </a:p>
@@ -1262,7 +1260,7 @@
           <a:p>
             <a:fld id="{777498FA-E504-402C-98AB-D8CA85E40E63}" type="datetimeFigureOut">
               <a:rPr lang="en-US" smtClean="0"/>
-              <a:t>3/18/2021</a:t>
+              <a:t>3/19/2021</a:t>
             </a:fld>
             <a:endParaRPr lang="en-US"/>
           </a:p>
@@ -1629,7 +1627,7 @@
           <a:p>
             <a:fld id="{777498FA-E504-402C-98AB-D8CA85E40E63}" type="datetimeFigureOut">
               <a:rPr lang="en-US" smtClean="0"/>
-              <a:t>3/18/2021</a:t>
+              <a:t>3/19/2021</a:t>
             </a:fld>
             <a:endParaRPr lang="en-US"/>
           </a:p>
@@ -1747,7 +1745,7 @@
           <a:p>
             <a:fld id="{777498FA-E504-402C-98AB-D8CA85E40E63}" type="datetimeFigureOut">
               <a:rPr lang="en-US" smtClean="0"/>
-              <a:t>3/18/2021</a:t>
+              <a:t>3/19/2021</a:t>
             </a:fld>
             <a:endParaRPr lang="en-US"/>
           </a:p>
@@ -1842,7 +1840,7 @@
           <a:p>
             <a:fld id="{777498FA-E504-402C-98AB-D8CA85E40E63}" type="datetimeFigureOut">
               <a:rPr lang="en-US" smtClean="0"/>
-              <a:t>3/18/2021</a:t>
+              <a:t>3/19/2021</a:t>
             </a:fld>
             <a:endParaRPr lang="en-US"/>
           </a:p>
@@ -2119,7 +2117,7 @@
           <a:p>
             <a:fld id="{777498FA-E504-402C-98AB-D8CA85E40E63}" type="datetimeFigureOut">
               <a:rPr lang="en-US" smtClean="0"/>
-              <a:t>3/18/2021</a:t>
+              <a:t>3/19/2021</a:t>
             </a:fld>
             <a:endParaRPr lang="en-US"/>
           </a:p>
@@ -2376,7 +2374,7 @@
           <a:p>
             <a:fld id="{777498FA-E504-402C-98AB-D8CA85E40E63}" type="datetimeFigureOut">
               <a:rPr lang="en-US" smtClean="0"/>
-              <a:t>3/18/2021</a:t>
+              <a:t>3/19/2021</a:t>
             </a:fld>
             <a:endParaRPr lang="en-US"/>
           </a:p>
@@ -2598,7 +2596,7 @@
           <a:p>
             <a:fld id="{777498FA-E504-402C-98AB-D8CA85E40E63}" type="datetimeFigureOut">
               <a:rPr lang="en-US" smtClean="0"/>
-              <a:t>3/18/2021</a:t>
+              <a:t>3/19/2021</a:t>
             </a:fld>
             <a:endParaRPr lang="en-US"/>
           </a:p>
@@ -3168,766 +3166,6 @@
       </p:grpSpPr>
       <p:sp>
         <p:nvSpPr>
-          <p:cNvPr id="14" name="Title 1">
-            <a:extLst>
-              <a:ext uri="{FF2B5EF4-FFF2-40B4-BE49-F238E27FC236}">
-                <a16:creationId xmlns:a16="http://schemas.microsoft.com/office/drawing/2014/main" id="{8220B38D-804D-4B13-ADBE-3006FCAFB490}"/>
-              </a:ext>
-            </a:extLst>
-          </p:cNvPr>
-          <p:cNvSpPr>
-            <a:spLocks noGrp="1"/>
-          </p:cNvSpPr>
-          <p:nvPr>
-            <p:ph type="title"/>
-          </p:nvPr>
-        </p:nvSpPr>
-        <p:spPr>
-          <a:xfrm>
-            <a:off x="628650" y="-210095"/>
-            <a:ext cx="7886700" cy="1325563"/>
-          </a:xfrm>
-        </p:spPr>
-        <p:txBody>
-          <a:bodyPr/>
-          <a:lstStyle/>
-          <a:p>
-            <a:pPr algn="ctr"/>
-            <a:r>
-              <a:rPr lang="en-US" dirty="0">
-                <a:latin typeface="Arial" panose="020B0604020202020204" pitchFamily="34" charset="0"/>
-              </a:rPr>
-              <a:t>Character Heights</a:t>
-            </a:r>
-            <a:endParaRPr lang="en-US" dirty="0"/>
-          </a:p>
-        </p:txBody>
-      </p:sp>
-      <p:pic>
-        <p:nvPicPr>
-          <p:cNvPr id="8" name="Content Placeholder 7" descr="Chart, bar chart, histogram&#10;&#10;Description automatically generated">
-            <a:extLst>
-              <a:ext uri="{FF2B5EF4-FFF2-40B4-BE49-F238E27FC236}">
-                <a16:creationId xmlns:a16="http://schemas.microsoft.com/office/drawing/2014/main" id="{D2D7FB5E-A8CD-49B9-BB04-C9605346EEEF}"/>
-              </a:ext>
-            </a:extLst>
-          </p:cNvPr>
-          <p:cNvPicPr>
-            <a:picLocks noGrp="1" noChangeAspect="1"/>
-          </p:cNvPicPr>
-          <p:nvPr>
-            <p:ph sz="half" idx="2"/>
-          </p:nvPr>
-        </p:nvPicPr>
-        <p:blipFill>
-          <a:blip r:embed="rId2">
-            <a:extLst>
-              <a:ext uri="{28A0092B-C50C-407E-A947-70E740481C1C}">
-                <a14:useLocalDpi xmlns:a14="http://schemas.microsoft.com/office/drawing/2010/main" val="0"/>
-              </a:ext>
-            </a:extLst>
-          </a:blip>
-          <a:stretch>
-            <a:fillRect/>
-          </a:stretch>
-        </p:blipFill>
-        <p:spPr>
-          <a:xfrm>
-            <a:off x="60162" y="1074654"/>
-            <a:ext cx="6515735" cy="4886801"/>
-          </a:xfrm>
-          <a:prstGeom prst="roundRect">
-            <a:avLst>
-              <a:gd name="adj" fmla="val 4167"/>
-            </a:avLst>
-          </a:prstGeom>
-          <a:solidFill>
-            <a:srgbClr val="FFFFFF"/>
-          </a:solidFill>
-          <a:ln w="76200" cap="sq">
-            <a:solidFill>
-              <a:srgbClr val="EAEAEA"/>
-            </a:solidFill>
-            <a:miter lim="800000"/>
-          </a:ln>
-          <a:effectLst>
-            <a:reflection blurRad="12700" stA="33000" endPos="28000" dist="5000" dir="5400000" sy="-100000" algn="bl" rotWithShape="0"/>
-          </a:effectLst>
-          <a:scene3d>
-            <a:camera prst="orthographicFront"/>
-            <a:lightRig rig="threePt" dir="t">
-              <a:rot lat="0" lon="0" rev="2700000"/>
-            </a:lightRig>
-          </a:scene3d>
-          <a:sp3d contourW="6350">
-            <a:bevelT h="38100"/>
-            <a:contourClr>
-              <a:srgbClr val="C0C0C0"/>
-            </a:contourClr>
-          </a:sp3d>
-        </p:spPr>
-      </p:pic>
-      <p:pic>
-        <p:nvPicPr>
-          <p:cNvPr id="19" name="Content Placeholder 18" descr="Chart, histogram&#10;&#10;Description automatically generated">
-            <a:extLst>
-              <a:ext uri="{FF2B5EF4-FFF2-40B4-BE49-F238E27FC236}">
-                <a16:creationId xmlns:a16="http://schemas.microsoft.com/office/drawing/2014/main" id="{2BCB2B31-2FE2-491D-9FB3-A98C64406FB3}"/>
-              </a:ext>
-            </a:extLst>
-          </p:cNvPr>
-          <p:cNvPicPr>
-            <a:picLocks noGrp="1" noChangeAspect="1"/>
-          </p:cNvPicPr>
-          <p:nvPr>
-            <p:ph sz="quarter" idx="4"/>
-          </p:nvPr>
-        </p:nvPicPr>
-        <p:blipFill>
-          <a:blip r:embed="rId3">
-            <a:extLst>
-              <a:ext uri="{28A0092B-C50C-407E-A947-70E740481C1C}">
-                <a14:useLocalDpi xmlns:a14="http://schemas.microsoft.com/office/drawing/2010/main" val="0"/>
-              </a:ext>
-            </a:extLst>
-          </a:blip>
-          <a:stretch>
-            <a:fillRect/>
-          </a:stretch>
-        </p:blipFill>
-        <p:spPr>
-          <a:xfrm>
-            <a:off x="6710868" y="597918"/>
-            <a:ext cx="2433132" cy="1756176"/>
-          </a:xfrm>
-          <a:prstGeom prst="rect">
-            <a:avLst/>
-          </a:prstGeom>
-          <a:solidFill>
-            <a:srgbClr val="FFFFFF">
-              <a:shade val="85000"/>
-            </a:srgbClr>
-          </a:solidFill>
-          <a:ln w="88900" cap="sq">
-            <a:solidFill>
-              <a:srgbClr val="FFFFFF"/>
-            </a:solidFill>
-            <a:miter lim="800000"/>
-          </a:ln>
-          <a:effectLst>
-            <a:outerShdw blurRad="55000" dist="18000" dir="5400000" algn="tl" rotWithShape="0">
-              <a:srgbClr val="000000">
-                <a:alpha val="40000"/>
-              </a:srgbClr>
-            </a:outerShdw>
-          </a:effectLst>
-          <a:scene3d>
-            <a:camera prst="orthographicFront"/>
-            <a:lightRig rig="twoPt" dir="t">
-              <a:rot lat="0" lon="0" rev="7200000"/>
-            </a:lightRig>
-          </a:scene3d>
-          <a:sp3d>
-            <a:bevelT w="25400" h="19050"/>
-            <a:contourClr>
-              <a:srgbClr val="FFFFFF"/>
-            </a:contourClr>
-          </a:sp3d>
-        </p:spPr>
-      </p:pic>
-      <p:sp>
-        <p:nvSpPr>
-          <p:cNvPr id="20" name="TextBox 19">
-            <a:extLst>
-              <a:ext uri="{FF2B5EF4-FFF2-40B4-BE49-F238E27FC236}">
-                <a16:creationId xmlns:a16="http://schemas.microsoft.com/office/drawing/2014/main" id="{C2D7B902-F7AC-42E3-97E1-7C6718347D9C}"/>
-              </a:ext>
-            </a:extLst>
-          </p:cNvPr>
-          <p:cNvSpPr txBox="1"/>
-          <p:nvPr/>
-        </p:nvSpPr>
-        <p:spPr>
-          <a:xfrm>
-            <a:off x="6710868" y="2992991"/>
-            <a:ext cx="1625966" cy="3785652"/>
-          </a:xfrm>
-          <a:prstGeom prst="rect">
-            <a:avLst/>
-          </a:prstGeom>
-          <a:noFill/>
-        </p:spPr>
-        <p:txBody>
-          <a:bodyPr wrap="square" rtlCol="0">
-            <a:spAutoFit/>
-          </a:bodyPr>
-          <a:lstStyle/>
-          <a:p>
-            <a:r>
-              <a:rPr lang="en-US" sz="1000" b="1" dirty="0" err="1"/>
-              <a:t>pvalue</a:t>
-            </a:r>
-            <a:r>
-              <a:rPr lang="en-US" sz="1000" b="1" dirty="0"/>
-              <a:t>=0.00018438028390007074)</a:t>
-            </a:r>
-          </a:p>
-          <a:p>
-            <a:r>
-              <a:rPr lang="en-US" sz="1000" b="1" dirty="0"/>
-              <a:t>------------------------------------------</a:t>
-            </a:r>
-          </a:p>
-          <a:p>
-            <a:r>
-              <a:rPr lang="en-US" sz="1000" b="1" dirty="0"/>
-              <a:t>The sample standard deviation is </a:t>
-            </a:r>
-            <a:r>
-              <a:rPr lang="en-US" sz="1000" b="1" u="sng" dirty="0"/>
-              <a:t>35.2</a:t>
-            </a:r>
-          </a:p>
-          <a:p>
-            <a:r>
-              <a:rPr lang="en-US" sz="1000" b="1" dirty="0"/>
-              <a:t>The sample variance is </a:t>
-            </a:r>
-            <a:r>
-              <a:rPr lang="en-US" sz="1000" b="1" u="sng" dirty="0"/>
-              <a:t>1241.4</a:t>
-            </a:r>
-          </a:p>
-          <a:p>
-            <a:r>
-              <a:rPr lang="en-US" sz="1000" b="1" dirty="0"/>
-              <a:t>------------------------------------------</a:t>
-            </a:r>
-          </a:p>
-          <a:p>
-            <a:r>
-              <a:rPr lang="en-US" sz="1000" b="1" dirty="0"/>
-              <a:t>The mean height of Star Wars characters is 174.4 cm or 68.4 in</a:t>
-            </a:r>
-          </a:p>
-          <a:p>
-            <a:r>
-              <a:rPr lang="en-US" sz="1000" b="1" dirty="0"/>
-              <a:t>------------------------------------------</a:t>
-            </a:r>
-          </a:p>
-          <a:p>
-            <a:r>
-              <a:rPr lang="en-US" sz="1000" b="1" dirty="0"/>
-              <a:t>Roughly 68% of the data is between 139.1 and 209.6 cm</a:t>
-            </a:r>
-          </a:p>
-          <a:p>
-            <a:r>
-              <a:rPr lang="en-US" sz="1000" b="1" dirty="0"/>
-              <a:t>Roughly 95% of the data is between 103.9 and 244.8 cm</a:t>
-            </a:r>
-          </a:p>
-          <a:p>
-            <a:r>
-              <a:rPr lang="en-US" sz="1000" b="1" dirty="0"/>
-              <a:t>Roughly 99.7% of the data is between 68.7 and 280.1 cm</a:t>
-            </a:r>
-          </a:p>
-        </p:txBody>
-      </p:sp>
-    </p:spTree>
-    <p:extLst>
-      <p:ext uri="{BB962C8B-B14F-4D97-AF65-F5344CB8AC3E}">
-        <p14:creationId xmlns:p14="http://schemas.microsoft.com/office/powerpoint/2010/main" val="2551000511"/>
-      </p:ext>
-    </p:extLst>
-  </p:cSld>
-  <p:clrMapOvr>
-    <a:masterClrMapping/>
-  </p:clrMapOvr>
-</p:sld>
-</file>
-
-<file path=ppt/slides/slide11.xml><?xml version="1.0" encoding="utf-8"?>
-<p:sld xmlns:a="http://schemas.openxmlformats.org/drawingml/2006/main" xmlns:r="http://schemas.openxmlformats.org/officeDocument/2006/relationships" xmlns:p="http://schemas.openxmlformats.org/presentationml/2006/main">
-  <p:cSld>
-    <p:spTree>
-      <p:nvGrpSpPr>
-        <p:cNvPr id="1" name=""/>
-        <p:cNvGrpSpPr/>
-        <p:nvPr/>
-      </p:nvGrpSpPr>
-      <p:grpSpPr>
-        <a:xfrm>
-          <a:off x="0" y="0"/>
-          <a:ext cx="0" cy="0"/>
-          <a:chOff x="0" y="0"/>
-          <a:chExt cx="0" cy="0"/>
-        </a:xfrm>
-      </p:grpSpPr>
-      <p:sp>
-        <p:nvSpPr>
-          <p:cNvPr id="8" name="Title 7">
-            <a:extLst>
-              <a:ext uri="{FF2B5EF4-FFF2-40B4-BE49-F238E27FC236}">
-                <a16:creationId xmlns:a16="http://schemas.microsoft.com/office/drawing/2014/main" id="{8CC657C8-6C81-419B-8BE0-C4BD2580A827}"/>
-              </a:ext>
-            </a:extLst>
-          </p:cNvPr>
-          <p:cNvSpPr>
-            <a:spLocks noGrp="1"/>
-          </p:cNvSpPr>
-          <p:nvPr>
-            <p:ph type="title"/>
-          </p:nvPr>
-        </p:nvSpPr>
-        <p:spPr>
-          <a:xfrm>
-            <a:off x="2373549" y="-358529"/>
-            <a:ext cx="7048914" cy="1325563"/>
-          </a:xfrm>
-        </p:spPr>
-        <p:txBody>
-          <a:bodyPr>
-            <a:normAutofit/>
-          </a:bodyPr>
-          <a:lstStyle/>
-          <a:p>
-            <a:pPr algn="ctr"/>
-            <a:r>
-              <a:rPr lang="en-US" sz="2800" b="1" dirty="0">
-                <a:solidFill>
-                  <a:schemeClr val="accent4"/>
-                </a:solidFill>
-              </a:rPr>
-              <a:t>Can one </a:t>
-            </a:r>
-            <a:r>
-              <a:rPr lang="en-US" sz="2800" b="1" strike="sngStrike" dirty="0">
-                <a:solidFill>
-                  <a:schemeClr val="accent4"/>
-                </a:solidFill>
-              </a:rPr>
-              <a:t>person</a:t>
-            </a:r>
-            <a:r>
-              <a:rPr lang="en-US" sz="2800" b="1" dirty="0">
-                <a:solidFill>
-                  <a:schemeClr val="accent4"/>
-                </a:solidFill>
-              </a:rPr>
-              <a:t> Hutt truly make a difference?</a:t>
-            </a:r>
-          </a:p>
-        </p:txBody>
-      </p:sp>
-      <p:sp>
-        <p:nvSpPr>
-          <p:cNvPr id="21" name="Text Placeholder 20">
-            <a:extLst>
-              <a:ext uri="{FF2B5EF4-FFF2-40B4-BE49-F238E27FC236}">
-                <a16:creationId xmlns:a16="http://schemas.microsoft.com/office/drawing/2014/main" id="{8497922B-4B9E-4B84-A29B-EC3F186FD62A}"/>
-              </a:ext>
-            </a:extLst>
-          </p:cNvPr>
-          <p:cNvSpPr>
-            <a:spLocks noGrp="1"/>
-          </p:cNvSpPr>
-          <p:nvPr>
-            <p:ph type="body" idx="1"/>
-          </p:nvPr>
-        </p:nvSpPr>
-        <p:spPr>
-          <a:xfrm>
-            <a:off x="0" y="-41682"/>
-            <a:ext cx="3868340" cy="823912"/>
-          </a:xfrm>
-        </p:spPr>
-        <p:txBody>
-          <a:bodyPr/>
-          <a:lstStyle/>
-          <a:p>
-            <a:r>
-              <a:rPr lang="en-US" dirty="0"/>
-              <a:t>Masses with Jabba</a:t>
-            </a:r>
-          </a:p>
-        </p:txBody>
-      </p:sp>
-      <p:pic>
-        <p:nvPicPr>
-          <p:cNvPr id="14" name="Content Placeholder 13" descr="Chart, histogram&#10;&#10;Description automatically generated">
-            <a:extLst>
-              <a:ext uri="{FF2B5EF4-FFF2-40B4-BE49-F238E27FC236}">
-                <a16:creationId xmlns:a16="http://schemas.microsoft.com/office/drawing/2014/main" id="{3D4344B4-364C-4554-B4A4-A5FE96A8634C}"/>
-              </a:ext>
-            </a:extLst>
-          </p:cNvPr>
-          <p:cNvPicPr>
-            <a:picLocks noGrp="1" noChangeAspect="1"/>
-          </p:cNvPicPr>
-          <p:nvPr>
-            <p:ph sz="half" idx="2"/>
-          </p:nvPr>
-        </p:nvPicPr>
-        <p:blipFill>
-          <a:blip r:embed="rId2">
-            <a:extLst>
-              <a:ext uri="{28A0092B-C50C-407E-A947-70E740481C1C}">
-                <a14:useLocalDpi xmlns:a14="http://schemas.microsoft.com/office/drawing/2010/main" val="0"/>
-              </a:ext>
-            </a:extLst>
-          </a:blip>
-          <a:stretch>
-            <a:fillRect/>
-          </a:stretch>
-        </p:blipFill>
-        <p:spPr>
-          <a:xfrm>
-            <a:off x="0" y="722536"/>
-            <a:ext cx="3868737" cy="2901552"/>
-          </a:xfrm>
-        </p:spPr>
-      </p:pic>
-      <p:sp>
-        <p:nvSpPr>
-          <p:cNvPr id="22" name="Text Placeholder 21">
-            <a:extLst>
-              <a:ext uri="{FF2B5EF4-FFF2-40B4-BE49-F238E27FC236}">
-                <a16:creationId xmlns:a16="http://schemas.microsoft.com/office/drawing/2014/main" id="{AA4405B5-A8A4-4715-A5A0-6DC8B535488F}"/>
-              </a:ext>
-            </a:extLst>
-          </p:cNvPr>
-          <p:cNvSpPr>
-            <a:spLocks noGrp="1"/>
-          </p:cNvSpPr>
-          <p:nvPr>
-            <p:ph type="body" sz="quarter" idx="3"/>
-          </p:nvPr>
-        </p:nvSpPr>
-        <p:spPr>
-          <a:xfrm>
-            <a:off x="397" y="3212132"/>
-            <a:ext cx="3887391" cy="823912"/>
-          </a:xfrm>
-        </p:spPr>
-        <p:txBody>
-          <a:bodyPr/>
-          <a:lstStyle/>
-          <a:p>
-            <a:r>
-              <a:rPr lang="en-US" dirty="0"/>
-              <a:t>Masses without Jabba</a:t>
-            </a:r>
-          </a:p>
-        </p:txBody>
-      </p:sp>
-      <p:pic>
-        <p:nvPicPr>
-          <p:cNvPr id="19" name="Content Placeholder 18" descr="Chart, histogram&#10;&#10;Description automatically generated">
-            <a:extLst>
-              <a:ext uri="{FF2B5EF4-FFF2-40B4-BE49-F238E27FC236}">
-                <a16:creationId xmlns:a16="http://schemas.microsoft.com/office/drawing/2014/main" id="{0C1861C0-1452-4BCA-95B3-C2C67F602974}"/>
-              </a:ext>
-            </a:extLst>
-          </p:cNvPr>
-          <p:cNvPicPr>
-            <a:picLocks noGrp="1" noChangeAspect="1"/>
-          </p:cNvPicPr>
-          <p:nvPr>
-            <p:ph sz="quarter" idx="4"/>
-          </p:nvPr>
-        </p:nvPicPr>
-        <p:blipFill>
-          <a:blip r:embed="rId3">
-            <a:extLst>
-              <a:ext uri="{28A0092B-C50C-407E-A947-70E740481C1C}">
-                <a14:useLocalDpi xmlns:a14="http://schemas.microsoft.com/office/drawing/2010/main" val="0"/>
-              </a:ext>
-            </a:extLst>
-          </a:blip>
-          <a:stretch>
-            <a:fillRect/>
-          </a:stretch>
-        </p:blipFill>
-        <p:spPr>
-          <a:xfrm>
-            <a:off x="0" y="3942159"/>
-            <a:ext cx="3887788" cy="2915841"/>
-          </a:xfrm>
-        </p:spPr>
-      </p:pic>
-      <p:pic>
-        <p:nvPicPr>
-          <p:cNvPr id="24" name="Picture 23" descr="Chart, histogram&#10;&#10;Description automatically generated">
-            <a:extLst>
-              <a:ext uri="{FF2B5EF4-FFF2-40B4-BE49-F238E27FC236}">
-                <a16:creationId xmlns:a16="http://schemas.microsoft.com/office/drawing/2014/main" id="{339631CA-E8BE-4A88-94EA-CA808473F9C2}"/>
-              </a:ext>
-            </a:extLst>
-          </p:cNvPr>
-          <p:cNvPicPr>
-            <a:picLocks noChangeAspect="1"/>
-          </p:cNvPicPr>
-          <p:nvPr/>
-        </p:nvPicPr>
-        <p:blipFill>
-          <a:blip r:embed="rId4">
-            <a:extLst>
-              <a:ext uri="{28A0092B-C50C-407E-A947-70E740481C1C}">
-                <a14:useLocalDpi xmlns:a14="http://schemas.microsoft.com/office/drawing/2010/main" val="0"/>
-              </a:ext>
-            </a:extLst>
-          </a:blip>
-          <a:stretch>
-            <a:fillRect/>
-          </a:stretch>
-        </p:blipFill>
-        <p:spPr>
-          <a:xfrm>
-            <a:off x="5136637" y="4006887"/>
-            <a:ext cx="4006966" cy="2671310"/>
-          </a:xfrm>
-          <a:prstGeom prst="rect">
-            <a:avLst/>
-          </a:prstGeom>
-        </p:spPr>
-      </p:pic>
-      <p:pic>
-        <p:nvPicPr>
-          <p:cNvPr id="26" name="Picture 25" descr="Chart, histogram&#10;&#10;Description automatically generated">
-            <a:extLst>
-              <a:ext uri="{FF2B5EF4-FFF2-40B4-BE49-F238E27FC236}">
-                <a16:creationId xmlns:a16="http://schemas.microsoft.com/office/drawing/2014/main" id="{46CA0DB5-43D0-43C2-82E1-F79F2F9F8010}"/>
-              </a:ext>
-            </a:extLst>
-          </p:cNvPr>
-          <p:cNvPicPr>
-            <a:picLocks noChangeAspect="1"/>
-          </p:cNvPicPr>
-          <p:nvPr/>
-        </p:nvPicPr>
-        <p:blipFill>
-          <a:blip r:embed="rId5">
-            <a:extLst>
-              <a:ext uri="{28A0092B-C50C-407E-A947-70E740481C1C}">
-                <a14:useLocalDpi xmlns:a14="http://schemas.microsoft.com/office/drawing/2010/main" val="0"/>
-              </a:ext>
-            </a:extLst>
-          </a:blip>
-          <a:stretch>
-            <a:fillRect/>
-          </a:stretch>
-        </p:blipFill>
-        <p:spPr>
-          <a:xfrm>
-            <a:off x="5136637" y="837657"/>
-            <a:ext cx="4006966" cy="2671310"/>
-          </a:xfrm>
-          <a:prstGeom prst="rect">
-            <a:avLst/>
-          </a:prstGeom>
-        </p:spPr>
-      </p:pic>
-      <p:sp>
-        <p:nvSpPr>
-          <p:cNvPr id="27" name="TextBox 26">
-            <a:extLst>
-              <a:ext uri="{FF2B5EF4-FFF2-40B4-BE49-F238E27FC236}">
-                <a16:creationId xmlns:a16="http://schemas.microsoft.com/office/drawing/2014/main" id="{7C89B01F-5154-4D67-A0FB-AA8724E98A5C}"/>
-              </a:ext>
-            </a:extLst>
-          </p:cNvPr>
-          <p:cNvSpPr txBox="1"/>
-          <p:nvPr/>
-        </p:nvSpPr>
-        <p:spPr>
-          <a:xfrm>
-            <a:off x="3806759" y="823321"/>
-            <a:ext cx="1329878" cy="2192908"/>
-          </a:xfrm>
-          <a:prstGeom prst="rect">
-            <a:avLst/>
-          </a:prstGeom>
-          <a:noFill/>
-        </p:spPr>
-        <p:txBody>
-          <a:bodyPr wrap="square" rtlCol="0">
-            <a:spAutoFit/>
-          </a:bodyPr>
-          <a:lstStyle/>
-          <a:p>
-            <a:pPr algn="ctr"/>
-            <a:r>
-              <a:rPr lang="en-US" sz="1050" dirty="0" err="1"/>
-              <a:t>pvalue</a:t>
-            </a:r>
-            <a:r>
-              <a:rPr lang="en-US" sz="1050" dirty="0"/>
-              <a:t>=1.7377320722567525e-24)</a:t>
-            </a:r>
-          </a:p>
-          <a:p>
-            <a:pPr algn="ctr"/>
-            <a:r>
-              <a:rPr lang="en-US" sz="1050" dirty="0"/>
-              <a:t>---------------------------</a:t>
-            </a:r>
-          </a:p>
-          <a:p>
-            <a:pPr algn="ctr"/>
-            <a:r>
-              <a:rPr lang="en-US" sz="1050" dirty="0"/>
-              <a:t>The sample standard deviation is </a:t>
-            </a:r>
-            <a:r>
-              <a:rPr lang="en-US" sz="1050" b="1" u="sng" dirty="0"/>
-              <a:t>168.0</a:t>
-            </a:r>
-          </a:p>
-          <a:p>
-            <a:pPr algn="ctr"/>
-            <a:r>
-              <a:rPr lang="en-US" sz="1050" dirty="0"/>
-              <a:t>The sample variance is 28229.0</a:t>
-            </a:r>
-          </a:p>
-          <a:p>
-            <a:pPr algn="ctr"/>
-            <a:r>
-              <a:rPr lang="en-US" sz="1050" dirty="0"/>
-              <a:t>---------------------------</a:t>
-            </a:r>
-          </a:p>
-          <a:p>
-            <a:pPr algn="ctr"/>
-            <a:r>
-              <a:rPr lang="en-US" sz="1050" dirty="0"/>
-              <a:t>The mean mass of Star Wars characters with Jabba is </a:t>
-            </a:r>
-          </a:p>
-          <a:p>
-            <a:pPr algn="ctr"/>
-            <a:endParaRPr lang="en-US" sz="1050" dirty="0"/>
-          </a:p>
-          <a:p>
-            <a:pPr algn="ctr"/>
-            <a:r>
-              <a:rPr lang="en-US" sz="1050" b="1" u="sng" dirty="0"/>
-              <a:t>97.3kg or 214.5lbs</a:t>
-            </a:r>
-          </a:p>
-        </p:txBody>
-      </p:sp>
-      <p:sp>
-        <p:nvSpPr>
-          <p:cNvPr id="28" name="TextBox 27">
-            <a:extLst>
-              <a:ext uri="{FF2B5EF4-FFF2-40B4-BE49-F238E27FC236}">
-                <a16:creationId xmlns:a16="http://schemas.microsoft.com/office/drawing/2014/main" id="{AF29F9C7-A089-4017-9792-8784581A1AE2}"/>
-              </a:ext>
-            </a:extLst>
-          </p:cNvPr>
-          <p:cNvSpPr txBox="1"/>
-          <p:nvPr/>
-        </p:nvSpPr>
-        <p:spPr>
-          <a:xfrm>
-            <a:off x="3847273" y="4080986"/>
-            <a:ext cx="1329879" cy="2192908"/>
-          </a:xfrm>
-          <a:prstGeom prst="rect">
-            <a:avLst/>
-          </a:prstGeom>
-          <a:noFill/>
-        </p:spPr>
-        <p:txBody>
-          <a:bodyPr wrap="square" rtlCol="0">
-            <a:spAutoFit/>
-          </a:bodyPr>
-          <a:lstStyle/>
-          <a:p>
-            <a:pPr algn="ctr"/>
-            <a:r>
-              <a:rPr lang="en-US" sz="1050" dirty="0" err="1"/>
-              <a:t>pvalue</a:t>
-            </a:r>
-            <a:r>
-              <a:rPr lang="en-US" sz="1050" dirty="0"/>
-              <a:t>=0.09846414031271)</a:t>
-            </a:r>
-          </a:p>
-          <a:p>
-            <a:pPr algn="ctr"/>
-            <a:r>
-              <a:rPr lang="en-US" sz="1050" dirty="0"/>
-              <a:t>--------------------------The sample standard deviation is </a:t>
-            </a:r>
-            <a:r>
-              <a:rPr lang="en-US" sz="1050" b="1" u="sng" dirty="0"/>
-              <a:t>29.0</a:t>
-            </a:r>
-          </a:p>
-          <a:p>
-            <a:pPr algn="ctr"/>
-            <a:r>
-              <a:rPr lang="en-US" sz="1050" dirty="0"/>
-              <a:t>The sample variance is 841.0</a:t>
-            </a:r>
-          </a:p>
-          <a:p>
-            <a:pPr algn="ctr"/>
-            <a:r>
-              <a:rPr lang="en-US" sz="1050" dirty="0"/>
-              <a:t>---------------------------The mean mass of Star Wars characters without Jabba is </a:t>
-            </a:r>
-          </a:p>
-          <a:p>
-            <a:pPr algn="ctr"/>
-            <a:endParaRPr lang="en-US" sz="1050" dirty="0"/>
-          </a:p>
-          <a:p>
-            <a:pPr algn="ctr"/>
-            <a:r>
-              <a:rPr lang="en-US" sz="1050" b="1" u="sng" dirty="0"/>
-              <a:t>75.6kg or 166.7lbs</a:t>
-            </a:r>
-          </a:p>
-        </p:txBody>
-      </p:sp>
-    </p:spTree>
-    <p:extLst>
-      <p:ext uri="{BB962C8B-B14F-4D97-AF65-F5344CB8AC3E}">
-        <p14:creationId xmlns:p14="http://schemas.microsoft.com/office/powerpoint/2010/main" val="1633364287"/>
-      </p:ext>
-    </p:extLst>
-  </p:cSld>
-  <p:clrMapOvr>
-    <a:masterClrMapping/>
-  </p:clrMapOvr>
-</p:sld>
-</file>
-
-<file path=ppt/slides/slide12.xml><?xml version="1.0" encoding="utf-8"?>
-<p:sld xmlns:a="http://schemas.openxmlformats.org/drawingml/2006/main" xmlns:r="http://schemas.openxmlformats.org/officeDocument/2006/relationships" xmlns:p="http://schemas.openxmlformats.org/presentationml/2006/main">
-  <p:cSld>
-    <p:spTree>
-      <p:nvGrpSpPr>
-        <p:cNvPr id="1" name=""/>
-        <p:cNvGrpSpPr/>
-        <p:nvPr/>
-      </p:nvGrpSpPr>
-      <p:grpSpPr>
-        <a:xfrm>
-          <a:off x="0" y="0"/>
-          <a:ext cx="0" cy="0"/>
-          <a:chOff x="0" y="0"/>
-          <a:chExt cx="0" cy="0"/>
-        </a:xfrm>
-      </p:grpSpPr>
-      <p:sp>
-        <p:nvSpPr>
           <p:cNvPr id="8" name="Title 7">
             <a:extLst>
               <a:ext uri="{FF2B5EF4-FFF2-40B4-BE49-F238E27FC236}">
@@ -4974,7 +4212,7 @@
 </p:sld>
 </file>
 
-<file path=ppt/slides/slide13.xml><?xml version="1.0" encoding="utf-8"?>
+<file path=ppt/slides/slide11.xml><?xml version="1.0" encoding="utf-8"?>
 <p:sld xmlns:a="http://schemas.openxmlformats.org/drawingml/2006/main" xmlns:r="http://schemas.openxmlformats.org/officeDocument/2006/relationships" xmlns:p="http://schemas.openxmlformats.org/presentationml/2006/main">
   <p:cSld>
     <p:spTree>
@@ -5019,8 +4257,8 @@
         </p:blipFill>
         <p:spPr>
           <a:xfrm>
-            <a:off x="219649" y="164736"/>
-            <a:ext cx="8704702" cy="6528528"/>
+            <a:off x="219649" y="946826"/>
+            <a:ext cx="8704702" cy="5746438"/>
           </a:xfrm>
           <a:prstGeom prst="roundRect">
             <a:avLst>
@@ -5083,8 +4321,2095 @@
         </p:blipFill>
         <p:spPr>
           <a:xfrm>
-            <a:off x="3560322" y="1684301"/>
-            <a:ext cx="3826214" cy="2550809"/>
+            <a:off x="3386753" y="1844847"/>
+            <a:ext cx="2694061" cy="1796040"/>
+          </a:xfrm>
+          <a:prstGeom prst="rect">
+            <a:avLst/>
+          </a:prstGeom>
+          <a:solidFill>
+            <a:srgbClr val="FFFFFF">
+              <a:shade val="85000"/>
+            </a:srgbClr>
+          </a:solidFill>
+          <a:ln w="190500" cap="rnd">
+            <a:solidFill>
+              <a:srgbClr val="FFFFFF"/>
+            </a:solidFill>
+          </a:ln>
+          <a:effectLst>
+            <a:outerShdw blurRad="50000" algn="tl" rotWithShape="0">
+              <a:srgbClr val="000000">
+                <a:alpha val="41000"/>
+              </a:srgbClr>
+            </a:outerShdw>
+          </a:effectLst>
+          <a:scene3d>
+            <a:camera prst="orthographicFront"/>
+            <a:lightRig rig="twoPt" dir="t">
+              <a:rot lat="0" lon="0" rev="7800000"/>
+            </a:lightRig>
+          </a:scene3d>
+          <a:sp3d contourW="6350">
+            <a:bevelT w="50800" h="16510"/>
+            <a:contourClr>
+              <a:srgbClr val="C0C0C0"/>
+            </a:contourClr>
+          </a:sp3d>
+        </p:spPr>
+      </p:pic>
+      <p:pic>
+        <p:nvPicPr>
+          <p:cNvPr id="3" name="Picture 2" descr="Chart, pie chart&#10;&#10;Description automatically generated">
+            <a:extLst>
+              <a:ext uri="{FF2B5EF4-FFF2-40B4-BE49-F238E27FC236}">
+                <a16:creationId xmlns:a16="http://schemas.microsoft.com/office/drawing/2014/main" id="{E97D749C-3599-473E-9C8D-C39000E6F33D}"/>
+              </a:ext>
+            </a:extLst>
+          </p:cNvPr>
+          <p:cNvPicPr>
+            <a:picLocks noChangeAspect="1"/>
+          </p:cNvPicPr>
+          <p:nvPr/>
+        </p:nvPicPr>
+        <p:blipFill>
+          <a:blip r:embed="rId4">
+            <a:extLst>
+              <a:ext uri="{28A0092B-C50C-407E-A947-70E740481C1C}">
+                <a14:useLocalDpi xmlns:a14="http://schemas.microsoft.com/office/drawing/2010/main" val="0"/>
+              </a:ext>
+            </a:extLst>
+          </a:blip>
+          <a:stretch>
+            <a:fillRect/>
+          </a:stretch>
+        </p:blipFill>
+        <p:spPr>
+          <a:xfrm>
+            <a:off x="3386752" y="3923806"/>
+            <a:ext cx="2694062" cy="1796041"/>
+          </a:xfrm>
+          <a:prstGeom prst="rect">
+            <a:avLst/>
+          </a:prstGeom>
+          <a:solidFill>
+            <a:srgbClr val="FFFFFF">
+              <a:shade val="85000"/>
+            </a:srgbClr>
+          </a:solidFill>
+          <a:ln w="190500" cap="rnd">
+            <a:solidFill>
+              <a:srgbClr val="FFFFFF"/>
+            </a:solidFill>
+          </a:ln>
+          <a:effectLst>
+            <a:outerShdw blurRad="50000" algn="tl" rotWithShape="0">
+              <a:srgbClr val="000000">
+                <a:alpha val="41000"/>
+              </a:srgbClr>
+            </a:outerShdw>
+          </a:effectLst>
+          <a:scene3d>
+            <a:camera prst="orthographicFront"/>
+            <a:lightRig rig="twoPt" dir="t">
+              <a:rot lat="0" lon="0" rev="7800000"/>
+            </a:lightRig>
+          </a:scene3d>
+          <a:sp3d contourW="6350">
+            <a:bevelT w="50800" h="16510"/>
+            <a:contourClr>
+              <a:srgbClr val="C0C0C0"/>
+            </a:contourClr>
+          </a:sp3d>
+        </p:spPr>
+      </p:pic>
+      <p:sp>
+        <p:nvSpPr>
+          <p:cNvPr id="6" name="Title 7">
+            <a:extLst>
+              <a:ext uri="{FF2B5EF4-FFF2-40B4-BE49-F238E27FC236}">
+                <a16:creationId xmlns:a16="http://schemas.microsoft.com/office/drawing/2014/main" id="{BC8F2E26-F661-4C48-B6E5-B306C5677FA8}"/>
+              </a:ext>
+            </a:extLst>
+          </p:cNvPr>
+          <p:cNvSpPr>
+            <a:spLocks noGrp="1"/>
+          </p:cNvSpPr>
+          <p:nvPr>
+            <p:ph type="title"/>
+          </p:nvPr>
+        </p:nvSpPr>
+        <p:spPr>
+          <a:xfrm>
+            <a:off x="905426" y="-277779"/>
+            <a:ext cx="7886700" cy="1325563"/>
+          </a:xfrm>
+        </p:spPr>
+        <p:txBody>
+          <a:bodyPr>
+            <a:normAutofit/>
+          </a:bodyPr>
+          <a:lstStyle/>
+          <a:p>
+            <a:pPr algn="ctr"/>
+            <a:r>
+              <a:rPr lang="en-US" sz="3200" dirty="0">
+                <a:solidFill>
+                  <a:schemeClr val="accent4"/>
+                </a:solidFill>
+              </a:rPr>
+              <a:t>Death Star vs ALL</a:t>
+            </a:r>
+          </a:p>
+        </p:txBody>
+      </p:sp>
+    </p:spTree>
+    <p:extLst>
+      <p:ext uri="{BB962C8B-B14F-4D97-AF65-F5344CB8AC3E}">
+        <p14:creationId xmlns:p14="http://schemas.microsoft.com/office/powerpoint/2010/main" val="1635379552"/>
+      </p:ext>
+    </p:extLst>
+  </p:cSld>
+  <p:clrMapOvr>
+    <a:masterClrMapping/>
+  </p:clrMapOvr>
+</p:sld>
+</file>
+
+<file path=ppt/slides/slide12.xml><?xml version="1.0" encoding="utf-8"?>
+<p:sld xmlns:a="http://schemas.openxmlformats.org/drawingml/2006/main" xmlns:r="http://schemas.openxmlformats.org/officeDocument/2006/relationships" xmlns:p="http://schemas.openxmlformats.org/presentationml/2006/main">
+  <p:cSld>
+    <p:spTree>
+      <p:nvGrpSpPr>
+        <p:cNvPr id="1" name=""/>
+        <p:cNvGrpSpPr/>
+        <p:nvPr/>
+      </p:nvGrpSpPr>
+      <p:grpSpPr>
+        <a:xfrm>
+          <a:off x="0" y="0"/>
+          <a:ext cx="0" cy="0"/>
+          <a:chOff x="0" y="0"/>
+          <a:chExt cx="0" cy="0"/>
+        </a:xfrm>
+      </p:grpSpPr>
+      <p:sp>
+        <p:nvSpPr>
+          <p:cNvPr id="2" name="Title 1">
+            <a:extLst>
+              <a:ext uri="{FF2B5EF4-FFF2-40B4-BE49-F238E27FC236}">
+                <a16:creationId xmlns:a16="http://schemas.microsoft.com/office/drawing/2014/main" id="{A7D9D3DB-5AFF-4B3D-8959-C4AD5A57F8F2}"/>
+              </a:ext>
+            </a:extLst>
+          </p:cNvPr>
+          <p:cNvSpPr>
+            <a:spLocks noGrp="1"/>
+          </p:cNvSpPr>
+          <p:nvPr>
+            <p:ph type="title"/>
+          </p:nvPr>
+        </p:nvSpPr>
+        <p:spPr/>
+        <p:txBody>
+          <a:bodyPr/>
+          <a:lstStyle/>
+          <a:p>
+            <a:r>
+              <a:rPr lang="en-US" b="0" i="0" dirty="0">
+                <a:effectLst/>
+                <a:latin typeface="Arial" panose="020B0604020202020204" pitchFamily="34" charset="0"/>
+              </a:rPr>
+              <a:t>Discussion</a:t>
+            </a:r>
+            <a:endParaRPr lang="en-US" dirty="0"/>
+          </a:p>
+        </p:txBody>
+      </p:sp>
+      <p:sp>
+        <p:nvSpPr>
+          <p:cNvPr id="3" name="Content Placeholder 2">
+            <a:extLst>
+              <a:ext uri="{FF2B5EF4-FFF2-40B4-BE49-F238E27FC236}">
+                <a16:creationId xmlns:a16="http://schemas.microsoft.com/office/drawing/2014/main" id="{8F1F63A0-CEFB-498B-8C98-DCC49267C229}"/>
+              </a:ext>
+            </a:extLst>
+          </p:cNvPr>
+          <p:cNvSpPr>
+            <a:spLocks noGrp="1"/>
+          </p:cNvSpPr>
+          <p:nvPr>
+            <p:ph idx="1"/>
+          </p:nvPr>
+        </p:nvSpPr>
+        <p:spPr>
+          <a:xfrm>
+            <a:off x="628650" y="1825625"/>
+            <a:ext cx="7886700" cy="4289830"/>
+          </a:xfrm>
+        </p:spPr>
+        <p:txBody>
+          <a:bodyPr>
+            <a:normAutofit fontScale="85000" lnSpcReduction="20000"/>
+          </a:bodyPr>
+          <a:lstStyle/>
+          <a:p>
+            <a:pPr algn="l"/>
+            <a:r>
+              <a:rPr lang="en-US" b="0" i="0" dirty="0">
+                <a:effectLst/>
+                <a:latin typeface="Arial" panose="020B0604020202020204" pitchFamily="34" charset="0"/>
+              </a:rPr>
+              <a:t>It’s difficult to quantify creativity</a:t>
+            </a:r>
+          </a:p>
+          <a:p>
+            <a:pPr lvl="1"/>
+            <a:r>
+              <a:rPr lang="en-US" b="0" i="0" dirty="0">
+                <a:effectLst/>
+                <a:latin typeface="Arial" panose="020B0604020202020204" pitchFamily="34" charset="0"/>
+              </a:rPr>
+              <a:t>Regression towards the mean might be a norm</a:t>
+            </a:r>
+          </a:p>
+          <a:p>
+            <a:pPr marL="0" indent="0" algn="l">
+              <a:buNone/>
+            </a:pPr>
+            <a:endParaRPr lang="en-US" dirty="0">
+              <a:latin typeface="Arial" panose="020B0604020202020204" pitchFamily="34" charset="0"/>
+            </a:endParaRPr>
+          </a:p>
+          <a:p>
+            <a:pPr algn="l"/>
+            <a:r>
+              <a:rPr lang="en-US" b="0" i="0" dirty="0">
+                <a:effectLst/>
+                <a:latin typeface="Arial" panose="020B0604020202020204" pitchFamily="34" charset="0"/>
+              </a:rPr>
+              <a:t>The same data can be displayed in different ways and interpreted differently by different people</a:t>
+            </a:r>
+          </a:p>
+          <a:p>
+            <a:pPr algn="l"/>
+            <a:endParaRPr lang="en-US" b="0" i="0" dirty="0">
+              <a:effectLst/>
+              <a:latin typeface="Arial" panose="020B0604020202020204" pitchFamily="34" charset="0"/>
+            </a:endParaRPr>
+          </a:p>
+          <a:p>
+            <a:r>
+              <a:rPr lang="en-US" b="0" i="0" dirty="0">
+                <a:effectLst/>
+                <a:latin typeface="Arial" panose="020B0604020202020204" pitchFamily="34" charset="0"/>
+              </a:rPr>
+              <a:t>Jabba is massive. The Death Star is </a:t>
+            </a:r>
+            <a:r>
+              <a:rPr lang="en-US" b="0" i="0" dirty="0" err="1">
+                <a:effectLst/>
+                <a:latin typeface="Arial" panose="020B0604020202020204" pitchFamily="34" charset="0"/>
+              </a:rPr>
+              <a:t>massiver</a:t>
+            </a:r>
+            <a:endParaRPr lang="en-US" b="0" i="0" dirty="0">
+              <a:effectLst/>
+              <a:latin typeface="Arial" panose="020B0604020202020204" pitchFamily="34" charset="0"/>
+            </a:endParaRPr>
+          </a:p>
+          <a:p>
+            <a:pPr algn="l"/>
+            <a:endParaRPr lang="en-US" b="0" i="0" dirty="0">
+              <a:effectLst/>
+              <a:latin typeface="Arial" panose="020B0604020202020204" pitchFamily="34" charset="0"/>
+            </a:endParaRPr>
+          </a:p>
+          <a:p>
+            <a:pPr algn="l"/>
+            <a:r>
+              <a:rPr lang="en-US" b="0" i="0" dirty="0">
+                <a:effectLst/>
+                <a:latin typeface="Arial" panose="020B0604020202020204" pitchFamily="34" charset="0"/>
+              </a:rPr>
+              <a:t>The Death Star had to be stopped by any means necessary</a:t>
+            </a:r>
+          </a:p>
+          <a:p>
+            <a:pPr lvl="1"/>
+            <a:r>
+              <a:rPr lang="en-US" dirty="0">
+                <a:latin typeface="Arial" panose="020B0604020202020204" pitchFamily="34" charset="0"/>
+              </a:rPr>
+              <a:t>Resources</a:t>
+            </a:r>
+          </a:p>
+          <a:p>
+            <a:pPr lvl="1"/>
+            <a:r>
+              <a:rPr lang="en-US" dirty="0">
+                <a:latin typeface="Arial" panose="020B0604020202020204" pitchFamily="34" charset="0"/>
+              </a:rPr>
+              <a:t>Control</a:t>
+            </a:r>
+            <a:endParaRPr lang="en-US" b="0" i="0" dirty="0">
+              <a:effectLst/>
+              <a:latin typeface="Arial" panose="020B0604020202020204" pitchFamily="34" charset="0"/>
+            </a:endParaRPr>
+          </a:p>
+        </p:txBody>
+      </p:sp>
+    </p:spTree>
+    <p:extLst>
+      <p:ext uri="{BB962C8B-B14F-4D97-AF65-F5344CB8AC3E}">
+        <p14:creationId xmlns:p14="http://schemas.microsoft.com/office/powerpoint/2010/main" val="3124462524"/>
+      </p:ext>
+    </p:extLst>
+  </p:cSld>
+  <p:clrMapOvr>
+    <a:masterClrMapping/>
+  </p:clrMapOvr>
+</p:sld>
+</file>
+
+<file path=ppt/slides/slide13.xml><?xml version="1.0" encoding="utf-8"?>
+<p:sld xmlns:a="http://schemas.openxmlformats.org/drawingml/2006/main" xmlns:r="http://schemas.openxmlformats.org/officeDocument/2006/relationships" xmlns:p="http://schemas.openxmlformats.org/presentationml/2006/main">
+  <p:cSld>
+    <p:spTree>
+      <p:nvGrpSpPr>
+        <p:cNvPr id="1" name=""/>
+        <p:cNvGrpSpPr/>
+        <p:nvPr/>
+      </p:nvGrpSpPr>
+      <p:grpSpPr>
+        <a:xfrm>
+          <a:off x="0" y="0"/>
+          <a:ext cx="0" cy="0"/>
+          <a:chOff x="0" y="0"/>
+          <a:chExt cx="0" cy="0"/>
+        </a:xfrm>
+      </p:grpSpPr>
+      <p:sp>
+        <p:nvSpPr>
+          <p:cNvPr id="2" name="Title 1">
+            <a:extLst>
+              <a:ext uri="{FF2B5EF4-FFF2-40B4-BE49-F238E27FC236}">
+                <a16:creationId xmlns:a16="http://schemas.microsoft.com/office/drawing/2014/main" id="{696D524F-CB30-4DD1-84F0-832C7659D8E2}"/>
+              </a:ext>
+            </a:extLst>
+          </p:cNvPr>
+          <p:cNvSpPr>
+            <a:spLocks noGrp="1"/>
+          </p:cNvSpPr>
+          <p:nvPr>
+            <p:ph type="title"/>
+          </p:nvPr>
+        </p:nvSpPr>
+        <p:spPr/>
+        <p:txBody>
+          <a:bodyPr/>
+          <a:lstStyle/>
+          <a:p>
+            <a:r>
+              <a:rPr lang="en-US" b="0" i="0" dirty="0">
+                <a:effectLst/>
+                <a:latin typeface="Arial" panose="020B0604020202020204" pitchFamily="34" charset="0"/>
+              </a:rPr>
+              <a:t>Post Mortem</a:t>
+            </a:r>
+            <a:endParaRPr lang="en-US" dirty="0"/>
+          </a:p>
+        </p:txBody>
+      </p:sp>
+      <p:sp>
+        <p:nvSpPr>
+          <p:cNvPr id="3" name="Content Placeholder 2">
+            <a:extLst>
+              <a:ext uri="{FF2B5EF4-FFF2-40B4-BE49-F238E27FC236}">
+                <a16:creationId xmlns:a16="http://schemas.microsoft.com/office/drawing/2014/main" id="{3489960F-3DA4-445A-9D54-ACBF52BABEA4}"/>
+              </a:ext>
+            </a:extLst>
+          </p:cNvPr>
+          <p:cNvSpPr>
+            <a:spLocks noGrp="1"/>
+          </p:cNvSpPr>
+          <p:nvPr>
+            <p:ph idx="1"/>
+          </p:nvPr>
+        </p:nvSpPr>
+        <p:spPr>
+          <a:xfrm>
+            <a:off x="628650" y="1825625"/>
+            <a:ext cx="8301990" cy="4351338"/>
+          </a:xfrm>
+        </p:spPr>
+        <p:txBody>
+          <a:bodyPr>
+            <a:normAutofit fontScale="92500" lnSpcReduction="10000"/>
+          </a:bodyPr>
+          <a:lstStyle/>
+          <a:p>
+            <a:pPr algn="l"/>
+            <a:r>
+              <a:rPr lang="en-US" b="0" i="0" dirty="0">
+                <a:effectLst/>
+                <a:latin typeface="Arial" panose="020B0604020202020204" pitchFamily="34" charset="0"/>
+              </a:rPr>
+              <a:t>Difficulties:</a:t>
+            </a:r>
+          </a:p>
+          <a:p>
+            <a:pPr lvl="1"/>
+            <a:r>
+              <a:rPr lang="en-US" dirty="0">
+                <a:latin typeface="Arial" panose="020B0604020202020204" pitchFamily="34" charset="0"/>
+              </a:rPr>
+              <a:t>Lack of data</a:t>
+            </a:r>
+          </a:p>
+          <a:p>
+            <a:pPr lvl="1"/>
+            <a:r>
+              <a:rPr lang="en-US" b="0" i="0" dirty="0">
+                <a:effectLst/>
+                <a:latin typeface="Arial" panose="020B0604020202020204" pitchFamily="34" charset="0"/>
+              </a:rPr>
+              <a:t>Incomplete data</a:t>
+            </a:r>
+          </a:p>
+          <a:p>
+            <a:pPr lvl="1"/>
+            <a:r>
+              <a:rPr lang="en-US" dirty="0">
+                <a:latin typeface="Arial" panose="020B0604020202020204" pitchFamily="34" charset="0"/>
+              </a:rPr>
+              <a:t>Only the first 6 movies</a:t>
+            </a:r>
+          </a:p>
+          <a:p>
+            <a:pPr lvl="1"/>
+            <a:r>
+              <a:rPr lang="en-US" dirty="0">
+                <a:latin typeface="Arial" panose="020B0604020202020204" pitchFamily="34" charset="0"/>
+              </a:rPr>
+              <a:t>Certain tasks </a:t>
+            </a:r>
+          </a:p>
+          <a:p>
+            <a:pPr lvl="2"/>
+            <a:r>
+              <a:rPr lang="en-US" b="0" i="0" dirty="0">
+                <a:effectLst/>
+                <a:latin typeface="Arial" panose="020B0604020202020204" pitchFamily="34" charset="0"/>
+              </a:rPr>
+              <a:t>Cleaning certain items with Pandas – used CSV</a:t>
+            </a:r>
+          </a:p>
+          <a:p>
+            <a:pPr lvl="2"/>
+            <a:r>
+              <a:rPr lang="en-US" b="0" i="0" dirty="0">
+                <a:effectLst/>
+                <a:latin typeface="Arial" panose="020B0604020202020204" pitchFamily="34" charset="0"/>
+              </a:rPr>
+              <a:t>Exporting figures with correct sizes</a:t>
+            </a:r>
+          </a:p>
+          <a:p>
+            <a:pPr algn="l"/>
+            <a:r>
+              <a:rPr lang="en-US" b="0" i="0" dirty="0">
+                <a:effectLst/>
+                <a:latin typeface="Arial" panose="020B0604020202020204" pitchFamily="34" charset="0"/>
+              </a:rPr>
+              <a:t>With two more weeks: </a:t>
+            </a:r>
+          </a:p>
+          <a:p>
+            <a:pPr lvl="1"/>
+            <a:r>
+              <a:rPr lang="en-US" b="0" i="0" dirty="0" err="1">
+                <a:effectLst/>
+                <a:latin typeface="Arial" panose="020B0604020202020204" pitchFamily="34" charset="0"/>
+              </a:rPr>
+              <a:t>Fullly</a:t>
+            </a:r>
+            <a:r>
+              <a:rPr lang="en-US" b="0" i="0" dirty="0">
+                <a:effectLst/>
+                <a:latin typeface="Arial" panose="020B0604020202020204" pitchFamily="34" charset="0"/>
+              </a:rPr>
+              <a:t> Merged with pivot table for ship captains, planets, </a:t>
+            </a:r>
+            <a:r>
+              <a:rPr lang="en-US" b="0" i="0" dirty="0" err="1">
+                <a:effectLst/>
+                <a:latin typeface="Arial" panose="020B0604020202020204" pitchFamily="34" charset="0"/>
+              </a:rPr>
+              <a:t>etc</a:t>
+            </a:r>
+            <a:endParaRPr lang="en-US" b="0" i="0" dirty="0">
+              <a:effectLst/>
+              <a:latin typeface="Arial" panose="020B0604020202020204" pitchFamily="34" charset="0"/>
+            </a:endParaRPr>
+          </a:p>
+          <a:p>
+            <a:pPr lvl="1"/>
+            <a:r>
+              <a:rPr lang="en-US" b="0" i="0" dirty="0">
+                <a:effectLst/>
+                <a:latin typeface="Arial" panose="020B0604020202020204" pitchFamily="34" charset="0"/>
+              </a:rPr>
+              <a:t>Spoken word counts versus screen time</a:t>
+            </a:r>
+          </a:p>
+          <a:p>
+            <a:pPr lvl="1"/>
+            <a:r>
+              <a:rPr lang="en-US" dirty="0">
+                <a:latin typeface="Arial" panose="020B0604020202020204" pitchFamily="34" charset="0"/>
+              </a:rPr>
+              <a:t>Cost of creating the Death Star</a:t>
+            </a:r>
+          </a:p>
+          <a:p>
+            <a:pPr lvl="1"/>
+            <a:r>
+              <a:rPr lang="en-US" b="0" i="0" dirty="0">
+                <a:effectLst/>
+                <a:latin typeface="Arial" panose="020B0604020202020204" pitchFamily="34" charset="0"/>
+              </a:rPr>
+              <a:t>Size of Death Star versus</a:t>
+            </a:r>
+            <a:r>
+              <a:rPr lang="en-US" dirty="0">
+                <a:latin typeface="Arial" panose="020B0604020202020204" pitchFamily="34" charset="0"/>
+              </a:rPr>
+              <a:t> real Spaceships</a:t>
+            </a:r>
+          </a:p>
+          <a:p>
+            <a:pPr lvl="1"/>
+            <a:endParaRPr lang="en-US" b="0" i="0" dirty="0">
+              <a:effectLst/>
+              <a:latin typeface="Arial" panose="020B0604020202020204" pitchFamily="34" charset="0"/>
+            </a:endParaRPr>
+          </a:p>
+          <a:p>
+            <a:endParaRPr lang="en-US" dirty="0"/>
+          </a:p>
+        </p:txBody>
+      </p:sp>
+    </p:spTree>
+    <p:extLst>
+      <p:ext uri="{BB962C8B-B14F-4D97-AF65-F5344CB8AC3E}">
+        <p14:creationId xmlns:p14="http://schemas.microsoft.com/office/powerpoint/2010/main" val="3263556886"/>
+      </p:ext>
+    </p:extLst>
+  </p:cSld>
+  <p:clrMapOvr>
+    <a:masterClrMapping/>
+  </p:clrMapOvr>
+</p:sld>
+</file>
+
+<file path=ppt/slides/slide14.xml><?xml version="1.0" encoding="utf-8"?>
+<p:sld xmlns:a="http://schemas.openxmlformats.org/drawingml/2006/main" xmlns:r="http://schemas.openxmlformats.org/officeDocument/2006/relationships" xmlns:p="http://schemas.openxmlformats.org/presentationml/2006/main">
+  <p:cSld>
+    <p:spTree>
+      <p:nvGrpSpPr>
+        <p:cNvPr id="1" name=""/>
+        <p:cNvGrpSpPr/>
+        <p:nvPr/>
+      </p:nvGrpSpPr>
+      <p:grpSpPr>
+        <a:xfrm>
+          <a:off x="0" y="0"/>
+          <a:ext cx="0" cy="0"/>
+          <a:chOff x="0" y="0"/>
+          <a:chExt cx="0" cy="0"/>
+        </a:xfrm>
+      </p:grpSpPr>
+      <p:sp>
+        <p:nvSpPr>
+          <p:cNvPr id="2" name="Title 1">
+            <a:extLst>
+              <a:ext uri="{FF2B5EF4-FFF2-40B4-BE49-F238E27FC236}">
+                <a16:creationId xmlns:a16="http://schemas.microsoft.com/office/drawing/2014/main" id="{CB62222F-9F91-4C07-B3E1-9F250E4A75DC}"/>
+              </a:ext>
+            </a:extLst>
+          </p:cNvPr>
+          <p:cNvSpPr>
+            <a:spLocks noGrp="1"/>
+          </p:cNvSpPr>
+          <p:nvPr>
+            <p:ph type="title"/>
+          </p:nvPr>
+        </p:nvSpPr>
+        <p:spPr/>
+        <p:txBody>
+          <a:bodyPr/>
+          <a:lstStyle/>
+          <a:p>
+            <a:r>
+              <a:rPr lang="en-US" dirty="0"/>
+              <a:t>Questions?</a:t>
+            </a:r>
+          </a:p>
+        </p:txBody>
+      </p:sp>
+    </p:spTree>
+    <p:extLst>
+      <p:ext uri="{BB962C8B-B14F-4D97-AF65-F5344CB8AC3E}">
+        <p14:creationId xmlns:p14="http://schemas.microsoft.com/office/powerpoint/2010/main" val="1130841422"/>
+      </p:ext>
+    </p:extLst>
+  </p:cSld>
+  <p:clrMapOvr>
+    <a:masterClrMapping/>
+  </p:clrMapOvr>
+</p:sld>
+</file>
+
+<file path=ppt/slides/slide2.xml><?xml version="1.0" encoding="utf-8"?>
+<p:sld xmlns:a="http://schemas.openxmlformats.org/drawingml/2006/main" xmlns:r="http://schemas.openxmlformats.org/officeDocument/2006/relationships" xmlns:p="http://schemas.openxmlformats.org/presentationml/2006/main">
+  <p:cSld>
+    <p:spTree>
+      <p:nvGrpSpPr>
+        <p:cNvPr id="1" name=""/>
+        <p:cNvGrpSpPr/>
+        <p:nvPr/>
+      </p:nvGrpSpPr>
+      <p:grpSpPr>
+        <a:xfrm>
+          <a:off x="0" y="0"/>
+          <a:ext cx="0" cy="0"/>
+          <a:chOff x="0" y="0"/>
+          <a:chExt cx="0" cy="0"/>
+        </a:xfrm>
+      </p:grpSpPr>
+      <p:sp>
+        <p:nvSpPr>
+          <p:cNvPr id="2" name="Title 1">
+            <a:extLst>
+              <a:ext uri="{FF2B5EF4-FFF2-40B4-BE49-F238E27FC236}">
+                <a16:creationId xmlns:a16="http://schemas.microsoft.com/office/drawing/2014/main" id="{465CBC63-FAD1-4D71-B2F3-D1AD363C778D}"/>
+              </a:ext>
+            </a:extLst>
+          </p:cNvPr>
+          <p:cNvSpPr>
+            <a:spLocks noGrp="1"/>
+          </p:cNvSpPr>
+          <p:nvPr>
+            <p:ph type="title"/>
+          </p:nvPr>
+        </p:nvSpPr>
+        <p:spPr>
+          <a:xfrm>
+            <a:off x="628650" y="112206"/>
+            <a:ext cx="7886700" cy="1325563"/>
+          </a:xfrm>
+        </p:spPr>
+        <p:txBody>
+          <a:bodyPr>
+            <a:normAutofit fontScale="90000"/>
+          </a:bodyPr>
+          <a:lstStyle/>
+          <a:p>
+            <a:pPr algn="ctr"/>
+            <a:r>
+              <a:rPr lang="en-US" dirty="0">
+                <a:solidFill>
+                  <a:schemeClr val="accent4"/>
+                </a:solidFill>
+              </a:rPr>
+              <a:t>An analytical and statistical analysis of the creativity behind STAR WARS</a:t>
+            </a:r>
+          </a:p>
+        </p:txBody>
+      </p:sp>
+      <p:sp>
+        <p:nvSpPr>
+          <p:cNvPr id="3" name="Content Placeholder 2">
+            <a:extLst>
+              <a:ext uri="{FF2B5EF4-FFF2-40B4-BE49-F238E27FC236}">
+                <a16:creationId xmlns:a16="http://schemas.microsoft.com/office/drawing/2014/main" id="{4029D751-62AD-4741-84DD-FB67E022BF5D}"/>
+              </a:ext>
+            </a:extLst>
+          </p:cNvPr>
+          <p:cNvSpPr>
+            <a:spLocks noGrp="1"/>
+          </p:cNvSpPr>
+          <p:nvPr>
+            <p:ph idx="1"/>
+          </p:nvPr>
+        </p:nvSpPr>
+        <p:spPr>
+          <a:xfrm>
+            <a:off x="201039" y="1579947"/>
+            <a:ext cx="8806774" cy="5165847"/>
+          </a:xfrm>
+        </p:spPr>
+        <p:txBody>
+          <a:bodyPr>
+            <a:normAutofit fontScale="77500" lnSpcReduction="20000"/>
+          </a:bodyPr>
+          <a:lstStyle/>
+          <a:p>
+            <a:pPr algn="l"/>
+            <a:r>
+              <a:rPr lang="en-US" b="0" i="0" dirty="0">
+                <a:effectLst/>
+                <a:latin typeface="Arial" panose="020B0604020202020204" pitchFamily="34" charset="0"/>
+              </a:rPr>
+              <a:t>What kind of data is available and what kinds of stories can it tell? </a:t>
+            </a:r>
+          </a:p>
+          <a:p>
+            <a:pPr lvl="1"/>
+            <a:r>
+              <a:rPr lang="en-US" b="0" i="0" dirty="0">
+                <a:effectLst/>
+                <a:latin typeface="Arial" panose="020B0604020202020204" pitchFamily="34" charset="0"/>
+              </a:rPr>
+              <a:t>SWAPI</a:t>
+            </a:r>
+          </a:p>
+          <a:p>
+            <a:pPr lvl="1"/>
+            <a:r>
+              <a:rPr lang="en-US" b="0" i="0" dirty="0">
+                <a:effectLst/>
+                <a:latin typeface="Arial" panose="020B0604020202020204" pitchFamily="34" charset="0"/>
+              </a:rPr>
+              <a:t>People, Places, Things? How much of there is it available?</a:t>
+            </a:r>
+          </a:p>
+          <a:p>
+            <a:pPr lvl="1"/>
+            <a:r>
+              <a:rPr lang="en-US" dirty="0">
+                <a:latin typeface="Arial" panose="020B0604020202020204" pitchFamily="34" charset="0"/>
+              </a:rPr>
+              <a:t>Episodes 1-6 only</a:t>
+            </a:r>
+            <a:endParaRPr lang="en-US" b="0" i="0" dirty="0">
+              <a:effectLst/>
+              <a:latin typeface="Arial" panose="020B0604020202020204" pitchFamily="34" charset="0"/>
+            </a:endParaRPr>
+          </a:p>
+          <a:p>
+            <a:pPr algn="l"/>
+            <a:endParaRPr lang="en-US" dirty="0">
+              <a:latin typeface="Arial" panose="020B0604020202020204" pitchFamily="34" charset="0"/>
+            </a:endParaRPr>
+          </a:p>
+          <a:p>
+            <a:pPr algn="l"/>
+            <a:r>
+              <a:rPr lang="en-US" dirty="0">
+                <a:latin typeface="Arial" panose="020B0604020202020204" pitchFamily="34" charset="0"/>
+              </a:rPr>
+              <a:t>Is there a difference in how the data can be viewed or interpreted by the user? </a:t>
+            </a:r>
+          </a:p>
+          <a:p>
+            <a:pPr lvl="1"/>
+            <a:r>
+              <a:rPr lang="en-US" dirty="0">
+                <a:latin typeface="Arial" panose="020B0604020202020204" pitchFamily="34" charset="0"/>
+              </a:rPr>
+              <a:t>Theatrical Release versus Chronological Order?</a:t>
+            </a:r>
+          </a:p>
+          <a:p>
+            <a:pPr lvl="1"/>
+            <a:r>
+              <a:rPr lang="en-US" dirty="0">
+                <a:latin typeface="Arial" panose="020B0604020202020204" pitchFamily="34" charset="0"/>
+              </a:rPr>
+              <a:t>Someone who has seen the films versus someone who has not?</a:t>
+            </a:r>
+          </a:p>
+          <a:p>
+            <a:pPr algn="l"/>
+            <a:endParaRPr lang="en-US" dirty="0">
+              <a:latin typeface="Arial" panose="020B0604020202020204" pitchFamily="34" charset="0"/>
+            </a:endParaRPr>
+          </a:p>
+          <a:p>
+            <a:pPr algn="l"/>
+            <a:r>
+              <a:rPr lang="en-US" dirty="0">
+                <a:latin typeface="Arial" panose="020B0604020202020204" pitchFamily="34" charset="0"/>
+              </a:rPr>
+              <a:t>Are there any funny patterns or trends within the datasets? Between the datasets?</a:t>
+            </a:r>
+          </a:p>
+          <a:p>
+            <a:pPr lvl="1"/>
+            <a:r>
+              <a:rPr lang="en-US" dirty="0">
+                <a:latin typeface="Arial" panose="020B0604020202020204" pitchFamily="34" charset="0"/>
+              </a:rPr>
+              <a:t>Jabba</a:t>
+            </a:r>
+          </a:p>
+          <a:p>
+            <a:pPr algn="l"/>
+            <a:endParaRPr lang="en-US" b="0" i="0" dirty="0">
+              <a:effectLst/>
+              <a:latin typeface="Arial" panose="020B0604020202020204" pitchFamily="34" charset="0"/>
+            </a:endParaRPr>
+          </a:p>
+          <a:p>
+            <a:pPr algn="l"/>
+            <a:r>
+              <a:rPr lang="en-US" b="0" i="0" dirty="0">
+                <a:effectLst/>
+                <a:latin typeface="Arial" panose="020B0604020202020204" pitchFamily="34" charset="0"/>
+              </a:rPr>
+              <a:t>Can creativity be statistically quantified? </a:t>
+            </a:r>
+          </a:p>
+          <a:p>
+            <a:pPr lvl="1"/>
+            <a:r>
+              <a:rPr lang="en-US" b="0" i="0" dirty="0">
+                <a:effectLst/>
+                <a:latin typeface="Arial" panose="020B0604020202020204" pitchFamily="34" charset="0"/>
+              </a:rPr>
+              <a:t>Kind of, maybe? TBD</a:t>
+            </a:r>
+          </a:p>
+          <a:p>
+            <a:endParaRPr lang="en-US" dirty="0"/>
+          </a:p>
+        </p:txBody>
+      </p:sp>
+    </p:spTree>
+    <p:extLst>
+      <p:ext uri="{BB962C8B-B14F-4D97-AF65-F5344CB8AC3E}">
+        <p14:creationId xmlns:p14="http://schemas.microsoft.com/office/powerpoint/2010/main" val="1362748197"/>
+      </p:ext>
+    </p:extLst>
+  </p:cSld>
+  <p:clrMapOvr>
+    <a:masterClrMapping/>
+  </p:clrMapOvr>
+</p:sld>
+</file>
+
+<file path=ppt/slides/slide3.xml><?xml version="1.0" encoding="utf-8"?>
+<p:sld xmlns:a="http://schemas.openxmlformats.org/drawingml/2006/main" xmlns:r="http://schemas.openxmlformats.org/officeDocument/2006/relationships" xmlns:p="http://schemas.openxmlformats.org/presentationml/2006/main">
+  <p:cSld>
+    <p:spTree>
+      <p:nvGrpSpPr>
+        <p:cNvPr id="1" name=""/>
+        <p:cNvGrpSpPr/>
+        <p:nvPr/>
+      </p:nvGrpSpPr>
+      <p:grpSpPr>
+        <a:xfrm>
+          <a:off x="0" y="0"/>
+          <a:ext cx="0" cy="0"/>
+          <a:chOff x="0" y="0"/>
+          <a:chExt cx="0" cy="0"/>
+        </a:xfrm>
+      </p:grpSpPr>
+      <p:sp>
+        <p:nvSpPr>
+          <p:cNvPr id="2" name="Title 1">
+            <a:extLst>
+              <a:ext uri="{FF2B5EF4-FFF2-40B4-BE49-F238E27FC236}">
+                <a16:creationId xmlns:a16="http://schemas.microsoft.com/office/drawing/2014/main" id="{FB9873D0-CBEF-4AA9-B7F4-27F093F241E2}"/>
+              </a:ext>
+            </a:extLst>
+          </p:cNvPr>
+          <p:cNvSpPr>
+            <a:spLocks noGrp="1"/>
+          </p:cNvSpPr>
+          <p:nvPr>
+            <p:ph type="title"/>
+          </p:nvPr>
+        </p:nvSpPr>
+        <p:spPr>
+          <a:xfrm>
+            <a:off x="444927" y="-273408"/>
+            <a:ext cx="7886700" cy="1325563"/>
+          </a:xfrm>
+        </p:spPr>
+        <p:txBody>
+          <a:bodyPr/>
+          <a:lstStyle/>
+          <a:p>
+            <a:r>
+              <a:rPr lang="en-US" dirty="0">
+                <a:solidFill>
+                  <a:schemeClr val="accent4"/>
+                </a:solidFill>
+              </a:rPr>
+              <a:t>Data Wrangling </a:t>
+            </a:r>
+          </a:p>
+        </p:txBody>
+      </p:sp>
+      <p:pic>
+        <p:nvPicPr>
+          <p:cNvPr id="4" name="Picture 3">
+            <a:extLst>
+              <a:ext uri="{FF2B5EF4-FFF2-40B4-BE49-F238E27FC236}">
+                <a16:creationId xmlns:a16="http://schemas.microsoft.com/office/drawing/2014/main" id="{4F61CC6F-4C30-4B1F-BBDD-29C10E268F5B}"/>
+              </a:ext>
+            </a:extLst>
+          </p:cNvPr>
+          <p:cNvPicPr>
+            <a:picLocks noChangeAspect="1"/>
+          </p:cNvPicPr>
+          <p:nvPr/>
+        </p:nvPicPr>
+        <p:blipFill>
+          <a:blip r:embed="rId2"/>
+          <a:stretch>
+            <a:fillRect/>
+          </a:stretch>
+        </p:blipFill>
+        <p:spPr>
+          <a:xfrm>
+            <a:off x="64849" y="823610"/>
+            <a:ext cx="4868181" cy="3457490"/>
+          </a:xfrm>
+          <a:prstGeom prst="rect">
+            <a:avLst/>
+          </a:prstGeom>
+        </p:spPr>
+      </p:pic>
+      <p:pic>
+        <p:nvPicPr>
+          <p:cNvPr id="8" name="Picture 7">
+            <a:extLst>
+              <a:ext uri="{FF2B5EF4-FFF2-40B4-BE49-F238E27FC236}">
+                <a16:creationId xmlns:a16="http://schemas.microsoft.com/office/drawing/2014/main" id="{895F07A2-A825-4EEF-A8C7-95560A9530C0}"/>
+              </a:ext>
+            </a:extLst>
+          </p:cNvPr>
+          <p:cNvPicPr>
+            <a:picLocks noChangeAspect="1"/>
+          </p:cNvPicPr>
+          <p:nvPr/>
+        </p:nvPicPr>
+        <p:blipFill>
+          <a:blip r:embed="rId3"/>
+          <a:stretch>
+            <a:fillRect/>
+          </a:stretch>
+        </p:blipFill>
+        <p:spPr>
+          <a:xfrm>
+            <a:off x="60336" y="4684492"/>
+            <a:ext cx="4401417" cy="1861531"/>
+          </a:xfrm>
+          <a:prstGeom prst="rect">
+            <a:avLst/>
+          </a:prstGeom>
+        </p:spPr>
+      </p:pic>
+      <p:pic>
+        <p:nvPicPr>
+          <p:cNvPr id="10" name="Picture 9">
+            <a:extLst>
+              <a:ext uri="{FF2B5EF4-FFF2-40B4-BE49-F238E27FC236}">
+                <a16:creationId xmlns:a16="http://schemas.microsoft.com/office/drawing/2014/main" id="{7AE5839B-5096-460F-986B-5B9DFD0AD729}"/>
+              </a:ext>
+            </a:extLst>
+          </p:cNvPr>
+          <p:cNvPicPr>
+            <a:picLocks noChangeAspect="1"/>
+          </p:cNvPicPr>
+          <p:nvPr/>
+        </p:nvPicPr>
+        <p:blipFill>
+          <a:blip r:embed="rId4"/>
+          <a:stretch>
+            <a:fillRect/>
+          </a:stretch>
+        </p:blipFill>
+        <p:spPr>
+          <a:xfrm>
+            <a:off x="5162145" y="389374"/>
+            <a:ext cx="3536928" cy="4070401"/>
+          </a:xfrm>
+          <a:prstGeom prst="rect">
+            <a:avLst/>
+          </a:prstGeom>
+        </p:spPr>
+      </p:pic>
+      <p:pic>
+        <p:nvPicPr>
+          <p:cNvPr id="11" name="Picture 10">
+            <a:extLst>
+              <a:ext uri="{FF2B5EF4-FFF2-40B4-BE49-F238E27FC236}">
+                <a16:creationId xmlns:a16="http://schemas.microsoft.com/office/drawing/2014/main" id="{4390AAC4-B148-4778-A4BC-7084A4452663}"/>
+              </a:ext>
+            </a:extLst>
+          </p:cNvPr>
+          <p:cNvPicPr>
+            <a:picLocks noChangeAspect="1"/>
+          </p:cNvPicPr>
+          <p:nvPr/>
+        </p:nvPicPr>
+        <p:blipFill>
+          <a:blip r:embed="rId5"/>
+          <a:stretch>
+            <a:fillRect/>
+          </a:stretch>
+        </p:blipFill>
+        <p:spPr>
+          <a:xfrm>
+            <a:off x="4772328" y="4663682"/>
+            <a:ext cx="4311336" cy="2009492"/>
+          </a:xfrm>
+          <a:prstGeom prst="rect">
+            <a:avLst/>
+          </a:prstGeom>
+        </p:spPr>
+      </p:pic>
+      <p:sp>
+        <p:nvSpPr>
+          <p:cNvPr id="12" name="Arrow: Right 11">
+            <a:extLst>
+              <a:ext uri="{FF2B5EF4-FFF2-40B4-BE49-F238E27FC236}">
+                <a16:creationId xmlns:a16="http://schemas.microsoft.com/office/drawing/2014/main" id="{93B82384-C108-40BD-A473-EEBA6EAD0277}"/>
+              </a:ext>
+            </a:extLst>
+          </p:cNvPr>
+          <p:cNvSpPr/>
+          <p:nvPr/>
+        </p:nvSpPr>
+        <p:spPr>
+          <a:xfrm rot="5400000">
+            <a:off x="2253430" y="4398738"/>
+            <a:ext cx="343712" cy="147306"/>
+          </a:xfrm>
+          <a:prstGeom prst="rightArrow">
+            <a:avLst/>
+          </a:prstGeom>
+        </p:spPr>
+        <p:style>
+          <a:lnRef idx="2">
+            <a:schemeClr val="accent1">
+              <a:shade val="50000"/>
+            </a:schemeClr>
+          </a:lnRef>
+          <a:fillRef idx="1">
+            <a:schemeClr val="accent1"/>
+          </a:fillRef>
+          <a:effectRef idx="0">
+            <a:schemeClr val="accent1"/>
+          </a:effectRef>
+          <a:fontRef idx="minor">
+            <a:schemeClr val="lt1"/>
+          </a:fontRef>
+        </p:style>
+        <p:txBody>
+          <a:bodyPr rtlCol="0" anchor="ctr"/>
+          <a:lstStyle/>
+          <a:p>
+            <a:pPr algn="ctr"/>
+            <a:endParaRPr lang="en-US"/>
+          </a:p>
+        </p:txBody>
+      </p:sp>
+      <p:sp>
+        <p:nvSpPr>
+          <p:cNvPr id="13" name="Arrow: Right 12">
+            <a:extLst>
+              <a:ext uri="{FF2B5EF4-FFF2-40B4-BE49-F238E27FC236}">
+                <a16:creationId xmlns:a16="http://schemas.microsoft.com/office/drawing/2014/main" id="{204FB4AC-6973-4A89-84E9-2B28D0FC8D03}"/>
+              </a:ext>
+            </a:extLst>
+          </p:cNvPr>
+          <p:cNvSpPr/>
+          <p:nvPr/>
+        </p:nvSpPr>
+        <p:spPr>
+          <a:xfrm rot="5400000">
+            <a:off x="6682487" y="4379303"/>
+            <a:ext cx="343712" cy="147306"/>
+          </a:xfrm>
+          <a:prstGeom prst="rightArrow">
+            <a:avLst/>
+          </a:prstGeom>
+        </p:spPr>
+        <p:style>
+          <a:lnRef idx="2">
+            <a:schemeClr val="accent1">
+              <a:shade val="50000"/>
+            </a:schemeClr>
+          </a:lnRef>
+          <a:fillRef idx="1">
+            <a:schemeClr val="accent1"/>
+          </a:fillRef>
+          <a:effectRef idx="0">
+            <a:schemeClr val="accent1"/>
+          </a:effectRef>
+          <a:fontRef idx="minor">
+            <a:schemeClr val="lt1"/>
+          </a:fontRef>
+        </p:style>
+        <p:txBody>
+          <a:bodyPr rtlCol="0" anchor="ctr"/>
+          <a:lstStyle/>
+          <a:p>
+            <a:pPr algn="ctr"/>
+            <a:endParaRPr lang="en-US"/>
+          </a:p>
+        </p:txBody>
+      </p:sp>
+    </p:spTree>
+    <p:extLst>
+      <p:ext uri="{BB962C8B-B14F-4D97-AF65-F5344CB8AC3E}">
+        <p14:creationId xmlns:p14="http://schemas.microsoft.com/office/powerpoint/2010/main" val="3876159308"/>
+      </p:ext>
+    </p:extLst>
+  </p:cSld>
+  <p:clrMapOvr>
+    <a:masterClrMapping/>
+  </p:clrMapOvr>
+</p:sld>
+</file>
+
+<file path=ppt/slides/slide4.xml><?xml version="1.0" encoding="utf-8"?>
+<p:sld xmlns:a="http://schemas.openxmlformats.org/drawingml/2006/main" xmlns:r="http://schemas.openxmlformats.org/officeDocument/2006/relationships" xmlns:p="http://schemas.openxmlformats.org/presentationml/2006/main">
+  <p:cSld>
+    <p:spTree>
+      <p:nvGrpSpPr>
+        <p:cNvPr id="1" name=""/>
+        <p:cNvGrpSpPr/>
+        <p:nvPr/>
+      </p:nvGrpSpPr>
+      <p:grpSpPr>
+        <a:xfrm>
+          <a:off x="0" y="0"/>
+          <a:ext cx="0" cy="0"/>
+          <a:chOff x="0" y="0"/>
+          <a:chExt cx="0" cy="0"/>
+        </a:xfrm>
+      </p:grpSpPr>
+      <p:sp>
+        <p:nvSpPr>
+          <p:cNvPr id="2" name="Title 1">
+            <a:extLst>
+              <a:ext uri="{FF2B5EF4-FFF2-40B4-BE49-F238E27FC236}">
+                <a16:creationId xmlns:a16="http://schemas.microsoft.com/office/drawing/2014/main" id="{FB9873D0-CBEF-4AA9-B7F4-27F093F241E2}"/>
+              </a:ext>
+            </a:extLst>
+          </p:cNvPr>
+          <p:cNvSpPr>
+            <a:spLocks noGrp="1"/>
+          </p:cNvSpPr>
+          <p:nvPr>
+            <p:ph type="title"/>
+          </p:nvPr>
+        </p:nvSpPr>
+        <p:spPr>
+          <a:xfrm>
+            <a:off x="0" y="-386930"/>
+            <a:ext cx="7886700" cy="1325563"/>
+          </a:xfrm>
+        </p:spPr>
+        <p:txBody>
+          <a:bodyPr/>
+          <a:lstStyle/>
+          <a:p>
+            <a:r>
+              <a:rPr lang="en-US" dirty="0">
+                <a:solidFill>
+                  <a:schemeClr val="accent4"/>
+                </a:solidFill>
+              </a:rPr>
+              <a:t>Data Cleaning </a:t>
+            </a:r>
+            <a:r>
+              <a:rPr lang="en-US" sz="2000" dirty="0">
+                <a:solidFill>
+                  <a:schemeClr val="accent4"/>
+                </a:solidFill>
+              </a:rPr>
+              <a:t>– Exploration, Cleaning, Insights, Problems  </a:t>
+            </a:r>
+            <a:endParaRPr lang="en-US" dirty="0">
+              <a:solidFill>
+                <a:schemeClr val="accent4"/>
+              </a:solidFill>
+            </a:endParaRPr>
+          </a:p>
+        </p:txBody>
+      </p:sp>
+      <p:pic>
+        <p:nvPicPr>
+          <p:cNvPr id="12" name="Picture 11">
+            <a:extLst>
+              <a:ext uri="{FF2B5EF4-FFF2-40B4-BE49-F238E27FC236}">
+                <a16:creationId xmlns:a16="http://schemas.microsoft.com/office/drawing/2014/main" id="{90A3D93B-FEF7-4C8D-A03E-4B34BF00B501}"/>
+              </a:ext>
+            </a:extLst>
+          </p:cNvPr>
+          <p:cNvPicPr>
+            <a:picLocks noChangeAspect="1"/>
+          </p:cNvPicPr>
+          <p:nvPr/>
+        </p:nvPicPr>
+        <p:blipFill>
+          <a:blip r:embed="rId2"/>
+          <a:stretch>
+            <a:fillRect/>
+          </a:stretch>
+        </p:blipFill>
+        <p:spPr>
+          <a:xfrm>
+            <a:off x="254741" y="2405697"/>
+            <a:ext cx="5857890" cy="1736109"/>
+          </a:xfrm>
+          <a:prstGeom prst="rect">
+            <a:avLst/>
+          </a:prstGeom>
+        </p:spPr>
+      </p:pic>
+      <p:pic>
+        <p:nvPicPr>
+          <p:cNvPr id="14" name="Picture 13">
+            <a:extLst>
+              <a:ext uri="{FF2B5EF4-FFF2-40B4-BE49-F238E27FC236}">
+                <a16:creationId xmlns:a16="http://schemas.microsoft.com/office/drawing/2014/main" id="{54C58867-BED5-4479-A3CC-2E9956B7F6E4}"/>
+              </a:ext>
+            </a:extLst>
+          </p:cNvPr>
+          <p:cNvPicPr>
+            <a:picLocks noChangeAspect="1"/>
+          </p:cNvPicPr>
+          <p:nvPr/>
+        </p:nvPicPr>
+        <p:blipFill>
+          <a:blip r:embed="rId3"/>
+          <a:stretch>
+            <a:fillRect/>
+          </a:stretch>
+        </p:blipFill>
+        <p:spPr>
+          <a:xfrm>
+            <a:off x="254741" y="1035675"/>
+            <a:ext cx="5857890" cy="907719"/>
+          </a:xfrm>
+          <a:prstGeom prst="rect">
+            <a:avLst/>
+          </a:prstGeom>
+        </p:spPr>
+      </p:pic>
+      <p:pic>
+        <p:nvPicPr>
+          <p:cNvPr id="16" name="Picture 15">
+            <a:extLst>
+              <a:ext uri="{FF2B5EF4-FFF2-40B4-BE49-F238E27FC236}">
+                <a16:creationId xmlns:a16="http://schemas.microsoft.com/office/drawing/2014/main" id="{ACE25C7E-EFF2-4FA2-A159-9A26C8F84205}"/>
+              </a:ext>
+            </a:extLst>
+          </p:cNvPr>
+          <p:cNvPicPr>
+            <a:picLocks noChangeAspect="1"/>
+          </p:cNvPicPr>
+          <p:nvPr/>
+        </p:nvPicPr>
+        <p:blipFill>
+          <a:blip r:embed="rId4"/>
+          <a:stretch>
+            <a:fillRect/>
+          </a:stretch>
+        </p:blipFill>
+        <p:spPr>
+          <a:xfrm>
+            <a:off x="6371019" y="581858"/>
+            <a:ext cx="2493579" cy="1325563"/>
+          </a:xfrm>
+          <a:prstGeom prst="rect">
+            <a:avLst/>
+          </a:prstGeom>
+        </p:spPr>
+      </p:pic>
+      <p:pic>
+        <p:nvPicPr>
+          <p:cNvPr id="20" name="Picture 19">
+            <a:extLst>
+              <a:ext uri="{FF2B5EF4-FFF2-40B4-BE49-F238E27FC236}">
+                <a16:creationId xmlns:a16="http://schemas.microsoft.com/office/drawing/2014/main" id="{8CA62C4B-F81C-4251-9F72-F7844AC4B7CB}"/>
+              </a:ext>
+            </a:extLst>
+          </p:cNvPr>
+          <p:cNvPicPr>
+            <a:picLocks noChangeAspect="1"/>
+          </p:cNvPicPr>
+          <p:nvPr/>
+        </p:nvPicPr>
+        <p:blipFill>
+          <a:blip r:embed="rId5"/>
+          <a:stretch>
+            <a:fillRect/>
+          </a:stretch>
+        </p:blipFill>
+        <p:spPr>
+          <a:xfrm>
+            <a:off x="254741" y="4877428"/>
+            <a:ext cx="8634518" cy="1518069"/>
+          </a:xfrm>
+          <a:prstGeom prst="rect">
+            <a:avLst/>
+          </a:prstGeom>
+        </p:spPr>
+      </p:pic>
+      <p:pic>
+        <p:nvPicPr>
+          <p:cNvPr id="23" name="Picture 22">
+            <a:extLst>
+              <a:ext uri="{FF2B5EF4-FFF2-40B4-BE49-F238E27FC236}">
+                <a16:creationId xmlns:a16="http://schemas.microsoft.com/office/drawing/2014/main" id="{60AE8177-A23E-45D3-ADF9-A12EBB01B10A}"/>
+              </a:ext>
+            </a:extLst>
+          </p:cNvPr>
+          <p:cNvPicPr>
+            <a:picLocks noChangeAspect="1"/>
+          </p:cNvPicPr>
+          <p:nvPr/>
+        </p:nvPicPr>
+        <p:blipFill>
+          <a:blip r:embed="rId6"/>
+          <a:stretch>
+            <a:fillRect/>
+          </a:stretch>
+        </p:blipFill>
+        <p:spPr>
+          <a:xfrm>
+            <a:off x="6371019" y="2072215"/>
+            <a:ext cx="2493578" cy="1246789"/>
+          </a:xfrm>
+          <a:prstGeom prst="rect">
+            <a:avLst/>
+          </a:prstGeom>
+        </p:spPr>
+      </p:pic>
+      <p:pic>
+        <p:nvPicPr>
+          <p:cNvPr id="25" name="Picture 24">
+            <a:extLst>
+              <a:ext uri="{FF2B5EF4-FFF2-40B4-BE49-F238E27FC236}">
+                <a16:creationId xmlns:a16="http://schemas.microsoft.com/office/drawing/2014/main" id="{6191C59D-7B58-4999-AD6A-899C275377BD}"/>
+              </a:ext>
+            </a:extLst>
+          </p:cNvPr>
+          <p:cNvPicPr>
+            <a:picLocks noChangeAspect="1"/>
+          </p:cNvPicPr>
+          <p:nvPr/>
+        </p:nvPicPr>
+        <p:blipFill>
+          <a:blip r:embed="rId7"/>
+          <a:stretch>
+            <a:fillRect/>
+          </a:stretch>
+        </p:blipFill>
+        <p:spPr>
+          <a:xfrm>
+            <a:off x="6371019" y="3525338"/>
+            <a:ext cx="2493578" cy="1232936"/>
+          </a:xfrm>
+          <a:prstGeom prst="rect">
+            <a:avLst/>
+          </a:prstGeom>
+        </p:spPr>
+      </p:pic>
+    </p:spTree>
+    <p:extLst>
+      <p:ext uri="{BB962C8B-B14F-4D97-AF65-F5344CB8AC3E}">
+        <p14:creationId xmlns:p14="http://schemas.microsoft.com/office/powerpoint/2010/main" val="4130253970"/>
+      </p:ext>
+    </p:extLst>
+  </p:cSld>
+  <p:clrMapOvr>
+    <a:masterClrMapping/>
+  </p:clrMapOvr>
+</p:sld>
+</file>
+
+<file path=ppt/slides/slide5.xml><?xml version="1.0" encoding="utf-8"?>
+<p:sld xmlns:a="http://schemas.openxmlformats.org/drawingml/2006/main" xmlns:r="http://schemas.openxmlformats.org/officeDocument/2006/relationships" xmlns:p="http://schemas.openxmlformats.org/presentationml/2006/main">
+  <p:cSld>
+    <p:spTree>
+      <p:nvGrpSpPr>
+        <p:cNvPr id="1" name=""/>
+        <p:cNvGrpSpPr/>
+        <p:nvPr/>
+      </p:nvGrpSpPr>
+      <p:grpSpPr>
+        <a:xfrm>
+          <a:off x="0" y="0"/>
+          <a:ext cx="0" cy="0"/>
+          <a:chOff x="0" y="0"/>
+          <a:chExt cx="0" cy="0"/>
+        </a:xfrm>
+      </p:grpSpPr>
+      <p:pic>
+        <p:nvPicPr>
+          <p:cNvPr id="5" name="Content Placeholder 4" descr="Chart, histogram&#10;&#10;Description automatically generated">
+            <a:extLst>
+              <a:ext uri="{FF2B5EF4-FFF2-40B4-BE49-F238E27FC236}">
+                <a16:creationId xmlns:a16="http://schemas.microsoft.com/office/drawing/2014/main" id="{FBA4A7BD-4A72-467D-80FC-47428EC74DAA}"/>
+              </a:ext>
+            </a:extLst>
+          </p:cNvPr>
+          <p:cNvPicPr>
+            <a:picLocks noGrp="1" noChangeAspect="1"/>
+          </p:cNvPicPr>
+          <p:nvPr>
+            <p:ph idx="1"/>
+          </p:nvPr>
+        </p:nvPicPr>
+        <p:blipFill>
+          <a:blip r:embed="rId2">
+            <a:extLst>
+              <a:ext uri="{28A0092B-C50C-407E-A947-70E740481C1C}">
+                <a14:useLocalDpi xmlns:a14="http://schemas.microsoft.com/office/drawing/2010/main" val="0"/>
+              </a:ext>
+            </a:extLst>
+          </a:blip>
+          <a:stretch>
+            <a:fillRect/>
+          </a:stretch>
+        </p:blipFill>
+        <p:spPr>
+          <a:xfrm>
+            <a:off x="198501" y="882332"/>
+            <a:ext cx="8746998" cy="5292048"/>
+          </a:xfrm>
+          <a:prstGeom prst="roundRect">
+            <a:avLst>
+              <a:gd name="adj" fmla="val 4167"/>
+            </a:avLst>
+          </a:prstGeom>
+          <a:solidFill>
+            <a:srgbClr val="FFFFFF"/>
+          </a:solidFill>
+          <a:ln w="76200" cap="sq">
+            <a:solidFill>
+              <a:srgbClr val="EAEAEA"/>
+            </a:solidFill>
+            <a:miter lim="800000"/>
+          </a:ln>
+          <a:effectLst>
+            <a:reflection blurRad="12700" stA="33000" endPos="28000" dist="5000" dir="5400000" sy="-100000" algn="bl" rotWithShape="0"/>
+          </a:effectLst>
+          <a:scene3d>
+            <a:camera prst="orthographicFront"/>
+            <a:lightRig rig="threePt" dir="t">
+              <a:rot lat="0" lon="0" rev="2700000"/>
+            </a:lightRig>
+          </a:scene3d>
+          <a:sp3d contourW="6350">
+            <a:bevelT h="38100"/>
+            <a:contourClr>
+              <a:srgbClr val="C0C0C0"/>
+            </a:contourClr>
+          </a:sp3d>
+        </p:spPr>
+      </p:pic>
+      <p:sp>
+        <p:nvSpPr>
+          <p:cNvPr id="6" name="Title 1">
+            <a:extLst>
+              <a:ext uri="{FF2B5EF4-FFF2-40B4-BE49-F238E27FC236}">
+                <a16:creationId xmlns:a16="http://schemas.microsoft.com/office/drawing/2014/main" id="{806ABEF0-5627-4726-9C36-70A9B944F138}"/>
+              </a:ext>
+            </a:extLst>
+          </p:cNvPr>
+          <p:cNvSpPr>
+            <a:spLocks noGrp="1"/>
+          </p:cNvSpPr>
+          <p:nvPr>
+            <p:ph type="title"/>
+          </p:nvPr>
+        </p:nvSpPr>
+        <p:spPr>
+          <a:xfrm>
+            <a:off x="628650" y="-189611"/>
+            <a:ext cx="7886700" cy="1325563"/>
+          </a:xfrm>
+        </p:spPr>
+        <p:txBody>
+          <a:bodyPr/>
+          <a:lstStyle/>
+          <a:p>
+            <a:pPr algn="ctr"/>
+            <a:r>
+              <a:rPr lang="en-US" dirty="0">
+                <a:solidFill>
+                  <a:schemeClr val="accent4"/>
+                </a:solidFill>
+              </a:rPr>
+              <a:t>Data Analysis </a:t>
+            </a:r>
+          </a:p>
+        </p:txBody>
+      </p:sp>
+    </p:spTree>
+    <p:extLst>
+      <p:ext uri="{BB962C8B-B14F-4D97-AF65-F5344CB8AC3E}">
+        <p14:creationId xmlns:p14="http://schemas.microsoft.com/office/powerpoint/2010/main" val="3972083065"/>
+      </p:ext>
+    </p:extLst>
+  </p:cSld>
+  <p:clrMapOvr>
+    <a:masterClrMapping/>
+  </p:clrMapOvr>
+</p:sld>
+</file>
+
+<file path=ppt/slides/slide6.xml><?xml version="1.0" encoding="utf-8"?>
+<p:sld xmlns:a="http://schemas.openxmlformats.org/drawingml/2006/main" xmlns:r="http://schemas.openxmlformats.org/officeDocument/2006/relationships" xmlns:p="http://schemas.openxmlformats.org/presentationml/2006/main">
+  <p:cSld>
+    <p:spTree>
+      <p:nvGrpSpPr>
+        <p:cNvPr id="1" name=""/>
+        <p:cNvGrpSpPr/>
+        <p:nvPr/>
+      </p:nvGrpSpPr>
+      <p:grpSpPr>
+        <a:xfrm>
+          <a:off x="0" y="0"/>
+          <a:ext cx="0" cy="0"/>
+          <a:chOff x="0" y="0"/>
+          <a:chExt cx="0" cy="0"/>
+        </a:xfrm>
+      </p:grpSpPr>
+      <p:sp>
+        <p:nvSpPr>
+          <p:cNvPr id="8" name="Title 7">
+            <a:extLst>
+              <a:ext uri="{FF2B5EF4-FFF2-40B4-BE49-F238E27FC236}">
+                <a16:creationId xmlns:a16="http://schemas.microsoft.com/office/drawing/2014/main" id="{8CC657C8-6C81-419B-8BE0-C4BD2580A827}"/>
+              </a:ext>
+            </a:extLst>
+          </p:cNvPr>
+          <p:cNvSpPr>
+            <a:spLocks noGrp="1"/>
+          </p:cNvSpPr>
+          <p:nvPr>
+            <p:ph type="title"/>
+          </p:nvPr>
+        </p:nvSpPr>
+        <p:spPr>
+          <a:xfrm>
+            <a:off x="628650" y="157603"/>
+            <a:ext cx="7886700" cy="1325563"/>
+          </a:xfrm>
+        </p:spPr>
+        <p:txBody>
+          <a:bodyPr/>
+          <a:lstStyle/>
+          <a:p>
+            <a:pPr algn="ctr"/>
+            <a:r>
+              <a:rPr lang="en-US" dirty="0">
+                <a:solidFill>
+                  <a:schemeClr val="accent4"/>
+                </a:solidFill>
+              </a:rPr>
+              <a:t>Star Wars by Release Order</a:t>
+            </a:r>
+          </a:p>
+        </p:txBody>
+      </p:sp>
+      <p:pic>
+        <p:nvPicPr>
+          <p:cNvPr id="7" name="Content Placeholder 6" descr="Chart&#10;&#10;Description automatically generated">
+            <a:extLst>
+              <a:ext uri="{FF2B5EF4-FFF2-40B4-BE49-F238E27FC236}">
+                <a16:creationId xmlns:a16="http://schemas.microsoft.com/office/drawing/2014/main" id="{D1B7DD48-4555-48C3-950D-799DC4F2090E}"/>
+              </a:ext>
+            </a:extLst>
+          </p:cNvPr>
+          <p:cNvPicPr>
+            <a:picLocks noGrp="1" noChangeAspect="1"/>
+          </p:cNvPicPr>
+          <p:nvPr>
+            <p:ph sz="half" idx="2"/>
+          </p:nvPr>
+        </p:nvPicPr>
+        <p:blipFill>
+          <a:blip r:embed="rId2">
+            <a:extLst>
+              <a:ext uri="{28A0092B-C50C-407E-A947-70E740481C1C}">
+                <a14:useLocalDpi xmlns:a14="http://schemas.microsoft.com/office/drawing/2010/main" val="0"/>
+              </a:ext>
+            </a:extLst>
+          </a:blip>
+          <a:stretch>
+            <a:fillRect/>
+          </a:stretch>
+        </p:blipFill>
+        <p:spPr>
+          <a:xfrm>
+            <a:off x="274893" y="1612703"/>
+            <a:ext cx="4297107" cy="4240568"/>
+          </a:xfrm>
+          <a:prstGeom prst="roundRect">
+            <a:avLst>
+              <a:gd name="adj" fmla="val 4167"/>
+            </a:avLst>
+          </a:prstGeom>
+          <a:solidFill>
+            <a:srgbClr val="FFFFFF"/>
+          </a:solidFill>
+          <a:ln w="76200" cap="sq">
+            <a:solidFill>
+              <a:srgbClr val="EAEAEA"/>
+            </a:solidFill>
+            <a:miter lim="800000"/>
+          </a:ln>
+          <a:effectLst>
+            <a:reflection blurRad="12700" stA="33000" endPos="28000" dist="5000" dir="5400000" sy="-100000" algn="bl" rotWithShape="0"/>
+          </a:effectLst>
+          <a:scene3d>
+            <a:camera prst="orthographicFront"/>
+            <a:lightRig rig="threePt" dir="t">
+              <a:rot lat="0" lon="0" rev="2700000"/>
+            </a:lightRig>
+          </a:scene3d>
+          <a:sp3d contourW="6350">
+            <a:bevelT h="38100"/>
+            <a:contourClr>
+              <a:srgbClr val="C0C0C0"/>
+            </a:contourClr>
+          </a:sp3d>
+        </p:spPr>
+      </p:pic>
+      <p:pic>
+        <p:nvPicPr>
+          <p:cNvPr id="13" name="Content Placeholder 12" descr="Chart, line chart&#10;&#10;Description automatically generated">
+            <a:extLst>
+              <a:ext uri="{FF2B5EF4-FFF2-40B4-BE49-F238E27FC236}">
+                <a16:creationId xmlns:a16="http://schemas.microsoft.com/office/drawing/2014/main" id="{88AAE549-2783-427E-9A21-E2E167DBBE10}"/>
+              </a:ext>
+            </a:extLst>
+          </p:cNvPr>
+          <p:cNvPicPr>
+            <a:picLocks noGrp="1" noChangeAspect="1"/>
+          </p:cNvPicPr>
+          <p:nvPr>
+            <p:ph sz="quarter" idx="4"/>
+          </p:nvPr>
+        </p:nvPicPr>
+        <p:blipFill>
+          <a:blip r:embed="rId3">
+            <a:extLst>
+              <a:ext uri="{28A0092B-C50C-407E-A947-70E740481C1C}">
+                <a14:useLocalDpi xmlns:a14="http://schemas.microsoft.com/office/drawing/2010/main" val="0"/>
+              </a:ext>
+            </a:extLst>
+          </a:blip>
+          <a:stretch>
+            <a:fillRect/>
+          </a:stretch>
+        </p:blipFill>
+        <p:spPr>
+          <a:xfrm>
+            <a:off x="4637522" y="1612702"/>
+            <a:ext cx="4297106" cy="4240567"/>
+          </a:xfrm>
+          <a:prstGeom prst="roundRect">
+            <a:avLst>
+              <a:gd name="adj" fmla="val 4167"/>
+            </a:avLst>
+          </a:prstGeom>
+          <a:solidFill>
+            <a:srgbClr val="FFFFFF"/>
+          </a:solidFill>
+          <a:ln w="76200" cap="sq">
+            <a:solidFill>
+              <a:srgbClr val="EAEAEA"/>
+            </a:solidFill>
+            <a:miter lim="800000"/>
+          </a:ln>
+          <a:effectLst>
+            <a:reflection blurRad="12700" stA="33000" endPos="28000" dist="5000" dir="5400000" sy="-100000" algn="bl" rotWithShape="0"/>
+          </a:effectLst>
+          <a:scene3d>
+            <a:camera prst="orthographicFront"/>
+            <a:lightRig rig="threePt" dir="t">
+              <a:rot lat="0" lon="0" rev="2700000"/>
+            </a:lightRig>
+          </a:scene3d>
+          <a:sp3d contourW="6350">
+            <a:bevelT h="38100"/>
+            <a:contourClr>
+              <a:srgbClr val="C0C0C0"/>
+            </a:contourClr>
+          </a:sp3d>
+        </p:spPr>
+      </p:pic>
+    </p:spTree>
+    <p:extLst>
+      <p:ext uri="{BB962C8B-B14F-4D97-AF65-F5344CB8AC3E}">
+        <p14:creationId xmlns:p14="http://schemas.microsoft.com/office/powerpoint/2010/main" val="2243487975"/>
+      </p:ext>
+    </p:extLst>
+  </p:cSld>
+  <p:clrMapOvr>
+    <a:masterClrMapping/>
+  </p:clrMapOvr>
+</p:sld>
+</file>
+
+<file path=ppt/slides/slide7.xml><?xml version="1.0" encoding="utf-8"?>
+<p:sld xmlns:a="http://schemas.openxmlformats.org/drawingml/2006/main" xmlns:r="http://schemas.openxmlformats.org/officeDocument/2006/relationships" xmlns:p="http://schemas.openxmlformats.org/presentationml/2006/main">
+  <p:cSld>
+    <p:spTree>
+      <p:nvGrpSpPr>
+        <p:cNvPr id="1" name=""/>
+        <p:cNvGrpSpPr/>
+        <p:nvPr/>
+      </p:nvGrpSpPr>
+      <p:grpSpPr>
+        <a:xfrm>
+          <a:off x="0" y="0"/>
+          <a:ext cx="0" cy="0"/>
+          <a:chOff x="0" y="0"/>
+          <a:chExt cx="0" cy="0"/>
+        </a:xfrm>
+      </p:grpSpPr>
+      <p:sp>
+        <p:nvSpPr>
+          <p:cNvPr id="8" name="Title 7">
+            <a:extLst>
+              <a:ext uri="{FF2B5EF4-FFF2-40B4-BE49-F238E27FC236}">
+                <a16:creationId xmlns:a16="http://schemas.microsoft.com/office/drawing/2014/main" id="{8CC657C8-6C81-419B-8BE0-C4BD2580A827}"/>
+              </a:ext>
+            </a:extLst>
+          </p:cNvPr>
+          <p:cNvSpPr>
+            <a:spLocks noGrp="1"/>
+          </p:cNvSpPr>
+          <p:nvPr>
+            <p:ph type="title"/>
+          </p:nvPr>
+        </p:nvSpPr>
+        <p:spPr>
+          <a:xfrm>
+            <a:off x="628650" y="157603"/>
+            <a:ext cx="7886700" cy="1325563"/>
+          </a:xfrm>
+        </p:spPr>
+        <p:txBody>
+          <a:bodyPr/>
+          <a:lstStyle/>
+          <a:p>
+            <a:pPr algn="ctr"/>
+            <a:r>
+              <a:rPr lang="en-US" dirty="0">
+                <a:solidFill>
+                  <a:schemeClr val="accent4"/>
+                </a:solidFill>
+              </a:rPr>
+              <a:t>Star Wars by In Universe Order</a:t>
+            </a:r>
+          </a:p>
+        </p:txBody>
+      </p:sp>
+      <p:pic>
+        <p:nvPicPr>
+          <p:cNvPr id="10" name="Content Placeholder 9" descr="Chart, line chart&#10;&#10;Description automatically generated">
+            <a:extLst>
+              <a:ext uri="{FF2B5EF4-FFF2-40B4-BE49-F238E27FC236}">
+                <a16:creationId xmlns:a16="http://schemas.microsoft.com/office/drawing/2014/main" id="{31186E2D-2BBF-4BFC-9B54-E47D286BB93A}"/>
+              </a:ext>
+            </a:extLst>
+          </p:cNvPr>
+          <p:cNvPicPr>
+            <a:picLocks noGrp="1" noChangeAspect="1"/>
+          </p:cNvPicPr>
+          <p:nvPr>
+            <p:ph sz="quarter" idx="4"/>
+          </p:nvPr>
+        </p:nvPicPr>
+        <p:blipFill>
+          <a:blip r:embed="rId2">
+            <a:extLst>
+              <a:ext uri="{28A0092B-C50C-407E-A947-70E740481C1C}">
+                <a14:useLocalDpi xmlns:a14="http://schemas.microsoft.com/office/drawing/2010/main" val="0"/>
+              </a:ext>
+            </a:extLst>
+          </a:blip>
+          <a:stretch>
+            <a:fillRect/>
+          </a:stretch>
+        </p:blipFill>
+        <p:spPr>
+          <a:xfrm>
+            <a:off x="4747770" y="1578421"/>
+            <a:ext cx="4242662" cy="4309128"/>
+          </a:xfrm>
+          <a:prstGeom prst="roundRect">
+            <a:avLst>
+              <a:gd name="adj" fmla="val 4167"/>
+            </a:avLst>
+          </a:prstGeom>
+          <a:solidFill>
+            <a:srgbClr val="FFFFFF"/>
+          </a:solidFill>
+          <a:ln w="76200" cap="sq">
+            <a:solidFill>
+              <a:srgbClr val="EAEAEA"/>
+            </a:solidFill>
+            <a:miter lim="800000"/>
+          </a:ln>
+          <a:effectLst>
+            <a:reflection blurRad="12700" stA="33000" endPos="28000" dist="5000" dir="5400000" sy="-100000" algn="bl" rotWithShape="0"/>
+          </a:effectLst>
+          <a:scene3d>
+            <a:camera prst="orthographicFront"/>
+            <a:lightRig rig="threePt" dir="t">
+              <a:rot lat="0" lon="0" rev="2700000"/>
+            </a:lightRig>
+          </a:scene3d>
+          <a:sp3d contourW="6350">
+            <a:bevelT h="38100"/>
+            <a:contourClr>
+              <a:srgbClr val="C0C0C0"/>
+            </a:contourClr>
+          </a:sp3d>
+        </p:spPr>
+      </p:pic>
+      <p:pic>
+        <p:nvPicPr>
+          <p:cNvPr id="13" name="Content Placeholder 4" descr="Chart&#10;&#10;Description automatically generated">
+            <a:extLst>
+              <a:ext uri="{FF2B5EF4-FFF2-40B4-BE49-F238E27FC236}">
+                <a16:creationId xmlns:a16="http://schemas.microsoft.com/office/drawing/2014/main" id="{5323E377-6A15-457F-8F39-7418CD508B22}"/>
+              </a:ext>
+            </a:extLst>
+          </p:cNvPr>
+          <p:cNvPicPr>
+            <a:picLocks noChangeAspect="1"/>
+          </p:cNvPicPr>
+          <p:nvPr/>
+        </p:nvPicPr>
+        <p:blipFill>
+          <a:blip r:embed="rId3">
+            <a:extLst>
+              <a:ext uri="{28A0092B-C50C-407E-A947-70E740481C1C}">
+                <a14:useLocalDpi xmlns:a14="http://schemas.microsoft.com/office/drawing/2010/main" val="0"/>
+              </a:ext>
+            </a:extLst>
+          </a:blip>
+          <a:stretch>
+            <a:fillRect/>
+          </a:stretch>
+        </p:blipFill>
+        <p:spPr>
+          <a:xfrm>
+            <a:off x="274893" y="1578420"/>
+            <a:ext cx="4231586" cy="4309129"/>
+          </a:xfrm>
+          <a:prstGeom prst="roundRect">
+            <a:avLst>
+              <a:gd name="adj" fmla="val 4167"/>
+            </a:avLst>
+          </a:prstGeom>
+          <a:solidFill>
+            <a:srgbClr val="FFFFFF"/>
+          </a:solidFill>
+          <a:ln w="76200" cap="sq">
+            <a:solidFill>
+              <a:srgbClr val="EAEAEA"/>
+            </a:solidFill>
+            <a:miter lim="800000"/>
+          </a:ln>
+          <a:effectLst>
+            <a:reflection blurRad="12700" stA="33000" endPos="28000" dist="5000" dir="5400000" sy="-100000" algn="bl" rotWithShape="0"/>
+          </a:effectLst>
+          <a:scene3d>
+            <a:camera prst="orthographicFront"/>
+            <a:lightRig rig="threePt" dir="t">
+              <a:rot lat="0" lon="0" rev="2700000"/>
+            </a:lightRig>
+          </a:scene3d>
+          <a:sp3d contourW="6350">
+            <a:bevelT h="38100"/>
+            <a:contourClr>
+              <a:srgbClr val="C0C0C0"/>
+            </a:contourClr>
+          </a:sp3d>
+        </p:spPr>
+      </p:pic>
+    </p:spTree>
+    <p:extLst>
+      <p:ext uri="{BB962C8B-B14F-4D97-AF65-F5344CB8AC3E}">
+        <p14:creationId xmlns:p14="http://schemas.microsoft.com/office/powerpoint/2010/main" val="1073886237"/>
+      </p:ext>
+    </p:extLst>
+  </p:cSld>
+  <p:clrMapOvr>
+    <a:masterClrMapping/>
+  </p:clrMapOvr>
+</p:sld>
+</file>
+
+<file path=ppt/slides/slide8.xml><?xml version="1.0" encoding="utf-8"?>
+<p:sld xmlns:a="http://schemas.openxmlformats.org/drawingml/2006/main" xmlns:r="http://schemas.openxmlformats.org/officeDocument/2006/relationships" xmlns:p="http://schemas.openxmlformats.org/presentationml/2006/main">
+  <p:cSld>
+    <p:spTree>
+      <p:nvGrpSpPr>
+        <p:cNvPr id="1" name=""/>
+        <p:cNvGrpSpPr/>
+        <p:nvPr/>
+      </p:nvGrpSpPr>
+      <p:grpSpPr>
+        <a:xfrm>
+          <a:off x="0" y="0"/>
+          <a:ext cx="0" cy="0"/>
+          <a:chOff x="0" y="0"/>
+          <a:chExt cx="0" cy="0"/>
+        </a:xfrm>
+      </p:grpSpPr>
+      <p:sp>
+        <p:nvSpPr>
+          <p:cNvPr id="14" name="Title 1">
+            <a:extLst>
+              <a:ext uri="{FF2B5EF4-FFF2-40B4-BE49-F238E27FC236}">
+                <a16:creationId xmlns:a16="http://schemas.microsoft.com/office/drawing/2014/main" id="{8220B38D-804D-4B13-ADBE-3006FCAFB490}"/>
+              </a:ext>
+            </a:extLst>
+          </p:cNvPr>
+          <p:cNvSpPr>
+            <a:spLocks noGrp="1"/>
+          </p:cNvSpPr>
+          <p:nvPr>
+            <p:ph type="title"/>
+          </p:nvPr>
+        </p:nvSpPr>
+        <p:spPr>
+          <a:xfrm>
+            <a:off x="628650" y="-210095"/>
+            <a:ext cx="7886700" cy="1325563"/>
+          </a:xfrm>
+        </p:spPr>
+        <p:txBody>
+          <a:bodyPr/>
+          <a:lstStyle/>
+          <a:p>
+            <a:pPr algn="ctr"/>
+            <a:r>
+              <a:rPr lang="en-US" dirty="0">
+                <a:latin typeface="Arial" panose="020B0604020202020204" pitchFamily="34" charset="0"/>
+              </a:rPr>
+              <a:t>Character Heights</a:t>
+            </a:r>
+            <a:endParaRPr lang="en-US" dirty="0"/>
+          </a:p>
+        </p:txBody>
+      </p:sp>
+      <p:pic>
+        <p:nvPicPr>
+          <p:cNvPr id="8" name="Content Placeholder 7" descr="Chart, bar chart, histogram&#10;&#10;Description automatically generated">
+            <a:extLst>
+              <a:ext uri="{FF2B5EF4-FFF2-40B4-BE49-F238E27FC236}">
+                <a16:creationId xmlns:a16="http://schemas.microsoft.com/office/drawing/2014/main" id="{D2D7FB5E-A8CD-49B9-BB04-C9605346EEEF}"/>
+              </a:ext>
+            </a:extLst>
+          </p:cNvPr>
+          <p:cNvPicPr>
+            <a:picLocks noGrp="1" noChangeAspect="1"/>
+          </p:cNvPicPr>
+          <p:nvPr>
+            <p:ph sz="half" idx="2"/>
+          </p:nvPr>
+        </p:nvPicPr>
+        <p:blipFill>
+          <a:blip r:embed="rId2">
+            <a:extLst>
+              <a:ext uri="{28A0092B-C50C-407E-A947-70E740481C1C}">
+                <a14:useLocalDpi xmlns:a14="http://schemas.microsoft.com/office/drawing/2010/main" val="0"/>
+              </a:ext>
+            </a:extLst>
+          </a:blip>
+          <a:stretch>
+            <a:fillRect/>
+          </a:stretch>
+        </p:blipFill>
+        <p:spPr>
+          <a:xfrm>
+            <a:off x="60163" y="1074655"/>
+            <a:ext cx="6443160" cy="4832370"/>
+          </a:xfrm>
+          <a:prstGeom prst="roundRect">
+            <a:avLst>
+              <a:gd name="adj" fmla="val 4167"/>
+            </a:avLst>
+          </a:prstGeom>
+          <a:solidFill>
+            <a:srgbClr val="FFFFFF"/>
+          </a:solidFill>
+          <a:ln w="76200" cap="sq">
+            <a:solidFill>
+              <a:srgbClr val="EAEAEA"/>
+            </a:solidFill>
+            <a:miter lim="800000"/>
+          </a:ln>
+          <a:effectLst>
+            <a:reflection blurRad="12700" stA="33000" endPos="28000" dist="5000" dir="5400000" sy="-100000" algn="bl" rotWithShape="0"/>
+          </a:effectLst>
+          <a:scene3d>
+            <a:camera prst="orthographicFront"/>
+            <a:lightRig rig="threePt" dir="t">
+              <a:rot lat="0" lon="0" rev="2700000"/>
+            </a:lightRig>
+          </a:scene3d>
+          <a:sp3d contourW="6350">
+            <a:bevelT h="38100"/>
+            <a:contourClr>
+              <a:srgbClr val="C0C0C0"/>
+            </a:contourClr>
+          </a:sp3d>
+        </p:spPr>
+      </p:pic>
+      <p:pic>
+        <p:nvPicPr>
+          <p:cNvPr id="19" name="Content Placeholder 18" descr="Chart, histogram&#10;&#10;Description automatically generated">
+            <a:extLst>
+              <a:ext uri="{FF2B5EF4-FFF2-40B4-BE49-F238E27FC236}">
+                <a16:creationId xmlns:a16="http://schemas.microsoft.com/office/drawing/2014/main" id="{2BCB2B31-2FE2-491D-9FB3-A98C64406FB3}"/>
+              </a:ext>
+            </a:extLst>
+          </p:cNvPr>
+          <p:cNvPicPr>
+            <a:picLocks noGrp="1" noChangeAspect="1"/>
+          </p:cNvPicPr>
+          <p:nvPr>
+            <p:ph sz="quarter" idx="4"/>
+          </p:nvPr>
+        </p:nvPicPr>
+        <p:blipFill>
+          <a:blip r:embed="rId3">
+            <a:extLst>
+              <a:ext uri="{28A0092B-C50C-407E-A947-70E740481C1C}">
+                <a14:useLocalDpi xmlns:a14="http://schemas.microsoft.com/office/drawing/2010/main" val="0"/>
+              </a:ext>
+            </a:extLst>
+          </a:blip>
+          <a:stretch>
+            <a:fillRect/>
+          </a:stretch>
+        </p:blipFill>
+        <p:spPr>
+          <a:xfrm>
+            <a:off x="6710868" y="1115468"/>
+            <a:ext cx="2347236" cy="1694178"/>
           </a:xfrm>
           <a:prstGeom prst="rect">
             <a:avLst/>
@@ -5121,1405 +6446,99 @@
           </a:sp3d>
         </p:spPr>
       </p:pic>
+      <p:sp>
+        <p:nvSpPr>
+          <p:cNvPr id="20" name="TextBox 19">
+            <a:extLst>
+              <a:ext uri="{FF2B5EF4-FFF2-40B4-BE49-F238E27FC236}">
+                <a16:creationId xmlns:a16="http://schemas.microsoft.com/office/drawing/2014/main" id="{C2D7B902-F7AC-42E3-97E1-7C6718347D9C}"/>
+              </a:ext>
+            </a:extLst>
+          </p:cNvPr>
+          <p:cNvSpPr txBox="1"/>
+          <p:nvPr/>
+        </p:nvSpPr>
+        <p:spPr>
+          <a:xfrm>
+            <a:off x="6889384" y="4474319"/>
+            <a:ext cx="1625966" cy="2092881"/>
+          </a:xfrm>
+          <a:prstGeom prst="rect">
+            <a:avLst/>
+          </a:prstGeom>
+          <a:noFill/>
+        </p:spPr>
+        <p:txBody>
+          <a:bodyPr wrap="square" rtlCol="0">
+            <a:spAutoFit/>
+          </a:bodyPr>
+          <a:lstStyle/>
+          <a:p>
+            <a:r>
+              <a:rPr lang="en-US" sz="1000" b="1" dirty="0" err="1"/>
+              <a:t>pvalue</a:t>
+            </a:r>
+            <a:r>
+              <a:rPr lang="en-US" sz="1000" b="1" dirty="0"/>
+              <a:t>=0.00018438028390007074)</a:t>
+            </a:r>
+          </a:p>
+          <a:p>
+            <a:r>
+              <a:rPr lang="en-US" sz="1000" b="1" dirty="0"/>
+              <a:t>------------------------------------</a:t>
+            </a:r>
+          </a:p>
+          <a:p>
+            <a:r>
+              <a:rPr lang="en-US" sz="1000" b="1" dirty="0"/>
+              <a:t>The sample standard deviation is </a:t>
+            </a:r>
+            <a:r>
+              <a:rPr lang="en-US" sz="1000" b="1" u="sng" dirty="0"/>
+              <a:t>35.2</a:t>
+            </a:r>
+          </a:p>
+          <a:p>
+            <a:r>
+              <a:rPr lang="en-US" sz="1000" b="1" dirty="0"/>
+              <a:t>The sample variance is </a:t>
+            </a:r>
+            <a:r>
+              <a:rPr lang="en-US" sz="1000" b="1" u="sng" dirty="0"/>
+              <a:t>1241.4</a:t>
+            </a:r>
+          </a:p>
+          <a:p>
+            <a:r>
+              <a:rPr lang="en-US" sz="1000" b="1" dirty="0"/>
+              <a:t>------------------------------------</a:t>
+            </a:r>
+          </a:p>
+          <a:p>
+            <a:r>
+              <a:rPr lang="en-US" sz="1000" b="1" dirty="0"/>
+              <a:t>The mean height of Star Wars characters is </a:t>
+            </a:r>
+          </a:p>
+          <a:p>
+            <a:endParaRPr lang="en-US" sz="1000" b="1" dirty="0"/>
+          </a:p>
+          <a:p>
+            <a:r>
+              <a:rPr lang="en-US" sz="1000" b="1" u="sng" dirty="0"/>
+              <a:t>174.4 cm or 68.4 in</a:t>
+            </a:r>
+          </a:p>
+          <a:p>
+            <a:endParaRPr lang="en-US" sz="1000" b="1" dirty="0"/>
+          </a:p>
+        </p:txBody>
+      </p:sp>
     </p:spTree>
     <p:extLst>
       <p:ext uri="{BB962C8B-B14F-4D97-AF65-F5344CB8AC3E}">
-        <p14:creationId xmlns:p14="http://schemas.microsoft.com/office/powerpoint/2010/main" val="1635379552"/>
-      </p:ext>
-    </p:extLst>
-  </p:cSld>
-  <p:clrMapOvr>
-    <a:masterClrMapping/>
-  </p:clrMapOvr>
-</p:sld>
-</file>
-
-<file path=ppt/slides/slide14.xml><?xml version="1.0" encoding="utf-8"?>
-<p:sld xmlns:a="http://schemas.openxmlformats.org/drawingml/2006/main" xmlns:r="http://schemas.openxmlformats.org/officeDocument/2006/relationships" xmlns:p="http://schemas.openxmlformats.org/presentationml/2006/main">
-  <p:cSld>
-    <p:spTree>
-      <p:nvGrpSpPr>
-        <p:cNvPr id="1" name=""/>
-        <p:cNvGrpSpPr/>
-        <p:nvPr/>
-      </p:nvGrpSpPr>
-      <p:grpSpPr>
-        <a:xfrm>
-          <a:off x="0" y="0"/>
-          <a:ext cx="0" cy="0"/>
-          <a:chOff x="0" y="0"/>
-          <a:chExt cx="0" cy="0"/>
-        </a:xfrm>
-      </p:grpSpPr>
-      <p:sp>
-        <p:nvSpPr>
-          <p:cNvPr id="2" name="Title 1">
-            <a:extLst>
-              <a:ext uri="{FF2B5EF4-FFF2-40B4-BE49-F238E27FC236}">
-                <a16:creationId xmlns:a16="http://schemas.microsoft.com/office/drawing/2014/main" id="{A7D9D3DB-5AFF-4B3D-8959-C4AD5A57F8F2}"/>
-              </a:ext>
-            </a:extLst>
-          </p:cNvPr>
-          <p:cNvSpPr>
-            <a:spLocks noGrp="1"/>
-          </p:cNvSpPr>
-          <p:nvPr>
-            <p:ph type="title"/>
-          </p:nvPr>
-        </p:nvSpPr>
-        <p:spPr/>
-        <p:txBody>
-          <a:bodyPr/>
-          <a:lstStyle/>
-          <a:p>
-            <a:r>
-              <a:rPr lang="en-US" b="0" i="0" dirty="0">
-                <a:effectLst/>
-                <a:latin typeface="Arial" panose="020B0604020202020204" pitchFamily="34" charset="0"/>
-              </a:rPr>
-              <a:t>Discussion</a:t>
-            </a:r>
-            <a:endParaRPr lang="en-US" dirty="0"/>
-          </a:p>
-        </p:txBody>
-      </p:sp>
-      <p:sp>
-        <p:nvSpPr>
-          <p:cNvPr id="3" name="Content Placeholder 2">
-            <a:extLst>
-              <a:ext uri="{FF2B5EF4-FFF2-40B4-BE49-F238E27FC236}">
-                <a16:creationId xmlns:a16="http://schemas.microsoft.com/office/drawing/2014/main" id="{8F1F63A0-CEFB-498B-8C98-DCC49267C229}"/>
-              </a:ext>
-            </a:extLst>
-          </p:cNvPr>
-          <p:cNvSpPr>
-            <a:spLocks noGrp="1"/>
-          </p:cNvSpPr>
-          <p:nvPr>
-            <p:ph idx="1"/>
-          </p:nvPr>
-        </p:nvSpPr>
-        <p:spPr/>
-        <p:txBody>
-          <a:bodyPr/>
-          <a:lstStyle/>
-          <a:p>
-            <a:pPr algn="l"/>
-            <a:r>
-              <a:rPr lang="en-US" b="0" i="0" dirty="0">
-                <a:effectLst/>
-                <a:latin typeface="Arial" panose="020B0604020202020204" pitchFamily="34" charset="0"/>
-              </a:rPr>
-              <a:t>Discuss your findings. Did you find what you expected to find? If not, why not? What inferences or general conclusions can</a:t>
-            </a:r>
-          </a:p>
-          <a:p>
-            <a:pPr algn="l"/>
-            <a:r>
-              <a:rPr lang="en-US" b="0" i="0" dirty="0">
-                <a:effectLst/>
-                <a:latin typeface="Arial" panose="020B0604020202020204" pitchFamily="34" charset="0"/>
-              </a:rPr>
-              <a:t>you draw from your analysis?</a:t>
-            </a:r>
-          </a:p>
-          <a:p>
-            <a:endParaRPr lang="en-US" dirty="0"/>
-          </a:p>
-        </p:txBody>
-      </p:sp>
-    </p:spTree>
-    <p:extLst>
-      <p:ext uri="{BB962C8B-B14F-4D97-AF65-F5344CB8AC3E}">
-        <p14:creationId xmlns:p14="http://schemas.microsoft.com/office/powerpoint/2010/main" val="3124462524"/>
-      </p:ext>
-    </p:extLst>
-  </p:cSld>
-  <p:clrMapOvr>
-    <a:masterClrMapping/>
-  </p:clrMapOvr>
-</p:sld>
-</file>
-
-<file path=ppt/slides/slide15.xml><?xml version="1.0" encoding="utf-8"?>
-<p:sld xmlns:a="http://schemas.openxmlformats.org/drawingml/2006/main" xmlns:r="http://schemas.openxmlformats.org/officeDocument/2006/relationships" xmlns:p="http://schemas.openxmlformats.org/presentationml/2006/main">
-  <p:cSld>
-    <p:spTree>
-      <p:nvGrpSpPr>
-        <p:cNvPr id="1" name=""/>
-        <p:cNvGrpSpPr/>
-        <p:nvPr/>
-      </p:nvGrpSpPr>
-      <p:grpSpPr>
-        <a:xfrm>
-          <a:off x="0" y="0"/>
-          <a:ext cx="0" cy="0"/>
-          <a:chOff x="0" y="0"/>
-          <a:chExt cx="0" cy="0"/>
-        </a:xfrm>
-      </p:grpSpPr>
-      <p:sp>
-        <p:nvSpPr>
-          <p:cNvPr id="2" name="Title 1">
-            <a:extLst>
-              <a:ext uri="{FF2B5EF4-FFF2-40B4-BE49-F238E27FC236}">
-                <a16:creationId xmlns:a16="http://schemas.microsoft.com/office/drawing/2014/main" id="{696D524F-CB30-4DD1-84F0-832C7659D8E2}"/>
-              </a:ext>
-            </a:extLst>
-          </p:cNvPr>
-          <p:cNvSpPr>
-            <a:spLocks noGrp="1"/>
-          </p:cNvSpPr>
-          <p:nvPr>
-            <p:ph type="title"/>
-          </p:nvPr>
-        </p:nvSpPr>
-        <p:spPr/>
-        <p:txBody>
-          <a:bodyPr/>
-          <a:lstStyle/>
-          <a:p>
-            <a:r>
-              <a:rPr lang="en-US" b="0" i="0" dirty="0">
-                <a:effectLst/>
-                <a:latin typeface="Arial" panose="020B0604020202020204" pitchFamily="34" charset="0"/>
-              </a:rPr>
-              <a:t>Post Mortem</a:t>
-            </a:r>
-            <a:endParaRPr lang="en-US" dirty="0"/>
-          </a:p>
-        </p:txBody>
-      </p:sp>
-      <p:sp>
-        <p:nvSpPr>
-          <p:cNvPr id="3" name="Content Placeholder 2">
-            <a:extLst>
-              <a:ext uri="{FF2B5EF4-FFF2-40B4-BE49-F238E27FC236}">
-                <a16:creationId xmlns:a16="http://schemas.microsoft.com/office/drawing/2014/main" id="{3489960F-3DA4-445A-9D54-ACBF52BABEA4}"/>
-              </a:ext>
-            </a:extLst>
-          </p:cNvPr>
-          <p:cNvSpPr>
-            <a:spLocks noGrp="1"/>
-          </p:cNvSpPr>
-          <p:nvPr>
-            <p:ph idx="1"/>
-          </p:nvPr>
-        </p:nvSpPr>
-        <p:spPr/>
-        <p:txBody>
-          <a:bodyPr/>
-          <a:lstStyle/>
-          <a:p>
-            <a:pPr algn="l"/>
-            <a:r>
-              <a:rPr lang="en-US" b="0" i="0" dirty="0">
-                <a:effectLst/>
-                <a:latin typeface="Arial" panose="020B0604020202020204" pitchFamily="34" charset="0"/>
-              </a:rPr>
-              <a:t>Discuss any difficulties that arose, and how you dealt with them</a:t>
-            </a:r>
-          </a:p>
-          <a:p>
-            <a:pPr algn="l"/>
-            <a:r>
-              <a:rPr lang="en-US" b="0" i="0" dirty="0">
-                <a:effectLst/>
-                <a:latin typeface="Arial" panose="020B0604020202020204" pitchFamily="34" charset="0"/>
-              </a:rPr>
-              <a:t>Discuss any additional questions that came up, but which you didn't have time to answer: What would you research next, if you</a:t>
-            </a:r>
-          </a:p>
-          <a:p>
-            <a:pPr algn="l"/>
-            <a:r>
-              <a:rPr lang="en-US" b="0" i="0" dirty="0">
-                <a:effectLst/>
-                <a:latin typeface="Arial" panose="020B0604020202020204" pitchFamily="34" charset="0"/>
-              </a:rPr>
-              <a:t>had two more weeks?</a:t>
-            </a:r>
-          </a:p>
-          <a:p>
-            <a:endParaRPr lang="en-US" dirty="0"/>
-          </a:p>
-        </p:txBody>
-      </p:sp>
-    </p:spTree>
-    <p:extLst>
-      <p:ext uri="{BB962C8B-B14F-4D97-AF65-F5344CB8AC3E}">
-        <p14:creationId xmlns:p14="http://schemas.microsoft.com/office/powerpoint/2010/main" val="3263556886"/>
-      </p:ext>
-    </p:extLst>
-  </p:cSld>
-  <p:clrMapOvr>
-    <a:masterClrMapping/>
-  </p:clrMapOvr>
-</p:sld>
-</file>
-
-<file path=ppt/slides/slide16.xml><?xml version="1.0" encoding="utf-8"?>
-<p:sld xmlns:a="http://schemas.openxmlformats.org/drawingml/2006/main" xmlns:r="http://schemas.openxmlformats.org/officeDocument/2006/relationships" xmlns:p="http://schemas.openxmlformats.org/presentationml/2006/main">
-  <p:cSld>
-    <p:spTree>
-      <p:nvGrpSpPr>
-        <p:cNvPr id="1" name=""/>
-        <p:cNvGrpSpPr/>
-        <p:nvPr/>
-      </p:nvGrpSpPr>
-      <p:grpSpPr>
-        <a:xfrm>
-          <a:off x="0" y="0"/>
-          <a:ext cx="0" cy="0"/>
-          <a:chOff x="0" y="0"/>
-          <a:chExt cx="0" cy="0"/>
-        </a:xfrm>
-      </p:grpSpPr>
-      <p:sp>
-        <p:nvSpPr>
-          <p:cNvPr id="2" name="Title 1">
-            <a:extLst>
-              <a:ext uri="{FF2B5EF4-FFF2-40B4-BE49-F238E27FC236}">
-                <a16:creationId xmlns:a16="http://schemas.microsoft.com/office/drawing/2014/main" id="{CB62222F-9F91-4C07-B3E1-9F250E4A75DC}"/>
-              </a:ext>
-            </a:extLst>
-          </p:cNvPr>
-          <p:cNvSpPr>
-            <a:spLocks noGrp="1"/>
-          </p:cNvSpPr>
-          <p:nvPr>
-            <p:ph type="title"/>
-          </p:nvPr>
-        </p:nvSpPr>
-        <p:spPr/>
-        <p:txBody>
-          <a:bodyPr/>
-          <a:lstStyle/>
-          <a:p>
-            <a:r>
-              <a:rPr lang="en-US" dirty="0"/>
-              <a:t>Questions?</a:t>
-            </a:r>
-          </a:p>
-        </p:txBody>
-      </p:sp>
-      <p:sp>
-        <p:nvSpPr>
-          <p:cNvPr id="3" name="Content Placeholder 2">
-            <a:extLst>
-              <a:ext uri="{FF2B5EF4-FFF2-40B4-BE49-F238E27FC236}">
-                <a16:creationId xmlns:a16="http://schemas.microsoft.com/office/drawing/2014/main" id="{825DCD46-5122-449C-B0C3-B8173DFE641C}"/>
-              </a:ext>
-            </a:extLst>
-          </p:cNvPr>
-          <p:cNvSpPr>
-            <a:spLocks noGrp="1"/>
-          </p:cNvSpPr>
-          <p:nvPr>
-            <p:ph idx="1"/>
-          </p:nvPr>
-        </p:nvSpPr>
-        <p:spPr/>
-        <p:txBody>
-          <a:bodyPr/>
-          <a:lstStyle/>
-          <a:p>
-            <a:endParaRPr lang="en-US"/>
-          </a:p>
-        </p:txBody>
-      </p:sp>
-    </p:spTree>
-    <p:extLst>
-      <p:ext uri="{BB962C8B-B14F-4D97-AF65-F5344CB8AC3E}">
-        <p14:creationId xmlns:p14="http://schemas.microsoft.com/office/powerpoint/2010/main" val="1130841422"/>
-      </p:ext>
-    </p:extLst>
-  </p:cSld>
-  <p:clrMapOvr>
-    <a:masterClrMapping/>
-  </p:clrMapOvr>
-</p:sld>
-</file>
-
-<file path=ppt/slides/slide2.xml><?xml version="1.0" encoding="utf-8"?>
-<p:sld xmlns:a="http://schemas.openxmlformats.org/drawingml/2006/main" xmlns:r="http://schemas.openxmlformats.org/officeDocument/2006/relationships" xmlns:p="http://schemas.openxmlformats.org/presentationml/2006/main">
-  <p:cSld>
-    <p:spTree>
-      <p:nvGrpSpPr>
-        <p:cNvPr id="1" name=""/>
-        <p:cNvGrpSpPr/>
-        <p:nvPr/>
-      </p:nvGrpSpPr>
-      <p:grpSpPr>
-        <a:xfrm>
-          <a:off x="0" y="0"/>
-          <a:ext cx="0" cy="0"/>
-          <a:chOff x="0" y="0"/>
-          <a:chExt cx="0" cy="0"/>
-        </a:xfrm>
-      </p:grpSpPr>
-      <p:sp>
-        <p:nvSpPr>
-          <p:cNvPr id="2" name="Title 1">
-            <a:extLst>
-              <a:ext uri="{FF2B5EF4-FFF2-40B4-BE49-F238E27FC236}">
-                <a16:creationId xmlns:a16="http://schemas.microsoft.com/office/drawing/2014/main" id="{465CBC63-FAD1-4D71-B2F3-D1AD363C778D}"/>
-              </a:ext>
-            </a:extLst>
-          </p:cNvPr>
-          <p:cNvSpPr>
-            <a:spLocks noGrp="1"/>
-          </p:cNvSpPr>
-          <p:nvPr>
-            <p:ph type="title"/>
-          </p:nvPr>
-        </p:nvSpPr>
-        <p:spPr>
-          <a:xfrm>
-            <a:off x="628650" y="112206"/>
-            <a:ext cx="7886700" cy="1325563"/>
-          </a:xfrm>
-        </p:spPr>
-        <p:txBody>
-          <a:bodyPr>
-            <a:normAutofit fontScale="90000"/>
-          </a:bodyPr>
-          <a:lstStyle/>
-          <a:p>
-            <a:pPr algn="ctr"/>
-            <a:r>
-              <a:rPr lang="en-US" dirty="0">
-                <a:solidFill>
-                  <a:schemeClr val="accent4"/>
-                </a:solidFill>
-              </a:rPr>
-              <a:t>An analytical and statistical analysis of the creativity behind STAR WARS</a:t>
-            </a:r>
-          </a:p>
-        </p:txBody>
-      </p:sp>
-      <p:sp>
-        <p:nvSpPr>
-          <p:cNvPr id="3" name="Content Placeholder 2">
-            <a:extLst>
-              <a:ext uri="{FF2B5EF4-FFF2-40B4-BE49-F238E27FC236}">
-                <a16:creationId xmlns:a16="http://schemas.microsoft.com/office/drawing/2014/main" id="{4029D751-62AD-4741-84DD-FB67E022BF5D}"/>
-              </a:ext>
-            </a:extLst>
-          </p:cNvPr>
-          <p:cNvSpPr>
-            <a:spLocks noGrp="1"/>
-          </p:cNvSpPr>
-          <p:nvPr>
-            <p:ph idx="1"/>
-          </p:nvPr>
-        </p:nvSpPr>
-        <p:spPr>
-          <a:xfrm>
-            <a:off x="201039" y="1579947"/>
-            <a:ext cx="8806774" cy="5165847"/>
-          </a:xfrm>
-        </p:spPr>
-        <p:txBody>
-          <a:bodyPr>
-            <a:normAutofit fontScale="77500" lnSpcReduction="20000"/>
-          </a:bodyPr>
-          <a:lstStyle/>
-          <a:p>
-            <a:pPr algn="l"/>
-            <a:r>
-              <a:rPr lang="en-US" b="0" i="0" dirty="0">
-                <a:effectLst/>
-                <a:latin typeface="Arial" panose="020B0604020202020204" pitchFamily="34" charset="0"/>
-              </a:rPr>
-              <a:t>What kind of data is available and what kinds of stories can it tell? </a:t>
-            </a:r>
-          </a:p>
-          <a:p>
-            <a:pPr lvl="1"/>
-            <a:r>
-              <a:rPr lang="en-US" b="0" i="0" dirty="0">
-                <a:effectLst/>
-                <a:latin typeface="Arial" panose="020B0604020202020204" pitchFamily="34" charset="0"/>
-              </a:rPr>
-              <a:t>SWAPI</a:t>
-            </a:r>
-          </a:p>
-          <a:p>
-            <a:pPr lvl="1"/>
-            <a:r>
-              <a:rPr lang="en-US" b="0" i="0" dirty="0">
-                <a:effectLst/>
-                <a:latin typeface="Arial" panose="020B0604020202020204" pitchFamily="34" charset="0"/>
-              </a:rPr>
-              <a:t>People, Places, Things? How much of there is it available?</a:t>
-            </a:r>
-          </a:p>
-          <a:p>
-            <a:pPr lvl="1"/>
-            <a:r>
-              <a:rPr lang="en-US" dirty="0">
-                <a:latin typeface="Arial" panose="020B0604020202020204" pitchFamily="34" charset="0"/>
-              </a:rPr>
-              <a:t>Episodes 1-6 only</a:t>
-            </a:r>
-            <a:endParaRPr lang="en-US" b="0" i="0" dirty="0">
-              <a:effectLst/>
-              <a:latin typeface="Arial" panose="020B0604020202020204" pitchFamily="34" charset="0"/>
-            </a:endParaRPr>
-          </a:p>
-          <a:p>
-            <a:pPr algn="l"/>
-            <a:endParaRPr lang="en-US" dirty="0">
-              <a:latin typeface="Arial" panose="020B0604020202020204" pitchFamily="34" charset="0"/>
-            </a:endParaRPr>
-          </a:p>
-          <a:p>
-            <a:pPr algn="l"/>
-            <a:r>
-              <a:rPr lang="en-US" dirty="0">
-                <a:latin typeface="Arial" panose="020B0604020202020204" pitchFamily="34" charset="0"/>
-              </a:rPr>
-              <a:t>Is there a difference in how the data can be viewed or interpreted by the user? </a:t>
-            </a:r>
-          </a:p>
-          <a:p>
-            <a:pPr lvl="1"/>
-            <a:r>
-              <a:rPr lang="en-US" dirty="0">
-                <a:latin typeface="Arial" panose="020B0604020202020204" pitchFamily="34" charset="0"/>
-              </a:rPr>
-              <a:t>Theatrical Release versus Chronological Order?</a:t>
-            </a:r>
-          </a:p>
-          <a:p>
-            <a:pPr lvl="1"/>
-            <a:r>
-              <a:rPr lang="en-US" dirty="0">
-                <a:latin typeface="Arial" panose="020B0604020202020204" pitchFamily="34" charset="0"/>
-              </a:rPr>
-              <a:t>Someone who has seen the films versus someone who has not?</a:t>
-            </a:r>
-          </a:p>
-          <a:p>
-            <a:pPr algn="l"/>
-            <a:endParaRPr lang="en-US" dirty="0">
-              <a:latin typeface="Arial" panose="020B0604020202020204" pitchFamily="34" charset="0"/>
-            </a:endParaRPr>
-          </a:p>
-          <a:p>
-            <a:pPr algn="l"/>
-            <a:r>
-              <a:rPr lang="en-US" dirty="0">
-                <a:latin typeface="Arial" panose="020B0604020202020204" pitchFamily="34" charset="0"/>
-              </a:rPr>
-              <a:t>Are there any funny patterns or trends within the datasets? Between the datasets?</a:t>
-            </a:r>
-          </a:p>
-          <a:p>
-            <a:pPr lvl="1"/>
-            <a:r>
-              <a:rPr lang="en-US" dirty="0">
-                <a:latin typeface="Arial" panose="020B0604020202020204" pitchFamily="34" charset="0"/>
-              </a:rPr>
-              <a:t>Jabba</a:t>
-            </a:r>
-          </a:p>
-          <a:p>
-            <a:pPr algn="l"/>
-            <a:endParaRPr lang="en-US" b="0" i="0" dirty="0">
-              <a:effectLst/>
-              <a:latin typeface="Arial" panose="020B0604020202020204" pitchFamily="34" charset="0"/>
-            </a:endParaRPr>
-          </a:p>
-          <a:p>
-            <a:pPr algn="l"/>
-            <a:r>
-              <a:rPr lang="en-US" b="0" i="0" dirty="0">
-                <a:effectLst/>
-                <a:latin typeface="Arial" panose="020B0604020202020204" pitchFamily="34" charset="0"/>
-              </a:rPr>
-              <a:t>Can creativity be statistically quantified? </a:t>
-            </a:r>
-          </a:p>
-          <a:p>
-            <a:pPr lvl="1"/>
-            <a:r>
-              <a:rPr lang="en-US" b="0" i="0" dirty="0">
-                <a:effectLst/>
-                <a:latin typeface="Arial" panose="020B0604020202020204" pitchFamily="34" charset="0"/>
-              </a:rPr>
-              <a:t>Kind of, maybe? TBD</a:t>
-            </a:r>
-          </a:p>
-          <a:p>
-            <a:endParaRPr lang="en-US" dirty="0"/>
-          </a:p>
-        </p:txBody>
-      </p:sp>
-    </p:spTree>
-    <p:extLst>
-      <p:ext uri="{BB962C8B-B14F-4D97-AF65-F5344CB8AC3E}">
-        <p14:creationId xmlns:p14="http://schemas.microsoft.com/office/powerpoint/2010/main" val="1362748197"/>
-      </p:ext>
-    </p:extLst>
-  </p:cSld>
-  <p:clrMapOvr>
-    <a:masterClrMapping/>
-  </p:clrMapOvr>
-</p:sld>
-</file>
-
-<file path=ppt/slides/slide3.xml><?xml version="1.0" encoding="utf-8"?>
-<p:sld xmlns:a="http://schemas.openxmlformats.org/drawingml/2006/main" xmlns:r="http://schemas.openxmlformats.org/officeDocument/2006/relationships" xmlns:p="http://schemas.openxmlformats.org/presentationml/2006/main">
-  <p:cSld>
-    <p:spTree>
-      <p:nvGrpSpPr>
-        <p:cNvPr id="1" name=""/>
-        <p:cNvGrpSpPr/>
-        <p:nvPr/>
-      </p:nvGrpSpPr>
-      <p:grpSpPr>
-        <a:xfrm>
-          <a:off x="0" y="0"/>
-          <a:ext cx="0" cy="0"/>
-          <a:chOff x="0" y="0"/>
-          <a:chExt cx="0" cy="0"/>
-        </a:xfrm>
-      </p:grpSpPr>
-      <p:sp>
-        <p:nvSpPr>
-          <p:cNvPr id="2" name="Title 1">
-            <a:extLst>
-              <a:ext uri="{FF2B5EF4-FFF2-40B4-BE49-F238E27FC236}">
-                <a16:creationId xmlns:a16="http://schemas.microsoft.com/office/drawing/2014/main" id="{19531607-6580-49FA-89F7-75F81915CF57}"/>
-              </a:ext>
-            </a:extLst>
-          </p:cNvPr>
-          <p:cNvSpPr>
-            <a:spLocks noGrp="1"/>
-          </p:cNvSpPr>
-          <p:nvPr>
-            <p:ph type="title"/>
-          </p:nvPr>
-        </p:nvSpPr>
-        <p:spPr/>
-        <p:txBody>
-          <a:bodyPr/>
-          <a:lstStyle/>
-          <a:p>
-            <a:r>
-              <a:rPr lang="en-US" dirty="0"/>
-              <a:t>Questions &amp; Data</a:t>
-            </a:r>
-          </a:p>
-        </p:txBody>
-      </p:sp>
-      <p:sp>
-        <p:nvSpPr>
-          <p:cNvPr id="3" name="Content Placeholder 2">
-            <a:extLst>
-              <a:ext uri="{FF2B5EF4-FFF2-40B4-BE49-F238E27FC236}">
-                <a16:creationId xmlns:a16="http://schemas.microsoft.com/office/drawing/2014/main" id="{5AE5DD9A-95C7-48EB-A446-8B79322175A8}"/>
-              </a:ext>
-            </a:extLst>
-          </p:cNvPr>
-          <p:cNvSpPr>
-            <a:spLocks noGrp="1"/>
-          </p:cNvSpPr>
-          <p:nvPr>
-            <p:ph idx="1"/>
-          </p:nvPr>
-        </p:nvSpPr>
-        <p:spPr/>
-        <p:txBody>
-          <a:bodyPr/>
-          <a:lstStyle/>
-          <a:p>
-            <a:r>
-              <a:rPr lang="en-US" b="0" i="0" dirty="0">
-                <a:effectLst/>
-                <a:latin typeface="Arial" panose="020B0604020202020204" pitchFamily="34" charset="0"/>
-              </a:rPr>
-              <a:t>Elaborate on the questions you asked, describing what kinds of data you needed to answer them, and where you found it</a:t>
-            </a:r>
-            <a:endParaRPr lang="en-US" dirty="0"/>
-          </a:p>
-        </p:txBody>
-      </p:sp>
-    </p:spTree>
-    <p:extLst>
-      <p:ext uri="{BB962C8B-B14F-4D97-AF65-F5344CB8AC3E}">
-        <p14:creationId xmlns:p14="http://schemas.microsoft.com/office/powerpoint/2010/main" val="1473672750"/>
-      </p:ext>
-    </p:extLst>
-  </p:cSld>
-  <p:clrMapOvr>
-    <a:masterClrMapping/>
-  </p:clrMapOvr>
-</p:sld>
-</file>
-
-<file path=ppt/slides/slide4.xml><?xml version="1.0" encoding="utf-8"?>
-<p:sld xmlns:a="http://schemas.openxmlformats.org/drawingml/2006/main" xmlns:r="http://schemas.openxmlformats.org/officeDocument/2006/relationships" xmlns:p="http://schemas.openxmlformats.org/presentationml/2006/main">
-  <p:cSld>
-    <p:spTree>
-      <p:nvGrpSpPr>
-        <p:cNvPr id="1" name=""/>
-        <p:cNvGrpSpPr/>
-        <p:nvPr/>
-      </p:nvGrpSpPr>
-      <p:grpSpPr>
-        <a:xfrm>
-          <a:off x="0" y="0"/>
-          <a:ext cx="0" cy="0"/>
-          <a:chOff x="0" y="0"/>
-          <a:chExt cx="0" cy="0"/>
-        </a:xfrm>
-      </p:grpSpPr>
-      <p:sp>
-        <p:nvSpPr>
-          <p:cNvPr id="2" name="Title 1">
-            <a:extLst>
-              <a:ext uri="{FF2B5EF4-FFF2-40B4-BE49-F238E27FC236}">
-                <a16:creationId xmlns:a16="http://schemas.microsoft.com/office/drawing/2014/main" id="{FB9873D0-CBEF-4AA9-B7F4-27F093F241E2}"/>
-              </a:ext>
-            </a:extLst>
-          </p:cNvPr>
-          <p:cNvSpPr>
-            <a:spLocks noGrp="1"/>
-          </p:cNvSpPr>
-          <p:nvPr>
-            <p:ph type="title"/>
-          </p:nvPr>
-        </p:nvSpPr>
-        <p:spPr>
-          <a:xfrm>
-            <a:off x="0" y="-386930"/>
-            <a:ext cx="7886700" cy="1325563"/>
-          </a:xfrm>
-        </p:spPr>
-        <p:txBody>
-          <a:bodyPr/>
-          <a:lstStyle/>
-          <a:p>
-            <a:r>
-              <a:rPr lang="en-US" dirty="0"/>
-              <a:t>Data Wrangling </a:t>
-            </a:r>
-          </a:p>
-        </p:txBody>
-      </p:sp>
-      <p:pic>
-        <p:nvPicPr>
-          <p:cNvPr id="5" name="Picture 4">
-            <a:extLst>
-              <a:ext uri="{FF2B5EF4-FFF2-40B4-BE49-F238E27FC236}">
-                <a16:creationId xmlns:a16="http://schemas.microsoft.com/office/drawing/2014/main" id="{DDD1EBD4-E1DC-4F5C-92DE-DF31DE58BDD1}"/>
-              </a:ext>
-            </a:extLst>
-          </p:cNvPr>
-          <p:cNvPicPr>
-            <a:picLocks noChangeAspect="1"/>
-          </p:cNvPicPr>
-          <p:nvPr/>
-        </p:nvPicPr>
-        <p:blipFill>
-          <a:blip r:embed="rId2"/>
-          <a:stretch>
-            <a:fillRect/>
-          </a:stretch>
-        </p:blipFill>
-        <p:spPr>
-          <a:xfrm>
-            <a:off x="64850" y="548241"/>
-            <a:ext cx="4896256" cy="3233676"/>
-          </a:xfrm>
-          <a:prstGeom prst="rect">
-            <a:avLst/>
-          </a:prstGeom>
-        </p:spPr>
-      </p:pic>
-      <p:pic>
-        <p:nvPicPr>
-          <p:cNvPr id="7" name="Picture 6">
-            <a:extLst>
-              <a:ext uri="{FF2B5EF4-FFF2-40B4-BE49-F238E27FC236}">
-                <a16:creationId xmlns:a16="http://schemas.microsoft.com/office/drawing/2014/main" id="{1180D3FA-55A9-41A4-80D5-B69F7020A1FC}"/>
-              </a:ext>
-            </a:extLst>
-          </p:cNvPr>
-          <p:cNvPicPr>
-            <a:picLocks noChangeAspect="1"/>
-          </p:cNvPicPr>
-          <p:nvPr/>
-        </p:nvPicPr>
-        <p:blipFill>
-          <a:blip r:embed="rId3"/>
-          <a:stretch>
-            <a:fillRect/>
-          </a:stretch>
-        </p:blipFill>
-        <p:spPr>
-          <a:xfrm>
-            <a:off x="64850" y="4095012"/>
-            <a:ext cx="6018180" cy="2541009"/>
-          </a:xfrm>
-          <a:prstGeom prst="rect">
-            <a:avLst/>
-          </a:prstGeom>
-        </p:spPr>
-      </p:pic>
-    </p:spTree>
-    <p:extLst>
-      <p:ext uri="{BB962C8B-B14F-4D97-AF65-F5344CB8AC3E}">
-        <p14:creationId xmlns:p14="http://schemas.microsoft.com/office/powerpoint/2010/main" val="3876159308"/>
-      </p:ext>
-    </p:extLst>
-  </p:cSld>
-  <p:clrMapOvr>
-    <a:masterClrMapping/>
-  </p:clrMapOvr>
-</p:sld>
-</file>
-
-<file path=ppt/slides/slide5.xml><?xml version="1.0" encoding="utf-8"?>
-<p:sld xmlns:a="http://schemas.openxmlformats.org/drawingml/2006/main" xmlns:r="http://schemas.openxmlformats.org/officeDocument/2006/relationships" xmlns:p="http://schemas.openxmlformats.org/presentationml/2006/main">
-  <p:cSld>
-    <p:spTree>
-      <p:nvGrpSpPr>
-        <p:cNvPr id="1" name=""/>
-        <p:cNvGrpSpPr/>
-        <p:nvPr/>
-      </p:nvGrpSpPr>
-      <p:grpSpPr>
-        <a:xfrm>
-          <a:off x="0" y="0"/>
-          <a:ext cx="0" cy="0"/>
-          <a:chOff x="0" y="0"/>
-          <a:chExt cx="0" cy="0"/>
-        </a:xfrm>
-      </p:grpSpPr>
-      <p:sp>
-        <p:nvSpPr>
-          <p:cNvPr id="8" name="Title 7">
-            <a:extLst>
-              <a:ext uri="{FF2B5EF4-FFF2-40B4-BE49-F238E27FC236}">
-                <a16:creationId xmlns:a16="http://schemas.microsoft.com/office/drawing/2014/main" id="{8CC657C8-6C81-419B-8BE0-C4BD2580A827}"/>
-              </a:ext>
-            </a:extLst>
-          </p:cNvPr>
-          <p:cNvSpPr>
-            <a:spLocks noGrp="1"/>
-          </p:cNvSpPr>
-          <p:nvPr>
-            <p:ph type="title"/>
-          </p:nvPr>
-        </p:nvSpPr>
-        <p:spPr>
-          <a:xfrm>
-            <a:off x="628650" y="157603"/>
-            <a:ext cx="7886700" cy="1325563"/>
-          </a:xfrm>
-        </p:spPr>
-        <p:txBody>
-          <a:bodyPr/>
-          <a:lstStyle/>
-          <a:p>
-            <a:pPr algn="ctr"/>
-            <a:r>
-              <a:rPr lang="en-US" dirty="0"/>
-              <a:t>Star Wars by Release Order</a:t>
-            </a:r>
-          </a:p>
-        </p:txBody>
-      </p:sp>
-      <p:pic>
-        <p:nvPicPr>
-          <p:cNvPr id="7" name="Content Placeholder 6" descr="Chart&#10;&#10;Description automatically generated">
-            <a:extLst>
-              <a:ext uri="{FF2B5EF4-FFF2-40B4-BE49-F238E27FC236}">
-                <a16:creationId xmlns:a16="http://schemas.microsoft.com/office/drawing/2014/main" id="{D1B7DD48-4555-48C3-950D-799DC4F2090E}"/>
-              </a:ext>
-            </a:extLst>
-          </p:cNvPr>
-          <p:cNvPicPr>
-            <a:picLocks noGrp="1" noChangeAspect="1"/>
-          </p:cNvPicPr>
-          <p:nvPr>
-            <p:ph sz="half" idx="2"/>
-          </p:nvPr>
-        </p:nvPicPr>
-        <p:blipFill>
-          <a:blip r:embed="rId2">
-            <a:extLst>
-              <a:ext uri="{28A0092B-C50C-407E-A947-70E740481C1C}">
-                <a14:useLocalDpi xmlns:a14="http://schemas.microsoft.com/office/drawing/2010/main" val="0"/>
-              </a:ext>
-            </a:extLst>
-          </a:blip>
-          <a:stretch>
-            <a:fillRect/>
-          </a:stretch>
-        </p:blipFill>
-        <p:spPr>
-          <a:xfrm>
-            <a:off x="274893" y="1612703"/>
-            <a:ext cx="4297107" cy="4240568"/>
-          </a:xfrm>
-          <a:prstGeom prst="roundRect">
-            <a:avLst>
-              <a:gd name="adj" fmla="val 4167"/>
-            </a:avLst>
-          </a:prstGeom>
-          <a:solidFill>
-            <a:srgbClr val="FFFFFF"/>
-          </a:solidFill>
-          <a:ln w="76200" cap="sq">
-            <a:solidFill>
-              <a:srgbClr val="EAEAEA"/>
-            </a:solidFill>
-            <a:miter lim="800000"/>
-          </a:ln>
-          <a:effectLst>
-            <a:reflection blurRad="12700" stA="33000" endPos="28000" dist="5000" dir="5400000" sy="-100000" algn="bl" rotWithShape="0"/>
-          </a:effectLst>
-          <a:scene3d>
-            <a:camera prst="orthographicFront"/>
-            <a:lightRig rig="threePt" dir="t">
-              <a:rot lat="0" lon="0" rev="2700000"/>
-            </a:lightRig>
-          </a:scene3d>
-          <a:sp3d contourW="6350">
-            <a:bevelT h="38100"/>
-            <a:contourClr>
-              <a:srgbClr val="C0C0C0"/>
-            </a:contourClr>
-          </a:sp3d>
-        </p:spPr>
-      </p:pic>
-      <p:pic>
-        <p:nvPicPr>
-          <p:cNvPr id="13" name="Content Placeholder 12" descr="Chart, line chart&#10;&#10;Description automatically generated">
-            <a:extLst>
-              <a:ext uri="{FF2B5EF4-FFF2-40B4-BE49-F238E27FC236}">
-                <a16:creationId xmlns:a16="http://schemas.microsoft.com/office/drawing/2014/main" id="{88AAE549-2783-427E-9A21-E2E167DBBE10}"/>
-              </a:ext>
-            </a:extLst>
-          </p:cNvPr>
-          <p:cNvPicPr>
-            <a:picLocks noGrp="1" noChangeAspect="1"/>
-          </p:cNvPicPr>
-          <p:nvPr>
-            <p:ph sz="quarter" idx="4"/>
-          </p:nvPr>
-        </p:nvPicPr>
-        <p:blipFill>
-          <a:blip r:embed="rId3">
-            <a:extLst>
-              <a:ext uri="{28A0092B-C50C-407E-A947-70E740481C1C}">
-                <a14:useLocalDpi xmlns:a14="http://schemas.microsoft.com/office/drawing/2010/main" val="0"/>
-              </a:ext>
-            </a:extLst>
-          </a:blip>
-          <a:stretch>
-            <a:fillRect/>
-          </a:stretch>
-        </p:blipFill>
-        <p:spPr>
-          <a:xfrm>
-            <a:off x="4637522" y="1612702"/>
-            <a:ext cx="4297106" cy="4240567"/>
-          </a:xfrm>
-          <a:prstGeom prst="roundRect">
-            <a:avLst>
-              <a:gd name="adj" fmla="val 4167"/>
-            </a:avLst>
-          </a:prstGeom>
-          <a:solidFill>
-            <a:srgbClr val="FFFFFF"/>
-          </a:solidFill>
-          <a:ln w="76200" cap="sq">
-            <a:solidFill>
-              <a:srgbClr val="EAEAEA"/>
-            </a:solidFill>
-            <a:miter lim="800000"/>
-          </a:ln>
-          <a:effectLst>
-            <a:reflection blurRad="12700" stA="33000" endPos="28000" dist="5000" dir="5400000" sy="-100000" algn="bl" rotWithShape="0"/>
-          </a:effectLst>
-          <a:scene3d>
-            <a:camera prst="orthographicFront"/>
-            <a:lightRig rig="threePt" dir="t">
-              <a:rot lat="0" lon="0" rev="2700000"/>
-            </a:lightRig>
-          </a:scene3d>
-          <a:sp3d contourW="6350">
-            <a:bevelT h="38100"/>
-            <a:contourClr>
-              <a:srgbClr val="C0C0C0"/>
-            </a:contourClr>
-          </a:sp3d>
-        </p:spPr>
-      </p:pic>
-    </p:spTree>
-    <p:extLst>
-      <p:ext uri="{BB962C8B-B14F-4D97-AF65-F5344CB8AC3E}">
-        <p14:creationId xmlns:p14="http://schemas.microsoft.com/office/powerpoint/2010/main" val="2243487975"/>
-      </p:ext>
-    </p:extLst>
-  </p:cSld>
-  <p:clrMapOvr>
-    <a:masterClrMapping/>
-  </p:clrMapOvr>
-</p:sld>
-</file>
-
-<file path=ppt/slides/slide6.xml><?xml version="1.0" encoding="utf-8"?>
-<p:sld xmlns:a="http://schemas.openxmlformats.org/drawingml/2006/main" xmlns:r="http://schemas.openxmlformats.org/officeDocument/2006/relationships" xmlns:p="http://schemas.openxmlformats.org/presentationml/2006/main">
-  <p:cSld>
-    <p:spTree>
-      <p:nvGrpSpPr>
-        <p:cNvPr id="1" name=""/>
-        <p:cNvGrpSpPr/>
-        <p:nvPr/>
-      </p:nvGrpSpPr>
-      <p:grpSpPr>
-        <a:xfrm>
-          <a:off x="0" y="0"/>
-          <a:ext cx="0" cy="0"/>
-          <a:chOff x="0" y="0"/>
-          <a:chExt cx="0" cy="0"/>
-        </a:xfrm>
-      </p:grpSpPr>
-      <p:sp>
-        <p:nvSpPr>
-          <p:cNvPr id="8" name="Title 7">
-            <a:extLst>
-              <a:ext uri="{FF2B5EF4-FFF2-40B4-BE49-F238E27FC236}">
-                <a16:creationId xmlns:a16="http://schemas.microsoft.com/office/drawing/2014/main" id="{8CC657C8-6C81-419B-8BE0-C4BD2580A827}"/>
-              </a:ext>
-            </a:extLst>
-          </p:cNvPr>
-          <p:cNvSpPr>
-            <a:spLocks noGrp="1"/>
-          </p:cNvSpPr>
-          <p:nvPr>
-            <p:ph type="title"/>
-          </p:nvPr>
-        </p:nvSpPr>
-        <p:spPr>
-          <a:xfrm>
-            <a:off x="628650" y="157603"/>
-            <a:ext cx="7886700" cy="1325563"/>
-          </a:xfrm>
-        </p:spPr>
-        <p:txBody>
-          <a:bodyPr/>
-          <a:lstStyle/>
-          <a:p>
-            <a:pPr algn="ctr"/>
-            <a:r>
-              <a:rPr lang="en-US" dirty="0"/>
-              <a:t>Star Wars by In Universe Order</a:t>
-            </a:r>
-          </a:p>
-        </p:txBody>
-      </p:sp>
-      <p:pic>
-        <p:nvPicPr>
-          <p:cNvPr id="28" name="Content Placeholder 27" descr="Chart, line chart&#10;&#10;Description automatically generated">
-            <a:extLst>
-              <a:ext uri="{FF2B5EF4-FFF2-40B4-BE49-F238E27FC236}">
-                <a16:creationId xmlns:a16="http://schemas.microsoft.com/office/drawing/2014/main" id="{24C3387A-9CEE-473F-9B75-27EBE736DBA6}"/>
-              </a:ext>
-            </a:extLst>
-          </p:cNvPr>
-          <p:cNvPicPr>
-            <a:picLocks noGrp="1" noChangeAspect="1"/>
-          </p:cNvPicPr>
-          <p:nvPr>
-            <p:ph sz="quarter" idx="4"/>
-          </p:nvPr>
-        </p:nvPicPr>
-        <p:blipFill>
-          <a:blip r:embed="rId2">
-            <a:extLst>
-              <a:ext uri="{28A0092B-C50C-407E-A947-70E740481C1C}">
-                <a14:useLocalDpi xmlns:a14="http://schemas.microsoft.com/office/drawing/2010/main" val="0"/>
-              </a:ext>
-            </a:extLst>
-          </a:blip>
-          <a:stretch>
-            <a:fillRect/>
-          </a:stretch>
-        </p:blipFill>
-        <p:spPr>
-          <a:xfrm>
-            <a:off x="4667394" y="2516354"/>
-            <a:ext cx="4476606" cy="2984403"/>
-          </a:xfrm>
-          <a:prstGeom prst="roundRect">
-            <a:avLst>
-              <a:gd name="adj" fmla="val 4167"/>
-            </a:avLst>
-          </a:prstGeom>
-          <a:solidFill>
-            <a:srgbClr val="FFFFFF"/>
-          </a:solidFill>
-          <a:ln w="76200" cap="sq">
-            <a:solidFill>
-              <a:srgbClr val="EAEAEA"/>
-            </a:solidFill>
-            <a:miter lim="800000"/>
-          </a:ln>
-          <a:effectLst>
-            <a:reflection blurRad="12700" stA="33000" endPos="28000" dist="5000" dir="5400000" sy="-100000" algn="bl" rotWithShape="0"/>
-          </a:effectLst>
-          <a:scene3d>
-            <a:camera prst="orthographicFront"/>
-            <a:lightRig rig="threePt" dir="t">
-              <a:rot lat="0" lon="0" rev="2700000"/>
-            </a:lightRig>
-          </a:scene3d>
-          <a:sp3d contourW="6350">
-            <a:bevelT h="38100"/>
-            <a:contourClr>
-              <a:srgbClr val="C0C0C0"/>
-            </a:contourClr>
-          </a:sp3d>
-        </p:spPr>
-      </p:pic>
-      <p:pic>
-        <p:nvPicPr>
-          <p:cNvPr id="26" name="Content Placeholder 25" descr="Chart, bar chart&#10;&#10;Description automatically generated">
-            <a:extLst>
-              <a:ext uri="{FF2B5EF4-FFF2-40B4-BE49-F238E27FC236}">
-                <a16:creationId xmlns:a16="http://schemas.microsoft.com/office/drawing/2014/main" id="{082D9228-A78B-4ED6-9A1A-1DAA4D640B65}"/>
-              </a:ext>
-            </a:extLst>
-          </p:cNvPr>
-          <p:cNvPicPr>
-            <a:picLocks noGrp="1" noChangeAspect="1"/>
-          </p:cNvPicPr>
-          <p:nvPr>
-            <p:ph sz="half" idx="2"/>
-          </p:nvPr>
-        </p:nvPicPr>
-        <p:blipFill>
-          <a:blip r:embed="rId3">
-            <a:extLst>
-              <a:ext uri="{28A0092B-C50C-407E-A947-70E740481C1C}">
-                <a14:useLocalDpi xmlns:a14="http://schemas.microsoft.com/office/drawing/2010/main" val="0"/>
-              </a:ext>
-            </a:extLst>
-          </a:blip>
-          <a:stretch>
-            <a:fillRect/>
-          </a:stretch>
-        </p:blipFill>
-        <p:spPr>
-          <a:xfrm>
-            <a:off x="95394" y="2516355"/>
-            <a:ext cx="4476606" cy="2984403"/>
-          </a:xfrm>
-          <a:prstGeom prst="roundRect">
-            <a:avLst>
-              <a:gd name="adj" fmla="val 4167"/>
-            </a:avLst>
-          </a:prstGeom>
-          <a:solidFill>
-            <a:srgbClr val="FFFFFF"/>
-          </a:solidFill>
-          <a:ln w="76200" cap="sq">
-            <a:solidFill>
-              <a:srgbClr val="EAEAEA"/>
-            </a:solidFill>
-            <a:miter lim="800000"/>
-          </a:ln>
-          <a:effectLst>
-            <a:reflection blurRad="12700" stA="33000" endPos="28000" dist="5000" dir="5400000" sy="-100000" algn="bl" rotWithShape="0"/>
-          </a:effectLst>
-          <a:scene3d>
-            <a:camera prst="orthographicFront"/>
-            <a:lightRig rig="threePt" dir="t">
-              <a:rot lat="0" lon="0" rev="2700000"/>
-            </a:lightRig>
-          </a:scene3d>
-          <a:sp3d contourW="6350">
-            <a:bevelT h="38100"/>
-            <a:contourClr>
-              <a:srgbClr val="C0C0C0"/>
-            </a:contourClr>
-          </a:sp3d>
-        </p:spPr>
-      </p:pic>
-    </p:spTree>
-    <p:extLst>
-      <p:ext uri="{BB962C8B-B14F-4D97-AF65-F5344CB8AC3E}">
-        <p14:creationId xmlns:p14="http://schemas.microsoft.com/office/powerpoint/2010/main" val="1073886237"/>
-      </p:ext>
-    </p:extLst>
-  </p:cSld>
-  <p:clrMapOvr>
-    <a:masterClrMapping/>
-  </p:clrMapOvr>
-</p:sld>
-</file>
-
-<file path=ppt/slides/slide7.xml><?xml version="1.0" encoding="utf-8"?>
-<p:sld xmlns:a="http://schemas.openxmlformats.org/drawingml/2006/main" xmlns:r="http://schemas.openxmlformats.org/officeDocument/2006/relationships" xmlns:p="http://schemas.openxmlformats.org/presentationml/2006/main">
-  <p:cSld>
-    <p:spTree>
-      <p:nvGrpSpPr>
-        <p:cNvPr id="1" name=""/>
-        <p:cNvGrpSpPr/>
-        <p:nvPr/>
-      </p:nvGrpSpPr>
-      <p:grpSpPr>
-        <a:xfrm>
-          <a:off x="0" y="0"/>
-          <a:ext cx="0" cy="0"/>
-          <a:chOff x="0" y="0"/>
-          <a:chExt cx="0" cy="0"/>
-        </a:xfrm>
-      </p:grpSpPr>
-      <p:sp>
-        <p:nvSpPr>
-          <p:cNvPr id="2" name="Title 1">
-            <a:extLst>
-              <a:ext uri="{FF2B5EF4-FFF2-40B4-BE49-F238E27FC236}">
-                <a16:creationId xmlns:a16="http://schemas.microsoft.com/office/drawing/2014/main" id="{97F1889C-F48C-4D8B-8B44-65F190F9BE00}"/>
-              </a:ext>
-            </a:extLst>
-          </p:cNvPr>
-          <p:cNvSpPr>
-            <a:spLocks noGrp="1"/>
-          </p:cNvSpPr>
-          <p:nvPr>
-            <p:ph type="title"/>
-          </p:nvPr>
-        </p:nvSpPr>
-        <p:spPr/>
-        <p:txBody>
-          <a:bodyPr/>
-          <a:lstStyle/>
-          <a:p>
-            <a:r>
-              <a:rPr lang="en-US" b="0" i="0" dirty="0">
-                <a:effectLst/>
-                <a:latin typeface="Arial" panose="020B0604020202020204" pitchFamily="34" charset="0"/>
-              </a:rPr>
-              <a:t>Data Cleanup &amp; Exploration</a:t>
-            </a:r>
-            <a:endParaRPr lang="en-US" dirty="0"/>
-          </a:p>
-        </p:txBody>
-      </p:sp>
-      <p:sp>
-        <p:nvSpPr>
-          <p:cNvPr id="3" name="Content Placeholder 2">
-            <a:extLst>
-              <a:ext uri="{FF2B5EF4-FFF2-40B4-BE49-F238E27FC236}">
-                <a16:creationId xmlns:a16="http://schemas.microsoft.com/office/drawing/2014/main" id="{7D1322A0-9450-476F-B9FD-7BE654CD2C3F}"/>
-              </a:ext>
-            </a:extLst>
-          </p:cNvPr>
-          <p:cNvSpPr>
-            <a:spLocks noGrp="1"/>
-          </p:cNvSpPr>
-          <p:nvPr>
-            <p:ph idx="1"/>
-          </p:nvPr>
-        </p:nvSpPr>
-        <p:spPr/>
-        <p:txBody>
-          <a:bodyPr/>
-          <a:lstStyle/>
-          <a:p>
-            <a:pPr algn="l"/>
-            <a:r>
-              <a:rPr lang="en-US" b="0" i="0" dirty="0">
-                <a:effectLst/>
-                <a:latin typeface="Arial" panose="020B0604020202020204" pitchFamily="34" charset="0"/>
-              </a:rPr>
-              <a:t>Describe the exploration and cleanup process</a:t>
-            </a:r>
-          </a:p>
-          <a:p>
-            <a:pPr algn="l"/>
-            <a:r>
-              <a:rPr lang="en-US" b="0" i="0" dirty="0">
-                <a:effectLst/>
-                <a:latin typeface="Arial" panose="020B0604020202020204" pitchFamily="34" charset="0"/>
-              </a:rPr>
-              <a:t>Discuss insights you had while exploring the data that you didn't anticipate</a:t>
-            </a:r>
-          </a:p>
-          <a:p>
-            <a:pPr algn="l"/>
-            <a:r>
-              <a:rPr lang="en-US" b="0" i="0" dirty="0">
-                <a:effectLst/>
-                <a:latin typeface="Arial" panose="020B0604020202020204" pitchFamily="34" charset="0"/>
-              </a:rPr>
-              <a:t>Discuss any problems that arose after exploring the data, and how you resolved them</a:t>
-            </a:r>
-          </a:p>
-          <a:p>
-            <a:pPr algn="l"/>
-            <a:r>
-              <a:rPr lang="en-US" b="0" i="0" dirty="0">
-                <a:effectLst/>
-                <a:latin typeface="Arial" panose="020B0604020202020204" pitchFamily="34" charset="0"/>
-              </a:rPr>
-              <a:t>Present and discuss interesting figures developed during exploration, ideally with the help of </a:t>
-            </a:r>
-            <a:r>
-              <a:rPr lang="en-US" b="0" i="0" dirty="0" err="1">
-                <a:effectLst/>
-                <a:latin typeface="Arial" panose="020B0604020202020204" pitchFamily="34" charset="0"/>
-              </a:rPr>
-              <a:t>Jupyter</a:t>
-            </a:r>
-            <a:r>
-              <a:rPr lang="en-US" b="0" i="0" dirty="0">
-                <a:effectLst/>
-                <a:latin typeface="Arial" panose="020B0604020202020204" pitchFamily="34" charset="0"/>
-              </a:rPr>
-              <a:t> Notebook</a:t>
-            </a:r>
-          </a:p>
-          <a:p>
-            <a:endParaRPr lang="en-US" dirty="0"/>
-          </a:p>
-        </p:txBody>
-      </p:sp>
-    </p:spTree>
-    <p:extLst>
-      <p:ext uri="{BB962C8B-B14F-4D97-AF65-F5344CB8AC3E}">
-        <p14:creationId xmlns:p14="http://schemas.microsoft.com/office/powerpoint/2010/main" val="748138327"/>
-      </p:ext>
-    </p:extLst>
-  </p:cSld>
-  <p:clrMapOvr>
-    <a:masterClrMapping/>
-  </p:clrMapOvr>
-</p:sld>
-</file>
-
-<file path=ppt/slides/slide8.xml><?xml version="1.0" encoding="utf-8"?>
-<p:sld xmlns:a="http://schemas.openxmlformats.org/drawingml/2006/main" xmlns:r="http://schemas.openxmlformats.org/officeDocument/2006/relationships" xmlns:p="http://schemas.openxmlformats.org/presentationml/2006/main">
-  <p:cSld>
-    <p:spTree>
-      <p:nvGrpSpPr>
-        <p:cNvPr id="1" name=""/>
-        <p:cNvGrpSpPr/>
-        <p:nvPr/>
-      </p:nvGrpSpPr>
-      <p:grpSpPr>
-        <a:xfrm>
-          <a:off x="0" y="0"/>
-          <a:ext cx="0" cy="0"/>
-          <a:chOff x="0" y="0"/>
-          <a:chExt cx="0" cy="0"/>
-        </a:xfrm>
-      </p:grpSpPr>
-      <p:sp>
-        <p:nvSpPr>
-          <p:cNvPr id="2" name="Title 1">
-            <a:extLst>
-              <a:ext uri="{FF2B5EF4-FFF2-40B4-BE49-F238E27FC236}">
-                <a16:creationId xmlns:a16="http://schemas.microsoft.com/office/drawing/2014/main" id="{5DB6BC1D-CEBA-4EF4-A6C0-754B91C72642}"/>
-              </a:ext>
-            </a:extLst>
-          </p:cNvPr>
-          <p:cNvSpPr>
-            <a:spLocks noGrp="1"/>
-          </p:cNvSpPr>
-          <p:nvPr>
-            <p:ph type="title"/>
-          </p:nvPr>
-        </p:nvSpPr>
-        <p:spPr/>
-        <p:txBody>
-          <a:bodyPr/>
-          <a:lstStyle/>
-          <a:p>
-            <a:r>
-              <a:rPr lang="en-US" b="0" i="0" dirty="0">
-                <a:effectLst/>
-                <a:latin typeface="Arial" panose="020B0604020202020204" pitchFamily="34" charset="0"/>
-              </a:rPr>
-              <a:t>Data Analysis</a:t>
-            </a:r>
-            <a:endParaRPr lang="en-US" dirty="0"/>
-          </a:p>
-        </p:txBody>
-      </p:sp>
-      <p:sp>
-        <p:nvSpPr>
-          <p:cNvPr id="3" name="Content Placeholder 2">
-            <a:extLst>
-              <a:ext uri="{FF2B5EF4-FFF2-40B4-BE49-F238E27FC236}">
-                <a16:creationId xmlns:a16="http://schemas.microsoft.com/office/drawing/2014/main" id="{FE19F740-18ED-44D8-ACFE-F87449FB836C}"/>
-              </a:ext>
-            </a:extLst>
-          </p:cNvPr>
-          <p:cNvSpPr>
-            <a:spLocks noGrp="1"/>
-          </p:cNvSpPr>
-          <p:nvPr>
-            <p:ph idx="1"/>
-          </p:nvPr>
-        </p:nvSpPr>
-        <p:spPr/>
-        <p:txBody>
-          <a:bodyPr/>
-          <a:lstStyle/>
-          <a:p>
-            <a:pPr algn="l"/>
-            <a:r>
-              <a:rPr lang="en-US" b="0" i="0" dirty="0">
-                <a:effectLst/>
-                <a:latin typeface="Arial" panose="020B0604020202020204" pitchFamily="34" charset="0"/>
-              </a:rPr>
-              <a:t>Discuss the steps you took to analyze the data and answer each question you asked in your proposal</a:t>
-            </a:r>
-          </a:p>
-          <a:p>
-            <a:pPr algn="l"/>
-            <a:r>
-              <a:rPr lang="en-US" b="0" i="0" dirty="0">
-                <a:effectLst/>
-                <a:latin typeface="Arial" panose="020B0604020202020204" pitchFamily="34" charset="0"/>
-              </a:rPr>
-              <a:t>Present and discuss interesting figures developed during analysis, ideally with the help of </a:t>
-            </a:r>
-            <a:r>
-              <a:rPr lang="en-US" b="0" i="0" dirty="0" err="1">
-                <a:effectLst/>
-                <a:latin typeface="Arial" panose="020B0604020202020204" pitchFamily="34" charset="0"/>
-              </a:rPr>
-              <a:t>Jupyter</a:t>
-            </a:r>
-            <a:r>
-              <a:rPr lang="en-US" b="0" i="0" dirty="0">
-                <a:effectLst/>
-                <a:latin typeface="Arial" panose="020B0604020202020204" pitchFamily="34" charset="0"/>
-              </a:rPr>
-              <a:t> Notebook</a:t>
-            </a:r>
-          </a:p>
-          <a:p>
-            <a:endParaRPr lang="en-US" dirty="0"/>
-          </a:p>
-        </p:txBody>
-      </p:sp>
-    </p:spTree>
-    <p:extLst>
-      <p:ext uri="{BB962C8B-B14F-4D97-AF65-F5344CB8AC3E}">
-        <p14:creationId xmlns:p14="http://schemas.microsoft.com/office/powerpoint/2010/main" val="3012671460"/>
+        <p14:creationId xmlns:p14="http://schemas.microsoft.com/office/powerpoint/2010/main" val="2551000511"/>
       </p:ext>
     </p:extLst>
   </p:cSld>
@@ -6551,7 +6570,7 @@
           <p:cNvPr id="8" name="Title 7">
             <a:extLst>
               <a:ext uri="{FF2B5EF4-FFF2-40B4-BE49-F238E27FC236}">
-                <a16:creationId xmlns:a16="http://schemas.microsoft.com/office/drawing/2014/main" id="{9E85B0D2-38A6-46B3-BD10-5A438EA550DE}"/>
+                <a16:creationId xmlns:a16="http://schemas.microsoft.com/office/drawing/2014/main" id="{8CC657C8-6C81-419B-8BE0-C4BD2580A827}"/>
               </a:ext>
             </a:extLst>
           </p:cNvPr>
@@ -6562,69 +6581,424 @@
             <p:ph type="title"/>
           </p:nvPr>
         </p:nvSpPr>
-        <p:spPr/>
+        <p:spPr>
+          <a:xfrm>
+            <a:off x="2373549" y="-358529"/>
+            <a:ext cx="7048914" cy="1325563"/>
+          </a:xfrm>
+        </p:spPr>
+        <p:txBody>
+          <a:bodyPr>
+            <a:normAutofit/>
+          </a:bodyPr>
+          <a:lstStyle/>
+          <a:p>
+            <a:pPr algn="ctr"/>
+            <a:r>
+              <a:rPr lang="en-US" sz="2800" b="1" dirty="0">
+                <a:solidFill>
+                  <a:schemeClr val="accent4"/>
+                </a:solidFill>
+              </a:rPr>
+              <a:t>Can one </a:t>
+            </a:r>
+            <a:r>
+              <a:rPr lang="en-US" sz="2800" b="1" strike="sngStrike" dirty="0">
+                <a:solidFill>
+                  <a:schemeClr val="accent4"/>
+                </a:solidFill>
+              </a:rPr>
+              <a:t>person</a:t>
+            </a:r>
+            <a:r>
+              <a:rPr lang="en-US" sz="2800" b="1" dirty="0">
+                <a:solidFill>
+                  <a:schemeClr val="accent4"/>
+                </a:solidFill>
+              </a:rPr>
+              <a:t> Hutt truly make a difference?</a:t>
+            </a:r>
+          </a:p>
+        </p:txBody>
+      </p:sp>
+      <p:sp>
+        <p:nvSpPr>
+          <p:cNvPr id="21" name="Text Placeholder 20">
+            <a:extLst>
+              <a:ext uri="{FF2B5EF4-FFF2-40B4-BE49-F238E27FC236}">
+                <a16:creationId xmlns:a16="http://schemas.microsoft.com/office/drawing/2014/main" id="{8497922B-4B9E-4B84-A29B-EC3F186FD62A}"/>
+              </a:ext>
+            </a:extLst>
+          </p:cNvPr>
+          <p:cNvSpPr>
+            <a:spLocks noGrp="1"/>
+          </p:cNvSpPr>
+          <p:nvPr>
+            <p:ph type="body" idx="1"/>
+          </p:nvPr>
+        </p:nvSpPr>
+        <p:spPr>
+          <a:xfrm>
+            <a:off x="0" y="-41682"/>
+            <a:ext cx="3868340" cy="823912"/>
+          </a:xfrm>
+        </p:spPr>
         <p:txBody>
           <a:bodyPr/>
           <a:lstStyle/>
           <a:p>
-            <a:endParaRPr lang="en-US"/>
-          </a:p>
-        </p:txBody>
-      </p:sp>
-      <p:sp>
-        <p:nvSpPr>
-          <p:cNvPr id="15" name="Content Placeholder 14">
+            <a:r>
+              <a:rPr lang="en-US" dirty="0"/>
+              <a:t>Masses with Jabba</a:t>
+            </a:r>
+          </a:p>
+        </p:txBody>
+      </p:sp>
+      <p:pic>
+        <p:nvPicPr>
+          <p:cNvPr id="14" name="Content Placeholder 13" descr="Chart, histogram&#10;&#10;Description automatically generated">
             <a:extLst>
               <a:ext uri="{FF2B5EF4-FFF2-40B4-BE49-F238E27FC236}">
-                <a16:creationId xmlns:a16="http://schemas.microsoft.com/office/drawing/2014/main" id="{132DA302-8B7C-47CD-97C0-F25409405DB3}"/>
+                <a16:creationId xmlns:a16="http://schemas.microsoft.com/office/drawing/2014/main" id="{3D4344B4-364C-4554-B4A4-A5FE96A8634C}"/>
               </a:ext>
             </a:extLst>
           </p:cNvPr>
-          <p:cNvSpPr>
-            <a:spLocks noGrp="1"/>
-          </p:cNvSpPr>
+          <p:cNvPicPr>
+            <a:picLocks noGrp="1" noChangeAspect="1"/>
+          </p:cNvPicPr>
           <p:nvPr>
             <p:ph sz="half" idx="2"/>
           </p:nvPr>
-        </p:nvSpPr>
-        <p:spPr/>
+        </p:nvPicPr>
+        <p:blipFill>
+          <a:blip r:embed="rId2">
+            <a:extLst>
+              <a:ext uri="{28A0092B-C50C-407E-A947-70E740481C1C}">
+                <a14:useLocalDpi xmlns:a14="http://schemas.microsoft.com/office/drawing/2010/main" val="0"/>
+              </a:ext>
+            </a:extLst>
+          </a:blip>
+          <a:stretch>
+            <a:fillRect/>
+          </a:stretch>
+        </p:blipFill>
+        <p:spPr>
+          <a:xfrm>
+            <a:off x="0" y="722536"/>
+            <a:ext cx="3868737" cy="2901552"/>
+          </a:xfrm>
+        </p:spPr>
+      </p:pic>
+      <p:sp>
+        <p:nvSpPr>
+          <p:cNvPr id="22" name="Text Placeholder 21">
+            <a:extLst>
+              <a:ext uri="{FF2B5EF4-FFF2-40B4-BE49-F238E27FC236}">
+                <a16:creationId xmlns:a16="http://schemas.microsoft.com/office/drawing/2014/main" id="{AA4405B5-A8A4-4715-A5A0-6DC8B535488F}"/>
+              </a:ext>
+            </a:extLst>
+          </p:cNvPr>
+          <p:cNvSpPr>
+            <a:spLocks noGrp="1"/>
+          </p:cNvSpPr>
+          <p:nvPr>
+            <p:ph type="body" sz="quarter" idx="3"/>
+          </p:nvPr>
+        </p:nvSpPr>
+        <p:spPr>
+          <a:xfrm>
+            <a:off x="397" y="3212132"/>
+            <a:ext cx="3887391" cy="823912"/>
+          </a:xfrm>
+        </p:spPr>
         <p:txBody>
           <a:bodyPr/>
           <a:lstStyle/>
           <a:p>
-            <a:endParaRPr lang="en-US"/>
-          </a:p>
-        </p:txBody>
-      </p:sp>
-      <p:sp>
-        <p:nvSpPr>
-          <p:cNvPr id="17" name="Content Placeholder 16">
+            <a:r>
+              <a:rPr lang="en-US" dirty="0"/>
+              <a:t>Masses without Jabba</a:t>
+            </a:r>
+          </a:p>
+        </p:txBody>
+      </p:sp>
+      <p:pic>
+        <p:nvPicPr>
+          <p:cNvPr id="19" name="Content Placeholder 18" descr="Chart, histogram&#10;&#10;Description automatically generated">
             <a:extLst>
               <a:ext uri="{FF2B5EF4-FFF2-40B4-BE49-F238E27FC236}">
-                <a16:creationId xmlns:a16="http://schemas.microsoft.com/office/drawing/2014/main" id="{F6AE99E2-7723-47C6-963A-6B48A9E5D4A8}"/>
+                <a16:creationId xmlns:a16="http://schemas.microsoft.com/office/drawing/2014/main" id="{0C1861C0-1452-4BCA-95B3-C2C67F602974}"/>
               </a:ext>
             </a:extLst>
           </p:cNvPr>
-          <p:cNvSpPr>
-            <a:spLocks noGrp="1"/>
-          </p:cNvSpPr>
+          <p:cNvPicPr>
+            <a:picLocks noGrp="1" noChangeAspect="1"/>
+          </p:cNvPicPr>
           <p:nvPr>
             <p:ph sz="quarter" idx="4"/>
           </p:nvPr>
-        </p:nvSpPr>
-        <p:spPr/>
-        <p:txBody>
-          <a:bodyPr/>
-          <a:lstStyle/>
-          <a:p>
-            <a:endParaRPr lang="en-US"/>
+        </p:nvPicPr>
+        <p:blipFill>
+          <a:blip r:embed="rId3">
+            <a:extLst>
+              <a:ext uri="{28A0092B-C50C-407E-A947-70E740481C1C}">
+                <a14:useLocalDpi xmlns:a14="http://schemas.microsoft.com/office/drawing/2010/main" val="0"/>
+              </a:ext>
+            </a:extLst>
+          </a:blip>
+          <a:stretch>
+            <a:fillRect/>
+          </a:stretch>
+        </p:blipFill>
+        <p:spPr>
+          <a:xfrm>
+            <a:off x="0" y="3942159"/>
+            <a:ext cx="3887788" cy="2915841"/>
+          </a:xfrm>
+        </p:spPr>
+      </p:pic>
+      <p:pic>
+        <p:nvPicPr>
+          <p:cNvPr id="24" name="Picture 23" descr="Chart, histogram&#10;&#10;Description automatically generated">
+            <a:extLst>
+              <a:ext uri="{FF2B5EF4-FFF2-40B4-BE49-F238E27FC236}">
+                <a16:creationId xmlns:a16="http://schemas.microsoft.com/office/drawing/2014/main" id="{339631CA-E8BE-4A88-94EA-CA808473F9C2}"/>
+              </a:ext>
+            </a:extLst>
+          </p:cNvPr>
+          <p:cNvPicPr>
+            <a:picLocks noChangeAspect="1"/>
+          </p:cNvPicPr>
+          <p:nvPr/>
+        </p:nvPicPr>
+        <p:blipFill>
+          <a:blip r:embed="rId4">
+            <a:extLst>
+              <a:ext uri="{28A0092B-C50C-407E-A947-70E740481C1C}">
+                <a14:useLocalDpi xmlns:a14="http://schemas.microsoft.com/office/drawing/2010/main" val="0"/>
+              </a:ext>
+            </a:extLst>
+          </a:blip>
+          <a:stretch>
+            <a:fillRect/>
+          </a:stretch>
+        </p:blipFill>
+        <p:spPr>
+          <a:xfrm>
+            <a:off x="5136637" y="4006887"/>
+            <a:ext cx="4006966" cy="2671310"/>
+          </a:xfrm>
+          <a:prstGeom prst="rect">
+            <a:avLst/>
+          </a:prstGeom>
+        </p:spPr>
+      </p:pic>
+      <p:pic>
+        <p:nvPicPr>
+          <p:cNvPr id="26" name="Picture 25" descr="Chart, histogram&#10;&#10;Description automatically generated">
+            <a:extLst>
+              <a:ext uri="{FF2B5EF4-FFF2-40B4-BE49-F238E27FC236}">
+                <a16:creationId xmlns:a16="http://schemas.microsoft.com/office/drawing/2014/main" id="{46CA0DB5-43D0-43C2-82E1-F79F2F9F8010}"/>
+              </a:ext>
+            </a:extLst>
+          </p:cNvPr>
+          <p:cNvPicPr>
+            <a:picLocks noChangeAspect="1"/>
+          </p:cNvPicPr>
+          <p:nvPr/>
+        </p:nvPicPr>
+        <p:blipFill>
+          <a:blip r:embed="rId5">
+            <a:extLst>
+              <a:ext uri="{28A0092B-C50C-407E-A947-70E740481C1C}">
+                <a14:useLocalDpi xmlns:a14="http://schemas.microsoft.com/office/drawing/2010/main" val="0"/>
+              </a:ext>
+            </a:extLst>
+          </a:blip>
+          <a:stretch>
+            <a:fillRect/>
+          </a:stretch>
+        </p:blipFill>
+        <p:spPr>
+          <a:xfrm>
+            <a:off x="5136637" y="837657"/>
+            <a:ext cx="4006966" cy="2671310"/>
+          </a:xfrm>
+          <a:prstGeom prst="rect">
+            <a:avLst/>
+          </a:prstGeom>
+        </p:spPr>
+      </p:pic>
+      <p:sp>
+        <p:nvSpPr>
+          <p:cNvPr id="27" name="TextBox 26">
+            <a:extLst>
+              <a:ext uri="{FF2B5EF4-FFF2-40B4-BE49-F238E27FC236}">
+                <a16:creationId xmlns:a16="http://schemas.microsoft.com/office/drawing/2014/main" id="{7C89B01F-5154-4D67-A0FB-AA8724E98A5C}"/>
+              </a:ext>
+            </a:extLst>
+          </p:cNvPr>
+          <p:cNvSpPr txBox="1"/>
+          <p:nvPr/>
+        </p:nvSpPr>
+        <p:spPr>
+          <a:xfrm>
+            <a:off x="3806759" y="823321"/>
+            <a:ext cx="1329878" cy="2192908"/>
+          </a:xfrm>
+          <a:prstGeom prst="rect">
+            <a:avLst/>
+          </a:prstGeom>
+          <a:noFill/>
+        </p:spPr>
+        <p:txBody>
+          <a:bodyPr wrap="square" rtlCol="0">
+            <a:spAutoFit/>
+          </a:bodyPr>
+          <a:lstStyle/>
+          <a:p>
+            <a:pPr algn="ctr"/>
+            <a:r>
+              <a:rPr lang="en-US" sz="1050" dirty="0" err="1"/>
+              <a:t>pvalue</a:t>
+            </a:r>
+            <a:r>
+              <a:rPr lang="en-US" sz="1050" dirty="0"/>
+              <a:t>=1.7377320722567525e-24)</a:t>
+            </a:r>
+          </a:p>
+          <a:p>
+            <a:pPr algn="ctr"/>
+            <a:r>
+              <a:rPr lang="en-US" sz="1050" dirty="0"/>
+              <a:t>---------------------------</a:t>
+            </a:r>
+          </a:p>
+          <a:p>
+            <a:pPr algn="ctr"/>
+            <a:r>
+              <a:rPr lang="en-US" sz="1050" dirty="0"/>
+              <a:t>The sample standard deviation is </a:t>
+            </a:r>
+            <a:r>
+              <a:rPr lang="en-US" sz="1050" b="1" u="sng" dirty="0"/>
+              <a:t>168.0</a:t>
+            </a:r>
+          </a:p>
+          <a:p>
+            <a:pPr algn="ctr"/>
+            <a:r>
+              <a:rPr lang="en-US" sz="1050" dirty="0"/>
+              <a:t>The sample variance is 28229.0</a:t>
+            </a:r>
+          </a:p>
+          <a:p>
+            <a:pPr algn="ctr"/>
+            <a:r>
+              <a:rPr lang="en-US" sz="1050" dirty="0"/>
+              <a:t>---------------------------</a:t>
+            </a:r>
+          </a:p>
+          <a:p>
+            <a:pPr algn="ctr"/>
+            <a:r>
+              <a:rPr lang="en-US" sz="1050" dirty="0"/>
+              <a:t>The mean mass of Star Wars characters with Jabba is </a:t>
+            </a:r>
+          </a:p>
+          <a:p>
+            <a:pPr algn="ctr"/>
+            <a:endParaRPr lang="en-US" sz="1050" dirty="0"/>
+          </a:p>
+          <a:p>
+            <a:pPr algn="ctr"/>
+            <a:r>
+              <a:rPr lang="en-US" sz="1050" b="1" u="sng" dirty="0"/>
+              <a:t>97.3kg or 214.5lbs</a:t>
+            </a:r>
+          </a:p>
+        </p:txBody>
+      </p:sp>
+      <p:sp>
+        <p:nvSpPr>
+          <p:cNvPr id="28" name="TextBox 27">
+            <a:extLst>
+              <a:ext uri="{FF2B5EF4-FFF2-40B4-BE49-F238E27FC236}">
+                <a16:creationId xmlns:a16="http://schemas.microsoft.com/office/drawing/2014/main" id="{AF29F9C7-A089-4017-9792-8784581A1AE2}"/>
+              </a:ext>
+            </a:extLst>
+          </p:cNvPr>
+          <p:cNvSpPr txBox="1"/>
+          <p:nvPr/>
+        </p:nvSpPr>
+        <p:spPr>
+          <a:xfrm>
+            <a:off x="3847273" y="4080986"/>
+            <a:ext cx="1329879" cy="2192908"/>
+          </a:xfrm>
+          <a:prstGeom prst="rect">
+            <a:avLst/>
+          </a:prstGeom>
+          <a:noFill/>
+        </p:spPr>
+        <p:txBody>
+          <a:bodyPr wrap="square" rtlCol="0">
+            <a:spAutoFit/>
+          </a:bodyPr>
+          <a:lstStyle/>
+          <a:p>
+            <a:pPr algn="ctr"/>
+            <a:r>
+              <a:rPr lang="en-US" sz="1050" dirty="0" err="1"/>
+              <a:t>pvalue</a:t>
+            </a:r>
+            <a:r>
+              <a:rPr lang="en-US" sz="1050" dirty="0"/>
+              <a:t>=0.09846414031271)</a:t>
+            </a:r>
+          </a:p>
+          <a:p>
+            <a:pPr algn="ctr"/>
+            <a:r>
+              <a:rPr lang="en-US" sz="1050" dirty="0"/>
+              <a:t>--------------------------The sample standard deviation is </a:t>
+            </a:r>
+            <a:r>
+              <a:rPr lang="en-US" sz="1050" b="1" u="sng" dirty="0"/>
+              <a:t>29.0</a:t>
+            </a:r>
+          </a:p>
+          <a:p>
+            <a:pPr algn="ctr"/>
+            <a:r>
+              <a:rPr lang="en-US" sz="1050" dirty="0"/>
+              <a:t>The sample variance is 841.0</a:t>
+            </a:r>
+          </a:p>
+          <a:p>
+            <a:pPr algn="ctr"/>
+            <a:r>
+              <a:rPr lang="en-US" sz="1050" dirty="0"/>
+              <a:t>---------------------------The mean mass of Star Wars characters without Jabba is </a:t>
+            </a:r>
+          </a:p>
+          <a:p>
+            <a:pPr algn="ctr"/>
+            <a:endParaRPr lang="en-US" sz="1050" dirty="0"/>
+          </a:p>
+          <a:p>
+            <a:pPr algn="ctr"/>
+            <a:r>
+              <a:rPr lang="en-US" sz="1050" b="1" u="sng" dirty="0"/>
+              <a:t>75.6kg or 166.7lbs</a:t>
+            </a:r>
           </a:p>
         </p:txBody>
       </p:sp>
     </p:spTree>
     <p:extLst>
       <p:ext uri="{BB962C8B-B14F-4D97-AF65-F5344CB8AC3E}">
-        <p14:creationId xmlns:p14="http://schemas.microsoft.com/office/powerpoint/2010/main" val="2950377974"/>
+        <p14:creationId xmlns:p14="http://schemas.microsoft.com/office/powerpoint/2010/main" val="1633364287"/>
       </p:ext>
     </p:extLst>
   </p:cSld>

</xml_diff>